<commit_message>
Update presentation with delivery 1
</commit_message>
<xml_diff>
--- a/presentation/FGV-MBA - Monografia - Detecção de Máscara Facial.pptx
+++ b/presentation/FGV-MBA - Monografia - Detecção de Máscara Facial.pptx
@@ -207,1243 +207,16 @@
 </p:presentation>
 </file>
 
+<file path=ppt/revisionInfo.xml><?xml version="1.0" encoding="utf-8"?>
+<p1510:revInfo xmlns:a="http://schemas.openxmlformats.org/drawingml/2006/main" xmlns:r="http://schemas.openxmlformats.org/officeDocument/2006/relationships" xmlns:p1510="http://schemas.microsoft.com/office/powerpoint/2015/10/main">
+  <p1510:revLst>
+    <p1510:client id="{3E875E03-6E5A-4A77-9477-B0E529ECB8C3}" v="3" dt="2020-06-05T00:58:42.063"/>
+  </p1510:revLst>
+</p1510:revInfo>
+</file>
+
 <file path=ppt/changesInfos/changesInfo1.xml><?xml version="1.0" encoding="utf-8"?>
 <pc:chgInfo xmlns:a="http://schemas.openxmlformats.org/drawingml/2006/main" xmlns:r="http://schemas.openxmlformats.org/officeDocument/2006/relationships" xmlns:ac="http://schemas.microsoft.com/office/drawing/2013/main/command" xmlns:pc="http://schemas.microsoft.com/office/powerpoint/2013/main/command">
-  <pc:docChgLst>
-    <pc:chgData name="A57566093@fgv.edu.br" userId="1bb9ad80-ff55-479f-acd6-204a7fcb2663" providerId="ADAL" clId="{6EAA8C06-7F8D-43F2-902E-F978E52A88FA}"/>
-    <pc:docChg chg="undo custSel modSld addSection modSection">
-      <pc:chgData name="A57566093@fgv.edu.br" userId="1bb9ad80-ff55-479f-acd6-204a7fcb2663" providerId="ADAL" clId="{6EAA8C06-7F8D-43F2-902E-F978E52A88FA}" dt="2020-05-30T18:09:42.664" v="2152" actId="1035"/>
-      <pc:docMkLst>
-        <pc:docMk/>
-      </pc:docMkLst>
-      <pc:sldChg chg="addSp delSp modSp mod">
-        <pc:chgData name="A57566093@fgv.edu.br" userId="1bb9ad80-ff55-479f-acd6-204a7fcb2663" providerId="ADAL" clId="{6EAA8C06-7F8D-43F2-902E-F978E52A88FA}" dt="2020-05-30T18:09:42.664" v="2152" actId="1035"/>
-        <pc:sldMkLst>
-          <pc:docMk/>
-          <pc:sldMk cId="1275928961" sldId="372"/>
-        </pc:sldMkLst>
-        <pc:spChg chg="mod">
-          <ac:chgData name="A57566093@fgv.edu.br" userId="1bb9ad80-ff55-479f-acd6-204a7fcb2663" providerId="ADAL" clId="{6EAA8C06-7F8D-43F2-902E-F978E52A88FA}" dt="2020-05-30T18:09:42.664" v="2152" actId="1035"/>
-          <ac:spMkLst>
-            <pc:docMk/>
-            <pc:sldMk cId="1275928961" sldId="372"/>
-            <ac:spMk id="15" creationId="{EE9AE69C-DA3A-4B1F-A561-C474F96FA82E}"/>
-          </ac:spMkLst>
-        </pc:spChg>
-        <pc:spChg chg="mod">
-          <ac:chgData name="A57566093@fgv.edu.br" userId="1bb9ad80-ff55-479f-acd6-204a7fcb2663" providerId="ADAL" clId="{6EAA8C06-7F8D-43F2-902E-F978E52A88FA}" dt="2020-05-30T18:08:53.704" v="2140" actId="1038"/>
-          <ac:spMkLst>
-            <pc:docMk/>
-            <pc:sldMk cId="1275928961" sldId="372"/>
-            <ac:spMk id="47" creationId="{2188BDEC-AE57-40A1-AC7E-154444DB58F0}"/>
-          </ac:spMkLst>
-        </pc:spChg>
-        <pc:spChg chg="mod">
-          <ac:chgData name="A57566093@fgv.edu.br" userId="1bb9ad80-ff55-479f-acd6-204a7fcb2663" providerId="ADAL" clId="{6EAA8C06-7F8D-43F2-902E-F978E52A88FA}" dt="2020-05-30T18:05:01.159" v="2092" actId="20577"/>
-          <ac:spMkLst>
-            <pc:docMk/>
-            <pc:sldMk cId="1275928961" sldId="372"/>
-            <ac:spMk id="52" creationId="{0475A7DF-361A-4873-B74C-76D203352350}"/>
-          </ac:spMkLst>
-        </pc:spChg>
-        <pc:spChg chg="del mod">
-          <ac:chgData name="A57566093@fgv.edu.br" userId="1bb9ad80-ff55-479f-acd6-204a7fcb2663" providerId="ADAL" clId="{6EAA8C06-7F8D-43F2-902E-F978E52A88FA}" dt="2020-05-30T16:06:13.539" v="768" actId="478"/>
-          <ac:spMkLst>
-            <pc:docMk/>
-            <pc:sldMk cId="1275928961" sldId="372"/>
-            <ac:spMk id="56" creationId="{01C930DE-9C06-4A8C-BD93-B5D51CC5261A}"/>
-          </ac:spMkLst>
-        </pc:spChg>
-        <pc:spChg chg="del mod">
-          <ac:chgData name="A57566093@fgv.edu.br" userId="1bb9ad80-ff55-479f-acd6-204a7fcb2663" providerId="ADAL" clId="{6EAA8C06-7F8D-43F2-902E-F978E52A88FA}" dt="2020-05-30T17:10:18.334" v="1086" actId="478"/>
-          <ac:spMkLst>
-            <pc:docMk/>
-            <pc:sldMk cId="1275928961" sldId="372"/>
-            <ac:spMk id="60" creationId="{FD3C8DAB-117F-4C2A-8FC2-D09FD1E0AFCD}"/>
-          </ac:spMkLst>
-        </pc:spChg>
-        <pc:spChg chg="del mod">
-          <ac:chgData name="A57566093@fgv.edu.br" userId="1bb9ad80-ff55-479f-acd6-204a7fcb2663" providerId="ADAL" clId="{6EAA8C06-7F8D-43F2-902E-F978E52A88FA}" dt="2020-05-30T17:12:30.238" v="1091" actId="478"/>
-          <ac:spMkLst>
-            <pc:docMk/>
-            <pc:sldMk cId="1275928961" sldId="372"/>
-            <ac:spMk id="64" creationId="{AB05B829-23D6-4862-9111-F2448FEC0E6F}"/>
-          </ac:spMkLst>
-        </pc:spChg>
-        <pc:spChg chg="mod">
-          <ac:chgData name="A57566093@fgv.edu.br" userId="1bb9ad80-ff55-479f-acd6-204a7fcb2663" providerId="ADAL" clId="{6EAA8C06-7F8D-43F2-902E-F978E52A88FA}" dt="2020-05-30T17:56:42.628" v="1996" actId="1035"/>
-          <ac:spMkLst>
-            <pc:docMk/>
-            <pc:sldMk cId="1275928961" sldId="372"/>
-            <ac:spMk id="65" creationId="{6117BEC9-29C4-4049-B244-911DB9C24AC0}"/>
-          </ac:spMkLst>
-        </pc:spChg>
-        <pc:spChg chg="mod">
-          <ac:chgData name="A57566093@fgv.edu.br" userId="1bb9ad80-ff55-479f-acd6-204a7fcb2663" providerId="ADAL" clId="{6EAA8C06-7F8D-43F2-902E-F978E52A88FA}" dt="2020-05-30T17:56:42.628" v="1996" actId="1035"/>
-          <ac:spMkLst>
-            <pc:docMk/>
-            <pc:sldMk cId="1275928961" sldId="372"/>
-            <ac:spMk id="66" creationId="{8F316673-FBED-43E5-8AEF-DD23341CC9C0}"/>
-          </ac:spMkLst>
-        </pc:spChg>
-        <pc:spChg chg="mod">
-          <ac:chgData name="A57566093@fgv.edu.br" userId="1bb9ad80-ff55-479f-acd6-204a7fcb2663" providerId="ADAL" clId="{6EAA8C06-7F8D-43F2-902E-F978E52A88FA}" dt="2020-05-30T17:56:42.628" v="1996" actId="1035"/>
-          <ac:spMkLst>
-            <pc:docMk/>
-            <pc:sldMk cId="1275928961" sldId="372"/>
-            <ac:spMk id="67" creationId="{D6EB025E-AC31-4A25-B8D1-3A3C813EF7B2}"/>
-          </ac:spMkLst>
-        </pc:spChg>
-        <pc:spChg chg="mod">
-          <ac:chgData name="A57566093@fgv.edu.br" userId="1bb9ad80-ff55-479f-acd6-204a7fcb2663" providerId="ADAL" clId="{6EAA8C06-7F8D-43F2-902E-F978E52A88FA}" dt="2020-05-30T17:56:42.628" v="1996" actId="1035"/>
-          <ac:spMkLst>
-            <pc:docMk/>
-            <pc:sldMk cId="1275928961" sldId="372"/>
-            <ac:spMk id="68" creationId="{735EC6FA-99C0-4A93-AE17-F8DFC76F6DFE}"/>
-          </ac:spMkLst>
-        </pc:spChg>
-        <pc:spChg chg="del mod">
-          <ac:chgData name="A57566093@fgv.edu.br" userId="1bb9ad80-ff55-479f-acd6-204a7fcb2663" providerId="ADAL" clId="{6EAA8C06-7F8D-43F2-902E-F978E52A88FA}" dt="2020-05-30T17:15:46.044" v="1129" actId="478"/>
-          <ac:spMkLst>
-            <pc:docMk/>
-            <pc:sldMk cId="1275928961" sldId="372"/>
-            <ac:spMk id="69" creationId="{8A939DE8-6B04-446F-982B-0EDCD866CE79}"/>
-          </ac:spMkLst>
-        </pc:spChg>
-        <pc:spChg chg="mod">
-          <ac:chgData name="A57566093@fgv.edu.br" userId="1bb9ad80-ff55-479f-acd6-204a7fcb2663" providerId="ADAL" clId="{6EAA8C06-7F8D-43F2-902E-F978E52A88FA}" dt="2020-05-30T17:56:42.628" v="1996" actId="1035"/>
-          <ac:spMkLst>
-            <pc:docMk/>
-            <pc:sldMk cId="1275928961" sldId="372"/>
-            <ac:spMk id="70" creationId="{6B320405-02EC-4767-8ED6-4A2AE162A3FB}"/>
-          </ac:spMkLst>
-        </pc:spChg>
-        <pc:spChg chg="mod">
-          <ac:chgData name="A57566093@fgv.edu.br" userId="1bb9ad80-ff55-479f-acd6-204a7fcb2663" providerId="ADAL" clId="{6EAA8C06-7F8D-43F2-902E-F978E52A88FA}" dt="2020-05-30T17:56:42.628" v="1996" actId="1035"/>
-          <ac:spMkLst>
-            <pc:docMk/>
-            <pc:sldMk cId="1275928961" sldId="372"/>
-            <ac:spMk id="71" creationId="{0E33FDFF-2867-4A95-8839-5EF2FA67F378}"/>
-          </ac:spMkLst>
-        </pc:spChg>
-        <pc:spChg chg="mod">
-          <ac:chgData name="A57566093@fgv.edu.br" userId="1bb9ad80-ff55-479f-acd6-204a7fcb2663" providerId="ADAL" clId="{6EAA8C06-7F8D-43F2-902E-F978E52A88FA}" dt="2020-05-30T17:56:42.628" v="1996" actId="1035"/>
-          <ac:spMkLst>
-            <pc:docMk/>
-            <pc:sldMk cId="1275928961" sldId="372"/>
-            <ac:spMk id="72" creationId="{152F9426-A438-445A-BF25-38AC382E4962}"/>
-          </ac:spMkLst>
-        </pc:spChg>
-        <pc:spChg chg="del mod">
-          <ac:chgData name="A57566093@fgv.edu.br" userId="1bb9ad80-ff55-479f-acd6-204a7fcb2663" providerId="ADAL" clId="{6EAA8C06-7F8D-43F2-902E-F978E52A88FA}" dt="2020-05-30T17:15:46.884" v="1130" actId="478"/>
-          <ac:spMkLst>
-            <pc:docMk/>
-            <pc:sldMk cId="1275928961" sldId="372"/>
-            <ac:spMk id="73" creationId="{E577E1D4-D9C2-4277-950B-35D18058F087}"/>
-          </ac:spMkLst>
-        </pc:spChg>
-        <pc:spChg chg="mod">
-          <ac:chgData name="A57566093@fgv.edu.br" userId="1bb9ad80-ff55-479f-acd6-204a7fcb2663" providerId="ADAL" clId="{6EAA8C06-7F8D-43F2-902E-F978E52A88FA}" dt="2020-05-30T17:56:42.628" v="1996" actId="1035"/>
-          <ac:spMkLst>
-            <pc:docMk/>
-            <pc:sldMk cId="1275928961" sldId="372"/>
-            <ac:spMk id="74" creationId="{9FC2E4E1-9B95-4A3A-BF09-6C20E6E44089}"/>
-          </ac:spMkLst>
-        </pc:spChg>
-        <pc:spChg chg="mod">
-          <ac:chgData name="A57566093@fgv.edu.br" userId="1bb9ad80-ff55-479f-acd6-204a7fcb2663" providerId="ADAL" clId="{6EAA8C06-7F8D-43F2-902E-F978E52A88FA}" dt="2020-05-30T17:56:42.628" v="1996" actId="1035"/>
-          <ac:spMkLst>
-            <pc:docMk/>
-            <pc:sldMk cId="1275928961" sldId="372"/>
-            <ac:spMk id="75" creationId="{66C61559-E7F2-4E0E-83CC-EB1BEB8FAA7D}"/>
-          </ac:spMkLst>
-        </pc:spChg>
-        <pc:spChg chg="mod">
-          <ac:chgData name="A57566093@fgv.edu.br" userId="1bb9ad80-ff55-479f-acd6-204a7fcb2663" providerId="ADAL" clId="{6EAA8C06-7F8D-43F2-902E-F978E52A88FA}" dt="2020-05-30T17:56:42.628" v="1996" actId="1035"/>
-          <ac:spMkLst>
-            <pc:docMk/>
-            <pc:sldMk cId="1275928961" sldId="372"/>
-            <ac:spMk id="76" creationId="{17962853-B4C8-4B89-95F1-7BF905A4DD5A}"/>
-          </ac:spMkLst>
-        </pc:spChg>
-        <pc:spChg chg="del mod">
-          <ac:chgData name="A57566093@fgv.edu.br" userId="1bb9ad80-ff55-479f-acd6-204a7fcb2663" providerId="ADAL" clId="{6EAA8C06-7F8D-43F2-902E-F978E52A88FA}" dt="2020-05-30T17:15:48.048" v="1131" actId="478"/>
-          <ac:spMkLst>
-            <pc:docMk/>
-            <pc:sldMk cId="1275928961" sldId="372"/>
-            <ac:spMk id="77" creationId="{9E5C8CFE-1FB4-48D5-A910-F31A4C0B4882}"/>
-          </ac:spMkLst>
-        </pc:spChg>
-        <pc:spChg chg="mod">
-          <ac:chgData name="A57566093@fgv.edu.br" userId="1bb9ad80-ff55-479f-acd6-204a7fcb2663" providerId="ADAL" clId="{6EAA8C06-7F8D-43F2-902E-F978E52A88FA}" dt="2020-05-30T17:56:42.628" v="1996" actId="1035"/>
-          <ac:spMkLst>
-            <pc:docMk/>
-            <pc:sldMk cId="1275928961" sldId="372"/>
-            <ac:spMk id="78" creationId="{516E0C74-4ABC-487B-A9A6-84B8BD2CFE45}"/>
-          </ac:spMkLst>
-        </pc:spChg>
-        <pc:spChg chg="mod">
-          <ac:chgData name="A57566093@fgv.edu.br" userId="1bb9ad80-ff55-479f-acd6-204a7fcb2663" providerId="ADAL" clId="{6EAA8C06-7F8D-43F2-902E-F978E52A88FA}" dt="2020-05-30T17:56:42.628" v="1996" actId="1035"/>
-          <ac:spMkLst>
-            <pc:docMk/>
-            <pc:sldMk cId="1275928961" sldId="372"/>
-            <ac:spMk id="79" creationId="{AF4C6CDE-FC41-4C7D-9A34-6ACB60C05083}"/>
-          </ac:spMkLst>
-        </pc:spChg>
-        <pc:spChg chg="mod">
-          <ac:chgData name="A57566093@fgv.edu.br" userId="1bb9ad80-ff55-479f-acd6-204a7fcb2663" providerId="ADAL" clId="{6EAA8C06-7F8D-43F2-902E-F978E52A88FA}" dt="2020-05-30T17:56:42.628" v="1996" actId="1035"/>
-          <ac:spMkLst>
-            <pc:docMk/>
-            <pc:sldMk cId="1275928961" sldId="372"/>
-            <ac:spMk id="80" creationId="{3ABF7C65-9D4E-430D-B632-6034C3D040A5}"/>
-          </ac:spMkLst>
-        </pc:spChg>
-        <pc:spChg chg="del mod">
-          <ac:chgData name="A57566093@fgv.edu.br" userId="1bb9ad80-ff55-479f-acd6-204a7fcb2663" providerId="ADAL" clId="{6EAA8C06-7F8D-43F2-902E-F978E52A88FA}" dt="2020-05-30T17:15:48.997" v="1132" actId="478"/>
-          <ac:spMkLst>
-            <pc:docMk/>
-            <pc:sldMk cId="1275928961" sldId="372"/>
-            <ac:spMk id="81" creationId="{646DA2B6-B23A-4B4A-B2D5-BF5B630F4AA1}"/>
-          </ac:spMkLst>
-        </pc:spChg>
-        <pc:spChg chg="mod">
-          <ac:chgData name="A57566093@fgv.edu.br" userId="1bb9ad80-ff55-479f-acd6-204a7fcb2663" providerId="ADAL" clId="{6EAA8C06-7F8D-43F2-902E-F978E52A88FA}" dt="2020-05-30T17:56:42.628" v="1996" actId="1035"/>
-          <ac:spMkLst>
-            <pc:docMk/>
-            <pc:sldMk cId="1275928961" sldId="372"/>
-            <ac:spMk id="82" creationId="{812F77D9-757B-41CC-A681-C64ED82BD50D}"/>
-          </ac:spMkLst>
-        </pc:spChg>
-        <pc:spChg chg="mod topLvl">
-          <ac:chgData name="A57566093@fgv.edu.br" userId="1bb9ad80-ff55-479f-acd6-204a7fcb2663" providerId="ADAL" clId="{6EAA8C06-7F8D-43F2-902E-F978E52A88FA}" dt="2020-05-30T17:56:42.628" v="1996" actId="1035"/>
-          <ac:spMkLst>
-            <pc:docMk/>
-            <pc:sldMk cId="1275928961" sldId="372"/>
-            <ac:spMk id="86" creationId="{1AEC6ECF-0C27-451B-AC63-12BACD6273BD}"/>
-          </ac:spMkLst>
-        </pc:spChg>
-        <pc:spChg chg="mod ord topLvl">
-          <ac:chgData name="A57566093@fgv.edu.br" userId="1bb9ad80-ff55-479f-acd6-204a7fcb2663" providerId="ADAL" clId="{6EAA8C06-7F8D-43F2-902E-F978E52A88FA}" dt="2020-05-30T17:56:42.628" v="1996" actId="1035"/>
-          <ac:spMkLst>
-            <pc:docMk/>
-            <pc:sldMk cId="1275928961" sldId="372"/>
-            <ac:spMk id="98" creationId="{0AB91B6E-EBE3-4DA5-8761-287504DDCA75}"/>
-          </ac:spMkLst>
-        </pc:spChg>
-        <pc:spChg chg="mod topLvl">
-          <ac:chgData name="A57566093@fgv.edu.br" userId="1bb9ad80-ff55-479f-acd6-204a7fcb2663" providerId="ADAL" clId="{6EAA8C06-7F8D-43F2-902E-F978E52A88FA}" dt="2020-05-30T17:56:42.628" v="1996" actId="1035"/>
-          <ac:spMkLst>
-            <pc:docMk/>
-            <pc:sldMk cId="1275928961" sldId="372"/>
-            <ac:spMk id="101" creationId="{058871C4-6BF6-4AA4-A64E-B588205948A7}"/>
-          </ac:spMkLst>
-        </pc:spChg>
-        <pc:spChg chg="mod topLvl">
-          <ac:chgData name="A57566093@fgv.edu.br" userId="1bb9ad80-ff55-479f-acd6-204a7fcb2663" providerId="ADAL" clId="{6EAA8C06-7F8D-43F2-902E-F978E52A88FA}" dt="2020-05-30T17:56:42.628" v="1996" actId="1035"/>
-          <ac:spMkLst>
-            <pc:docMk/>
-            <pc:sldMk cId="1275928961" sldId="372"/>
-            <ac:spMk id="104" creationId="{EBEB97F3-6B7B-4B88-A096-DAE1916BDAAC}"/>
-          </ac:spMkLst>
-        </pc:spChg>
-        <pc:spChg chg="mod topLvl">
-          <ac:chgData name="A57566093@fgv.edu.br" userId="1bb9ad80-ff55-479f-acd6-204a7fcb2663" providerId="ADAL" clId="{6EAA8C06-7F8D-43F2-902E-F978E52A88FA}" dt="2020-05-30T17:56:42.628" v="1996" actId="1035"/>
-          <ac:spMkLst>
-            <pc:docMk/>
-            <pc:sldMk cId="1275928961" sldId="372"/>
-            <ac:spMk id="107" creationId="{7E6F721C-66BD-4EBD-80CA-98AA8720ECB2}"/>
-          </ac:spMkLst>
-        </pc:spChg>
-        <pc:spChg chg="mod topLvl">
-          <ac:chgData name="A57566093@fgv.edu.br" userId="1bb9ad80-ff55-479f-acd6-204a7fcb2663" providerId="ADAL" clId="{6EAA8C06-7F8D-43F2-902E-F978E52A88FA}" dt="2020-05-30T17:56:42.628" v="1996" actId="1035"/>
-          <ac:spMkLst>
-            <pc:docMk/>
-            <pc:sldMk cId="1275928961" sldId="372"/>
-            <ac:spMk id="113" creationId="{D3580611-CEF8-4754-BF62-848293D3247D}"/>
-          </ac:spMkLst>
-        </pc:spChg>
-        <pc:spChg chg="mod topLvl">
-          <ac:chgData name="A57566093@fgv.edu.br" userId="1bb9ad80-ff55-479f-acd6-204a7fcb2663" providerId="ADAL" clId="{6EAA8C06-7F8D-43F2-902E-F978E52A88FA}" dt="2020-05-30T17:56:42.628" v="1996" actId="1035"/>
-          <ac:spMkLst>
-            <pc:docMk/>
-            <pc:sldMk cId="1275928961" sldId="372"/>
-            <ac:spMk id="116" creationId="{9DDEC0B5-D125-464A-9615-269DDD5588FC}"/>
-          </ac:spMkLst>
-        </pc:spChg>
-        <pc:spChg chg="mod ord topLvl">
-          <ac:chgData name="A57566093@fgv.edu.br" userId="1bb9ad80-ff55-479f-acd6-204a7fcb2663" providerId="ADAL" clId="{6EAA8C06-7F8D-43F2-902E-F978E52A88FA}" dt="2020-05-30T17:56:42.628" v="1996" actId="1035"/>
-          <ac:spMkLst>
-            <pc:docMk/>
-            <pc:sldMk cId="1275928961" sldId="372"/>
-            <ac:spMk id="119" creationId="{A97CD634-7EF8-44B7-A700-2AA0B596D495}"/>
-          </ac:spMkLst>
-        </pc:spChg>
-        <pc:spChg chg="mod topLvl">
-          <ac:chgData name="A57566093@fgv.edu.br" userId="1bb9ad80-ff55-479f-acd6-204a7fcb2663" providerId="ADAL" clId="{6EAA8C06-7F8D-43F2-902E-F978E52A88FA}" dt="2020-05-30T17:56:42.628" v="1996" actId="1035"/>
-          <ac:spMkLst>
-            <pc:docMk/>
-            <pc:sldMk cId="1275928961" sldId="372"/>
-            <ac:spMk id="122" creationId="{8A3D1205-79D5-4CFC-B6AC-4415A304CFFD}"/>
-          </ac:spMkLst>
-        </pc:spChg>
-        <pc:spChg chg="mod">
-          <ac:chgData name="A57566093@fgv.edu.br" userId="1bb9ad80-ff55-479f-acd6-204a7fcb2663" providerId="ADAL" clId="{6EAA8C06-7F8D-43F2-902E-F978E52A88FA}" dt="2020-05-30T17:56:42.628" v="1996" actId="1035"/>
-          <ac:spMkLst>
-            <pc:docMk/>
-            <pc:sldMk cId="1275928961" sldId="372"/>
-            <ac:spMk id="123" creationId="{7D9BCB58-5C55-4D8D-93C5-F0FBADBEC4D2}"/>
-          </ac:spMkLst>
-        </pc:spChg>
-        <pc:spChg chg="mod">
-          <ac:chgData name="A57566093@fgv.edu.br" userId="1bb9ad80-ff55-479f-acd6-204a7fcb2663" providerId="ADAL" clId="{6EAA8C06-7F8D-43F2-902E-F978E52A88FA}" dt="2020-05-30T17:56:42.628" v="1996" actId="1035"/>
-          <ac:spMkLst>
-            <pc:docMk/>
-            <pc:sldMk cId="1275928961" sldId="372"/>
-            <ac:spMk id="124" creationId="{CE42AB43-6BF3-41F5-9C4E-D0A9AF81D796}"/>
-          </ac:spMkLst>
-        </pc:spChg>
-        <pc:spChg chg="mod">
-          <ac:chgData name="A57566093@fgv.edu.br" userId="1bb9ad80-ff55-479f-acd6-204a7fcb2663" providerId="ADAL" clId="{6EAA8C06-7F8D-43F2-902E-F978E52A88FA}" dt="2020-05-30T17:56:42.628" v="1996" actId="1035"/>
-          <ac:spMkLst>
-            <pc:docMk/>
-            <pc:sldMk cId="1275928961" sldId="372"/>
-            <ac:spMk id="125" creationId="{F97F9173-C9ED-416F-8569-2E32A0AE76FC}"/>
-          </ac:spMkLst>
-        </pc:spChg>
-        <pc:spChg chg="mod">
-          <ac:chgData name="A57566093@fgv.edu.br" userId="1bb9ad80-ff55-479f-acd6-204a7fcb2663" providerId="ADAL" clId="{6EAA8C06-7F8D-43F2-902E-F978E52A88FA}" dt="2020-05-30T17:56:42.628" v="1996" actId="1035"/>
-          <ac:spMkLst>
-            <pc:docMk/>
-            <pc:sldMk cId="1275928961" sldId="372"/>
-            <ac:spMk id="126" creationId="{6C30A25B-8A3C-4C3E-B7A9-CF223180C05A}"/>
-          </ac:spMkLst>
-        </pc:spChg>
-        <pc:spChg chg="mod">
-          <ac:chgData name="A57566093@fgv.edu.br" userId="1bb9ad80-ff55-479f-acd6-204a7fcb2663" providerId="ADAL" clId="{6EAA8C06-7F8D-43F2-902E-F978E52A88FA}" dt="2020-05-30T17:56:42.628" v="1996" actId="1035"/>
-          <ac:spMkLst>
-            <pc:docMk/>
-            <pc:sldMk cId="1275928961" sldId="372"/>
-            <ac:spMk id="127" creationId="{FABB6E0A-CCC2-4AD7-A0AF-7CD3984124A1}"/>
-          </ac:spMkLst>
-        </pc:spChg>
-        <pc:spChg chg="mod">
-          <ac:chgData name="A57566093@fgv.edu.br" userId="1bb9ad80-ff55-479f-acd6-204a7fcb2663" providerId="ADAL" clId="{6EAA8C06-7F8D-43F2-902E-F978E52A88FA}" dt="2020-05-30T17:59:37.734" v="2018" actId="20577"/>
-          <ac:spMkLst>
-            <pc:docMk/>
-            <pc:sldMk cId="1275928961" sldId="372"/>
-            <ac:spMk id="128" creationId="{92688E06-F987-40CF-8540-4268639286BA}"/>
-          </ac:spMkLst>
-        </pc:spChg>
-        <pc:spChg chg="mod">
-          <ac:chgData name="A57566093@fgv.edu.br" userId="1bb9ad80-ff55-479f-acd6-204a7fcb2663" providerId="ADAL" clId="{6EAA8C06-7F8D-43F2-902E-F978E52A88FA}" dt="2020-05-30T17:56:42.628" v="1996" actId="1035"/>
-          <ac:spMkLst>
-            <pc:docMk/>
-            <pc:sldMk cId="1275928961" sldId="372"/>
-            <ac:spMk id="129" creationId="{1A0E9EB0-A93E-4A0F-9159-A3178E3C8952}"/>
-          </ac:spMkLst>
-        </pc:spChg>
-        <pc:spChg chg="mod">
-          <ac:chgData name="A57566093@fgv.edu.br" userId="1bb9ad80-ff55-479f-acd6-204a7fcb2663" providerId="ADAL" clId="{6EAA8C06-7F8D-43F2-902E-F978E52A88FA}" dt="2020-05-30T17:56:42.628" v="1996" actId="1035"/>
-          <ac:spMkLst>
-            <pc:docMk/>
-            <pc:sldMk cId="1275928961" sldId="372"/>
-            <ac:spMk id="130" creationId="{969455D6-4BF0-4A0F-B7D6-23541D50CFF1}"/>
-          </ac:spMkLst>
-        </pc:spChg>
-        <pc:spChg chg="mod">
-          <ac:chgData name="A57566093@fgv.edu.br" userId="1bb9ad80-ff55-479f-acd6-204a7fcb2663" providerId="ADAL" clId="{6EAA8C06-7F8D-43F2-902E-F978E52A88FA}" dt="2020-05-30T17:56:42.628" v="1996" actId="1035"/>
-          <ac:spMkLst>
-            <pc:docMk/>
-            <pc:sldMk cId="1275928961" sldId="372"/>
-            <ac:spMk id="131" creationId="{7CB07761-F4B3-4D53-AEC9-B31C26E03C9E}"/>
-          </ac:spMkLst>
-        </pc:spChg>
-        <pc:spChg chg="mod">
-          <ac:chgData name="A57566093@fgv.edu.br" userId="1bb9ad80-ff55-479f-acd6-204a7fcb2663" providerId="ADAL" clId="{6EAA8C06-7F8D-43F2-902E-F978E52A88FA}" dt="2020-05-30T17:56:42.628" v="1996" actId="1035"/>
-          <ac:spMkLst>
-            <pc:docMk/>
-            <pc:sldMk cId="1275928961" sldId="372"/>
-            <ac:spMk id="132" creationId="{EEAC9399-E202-4C04-99D3-A6B56D3DE0C5}"/>
-          </ac:spMkLst>
-        </pc:spChg>
-        <pc:spChg chg="mod">
-          <ac:chgData name="A57566093@fgv.edu.br" userId="1bb9ad80-ff55-479f-acd6-204a7fcb2663" providerId="ADAL" clId="{6EAA8C06-7F8D-43F2-902E-F978E52A88FA}" dt="2020-05-30T17:56:42.628" v="1996" actId="1035"/>
-          <ac:spMkLst>
-            <pc:docMk/>
-            <pc:sldMk cId="1275928961" sldId="372"/>
-            <ac:spMk id="133" creationId="{3A33CC4D-D74B-4740-A182-2BF2D1190599}"/>
-          </ac:spMkLst>
-        </pc:spChg>
-        <pc:spChg chg="mod">
-          <ac:chgData name="A57566093@fgv.edu.br" userId="1bb9ad80-ff55-479f-acd6-204a7fcb2663" providerId="ADAL" clId="{6EAA8C06-7F8D-43F2-902E-F978E52A88FA}" dt="2020-05-30T17:56:42.628" v="1996" actId="1035"/>
-          <ac:spMkLst>
-            <pc:docMk/>
-            <pc:sldMk cId="1275928961" sldId="372"/>
-            <ac:spMk id="134" creationId="{15F0DA74-3C64-4143-BD54-DF90199C1D2E}"/>
-          </ac:spMkLst>
-        </pc:spChg>
-        <pc:spChg chg="mod">
-          <ac:chgData name="A57566093@fgv.edu.br" userId="1bb9ad80-ff55-479f-acd6-204a7fcb2663" providerId="ADAL" clId="{6EAA8C06-7F8D-43F2-902E-F978E52A88FA}" dt="2020-05-30T17:59:15.093" v="2011" actId="20577"/>
-          <ac:spMkLst>
-            <pc:docMk/>
-            <pc:sldMk cId="1275928961" sldId="372"/>
-            <ac:spMk id="135" creationId="{19F6B6C0-A6F1-4495-B8E2-7CA957C41286}"/>
-          </ac:spMkLst>
-        </pc:spChg>
-        <pc:spChg chg="add del mod">
-          <ac:chgData name="A57566093@fgv.edu.br" userId="1bb9ad80-ff55-479f-acd6-204a7fcb2663" providerId="ADAL" clId="{6EAA8C06-7F8D-43F2-902E-F978E52A88FA}" dt="2020-05-30T17:15:27.794" v="1112" actId="478"/>
-          <ac:spMkLst>
-            <pc:docMk/>
-            <pc:sldMk cId="1275928961" sldId="372"/>
-            <ac:spMk id="136" creationId="{B4178B04-BDF7-401F-AB34-1862A572C7C8}"/>
-          </ac:spMkLst>
-        </pc:spChg>
-        <pc:spChg chg="add mod">
-          <ac:chgData name="A57566093@fgv.edu.br" userId="1bb9ad80-ff55-479f-acd6-204a7fcb2663" providerId="ADAL" clId="{6EAA8C06-7F8D-43F2-902E-F978E52A88FA}" dt="2020-05-30T17:56:42.628" v="1996" actId="1035"/>
-          <ac:spMkLst>
-            <pc:docMk/>
-            <pc:sldMk cId="1275928961" sldId="372"/>
-            <ac:spMk id="138" creationId="{883BA034-3CFF-4548-9ABB-E1C0C74E7C93}"/>
-          </ac:spMkLst>
-        </pc:spChg>
-        <pc:spChg chg="add mod">
-          <ac:chgData name="A57566093@fgv.edu.br" userId="1bb9ad80-ff55-479f-acd6-204a7fcb2663" providerId="ADAL" clId="{6EAA8C06-7F8D-43F2-902E-F978E52A88FA}" dt="2020-05-30T18:05:21.598" v="2099"/>
-          <ac:spMkLst>
-            <pc:docMk/>
-            <pc:sldMk cId="1275928961" sldId="372"/>
-            <ac:spMk id="139" creationId="{11CA5B1E-2A64-4CC1-8D14-56CF4B944878}"/>
-          </ac:spMkLst>
-        </pc:spChg>
-        <pc:spChg chg="mod topLvl">
-          <ac:chgData name="A57566093@fgv.edu.br" userId="1bb9ad80-ff55-479f-acd6-204a7fcb2663" providerId="ADAL" clId="{6EAA8C06-7F8D-43F2-902E-F978E52A88FA}" dt="2020-05-30T17:56:42.628" v="1996" actId="1035"/>
-          <ac:spMkLst>
-            <pc:docMk/>
-            <pc:sldMk cId="1275928961" sldId="372"/>
-            <ac:spMk id="140" creationId="{607C9564-A9A0-4C19-8EAC-999D0EFFD7C9}"/>
-          </ac:spMkLst>
-        </pc:spChg>
-        <pc:spChg chg="add mod">
-          <ac:chgData name="A57566093@fgv.edu.br" userId="1bb9ad80-ff55-479f-acd6-204a7fcb2663" providerId="ADAL" clId="{6EAA8C06-7F8D-43F2-902E-F978E52A88FA}" dt="2020-05-30T18:05:31.403" v="2102" actId="20577"/>
-          <ac:spMkLst>
-            <pc:docMk/>
-            <pc:sldMk cId="1275928961" sldId="372"/>
-            <ac:spMk id="141" creationId="{66785AF6-978F-4F12-BD3B-A23E9D9412F1}"/>
-          </ac:spMkLst>
-        </pc:spChg>
-        <pc:spChg chg="add mod">
-          <ac:chgData name="A57566093@fgv.edu.br" userId="1bb9ad80-ff55-479f-acd6-204a7fcb2663" providerId="ADAL" clId="{6EAA8C06-7F8D-43F2-902E-F978E52A88FA}" dt="2020-05-30T18:05:12.034" v="2095"/>
-          <ac:spMkLst>
-            <pc:docMk/>
-            <pc:sldMk cId="1275928961" sldId="372"/>
-            <ac:spMk id="142" creationId="{1C7B873A-BDF7-49C0-B480-E2B18EEC0B7F}"/>
-          </ac:spMkLst>
-        </pc:spChg>
-        <pc:spChg chg="add mod">
-          <ac:chgData name="A57566093@fgv.edu.br" userId="1bb9ad80-ff55-479f-acd6-204a7fcb2663" providerId="ADAL" clId="{6EAA8C06-7F8D-43F2-902E-F978E52A88FA}" dt="2020-05-30T18:04:58.369" v="2091" actId="20577"/>
-          <ac:spMkLst>
-            <pc:docMk/>
-            <pc:sldMk cId="1275928961" sldId="372"/>
-            <ac:spMk id="143" creationId="{33666E9B-EB64-4015-980E-A41A7F25DE24}"/>
-          </ac:spMkLst>
-        </pc:spChg>
-        <pc:spChg chg="add mod">
-          <ac:chgData name="A57566093@fgv.edu.br" userId="1bb9ad80-ff55-479f-acd6-204a7fcb2663" providerId="ADAL" clId="{6EAA8C06-7F8D-43F2-902E-F978E52A88FA}" dt="2020-05-30T18:05:07.409" v="2094" actId="20577"/>
-          <ac:spMkLst>
-            <pc:docMk/>
-            <pc:sldMk cId="1275928961" sldId="372"/>
-            <ac:spMk id="144" creationId="{8CB7FC1A-8E60-4EED-8B1D-9A05E9117621}"/>
-          </ac:spMkLst>
-        </pc:spChg>
-        <pc:spChg chg="add mod">
-          <ac:chgData name="A57566093@fgv.edu.br" userId="1bb9ad80-ff55-479f-acd6-204a7fcb2663" providerId="ADAL" clId="{6EAA8C06-7F8D-43F2-902E-F978E52A88FA}" dt="2020-05-30T18:05:18.559" v="2098" actId="20577"/>
-          <ac:spMkLst>
-            <pc:docMk/>
-            <pc:sldMk cId="1275928961" sldId="372"/>
-            <ac:spMk id="145" creationId="{8A0DEF7D-8FCD-4543-AB0B-C6450C02E31F}"/>
-          </ac:spMkLst>
-        </pc:spChg>
-        <pc:spChg chg="add mod">
-          <ac:chgData name="A57566093@fgv.edu.br" userId="1bb9ad80-ff55-479f-acd6-204a7fcb2663" providerId="ADAL" clId="{6EAA8C06-7F8D-43F2-902E-F978E52A88FA}" dt="2020-05-30T18:05:38.272" v="2105" actId="20577"/>
-          <ac:spMkLst>
-            <pc:docMk/>
-            <pc:sldMk cId="1275928961" sldId="372"/>
-            <ac:spMk id="147" creationId="{AD667E69-0B55-42F4-9903-69330D706F80}"/>
-          </ac:spMkLst>
-        </pc:spChg>
-        <pc:spChg chg="add mod">
-          <ac:chgData name="A57566093@fgv.edu.br" userId="1bb9ad80-ff55-479f-acd6-204a7fcb2663" providerId="ADAL" clId="{6EAA8C06-7F8D-43F2-902E-F978E52A88FA}" dt="2020-05-30T18:05:42.829" v="2108" actId="20577"/>
-          <ac:spMkLst>
-            <pc:docMk/>
-            <pc:sldMk cId="1275928961" sldId="372"/>
-            <ac:spMk id="148" creationId="{B0B65378-071C-4A53-AD0B-EC390F3C2EA0}"/>
-          </ac:spMkLst>
-        </pc:spChg>
-        <pc:spChg chg="add mod">
-          <ac:chgData name="A57566093@fgv.edu.br" userId="1bb9ad80-ff55-479f-acd6-204a7fcb2663" providerId="ADAL" clId="{6EAA8C06-7F8D-43F2-902E-F978E52A88FA}" dt="2020-05-30T17:56:42.628" v="1996" actId="1035"/>
-          <ac:spMkLst>
-            <pc:docMk/>
-            <pc:sldMk cId="1275928961" sldId="372"/>
-            <ac:spMk id="149" creationId="{2855B1C8-F95F-4581-A7A9-2C83A127B926}"/>
-          </ac:spMkLst>
-        </pc:spChg>
-        <pc:spChg chg="add mod">
-          <ac:chgData name="A57566093@fgv.edu.br" userId="1bb9ad80-ff55-479f-acd6-204a7fcb2663" providerId="ADAL" clId="{6EAA8C06-7F8D-43F2-902E-F978E52A88FA}" dt="2020-05-30T18:05:49.074" v="2111" actId="20577"/>
-          <ac:spMkLst>
-            <pc:docMk/>
-            <pc:sldMk cId="1275928961" sldId="372"/>
-            <ac:spMk id="150" creationId="{5F5D66D8-AF9A-4908-8C30-FCBF866C9619}"/>
-          </ac:spMkLst>
-        </pc:spChg>
-        <pc:grpChg chg="add del mod">
-          <ac:chgData name="A57566093@fgv.edu.br" userId="1bb9ad80-ff55-479f-acd6-204a7fcb2663" providerId="ADAL" clId="{6EAA8C06-7F8D-43F2-902E-F978E52A88FA}" dt="2020-05-30T17:03:24.274" v="784" actId="165"/>
-          <ac:grpSpMkLst>
-            <pc:docMk/>
-            <pc:sldMk cId="1275928961" sldId="372"/>
-            <ac:grpSpMk id="84" creationId="{CE86F772-74FF-4732-91AB-F7660CAA0080}"/>
-          </ac:grpSpMkLst>
-        </pc:grpChg>
-        <pc:grpChg chg="del mod">
-          <ac:chgData name="A57566093@fgv.edu.br" userId="1bb9ad80-ff55-479f-acd6-204a7fcb2663" providerId="ADAL" clId="{6EAA8C06-7F8D-43F2-902E-F978E52A88FA}" dt="2020-05-30T15:52:41.374" v="337" actId="165"/>
-          <ac:grpSpMkLst>
-            <pc:docMk/>
-            <pc:sldMk cId="1275928961" sldId="372"/>
-            <ac:grpSpMk id="84" creationId="{D91536B1-6F35-4360-A678-306591A6CE20}"/>
-          </ac:grpSpMkLst>
-        </pc:grpChg>
-        <pc:grpChg chg="mod">
-          <ac:chgData name="A57566093@fgv.edu.br" userId="1bb9ad80-ff55-479f-acd6-204a7fcb2663" providerId="ADAL" clId="{6EAA8C06-7F8D-43F2-902E-F978E52A88FA}" dt="2020-05-30T17:56:42.628" v="1996" actId="1035"/>
-          <ac:grpSpMkLst>
-            <pc:docMk/>
-            <pc:sldMk cId="1275928961" sldId="372"/>
-            <ac:grpSpMk id="87" creationId="{A449242F-42DA-49A5-9682-FBDECB48F21C}"/>
-          </ac:grpSpMkLst>
-        </pc:grpChg>
-        <pc:grpChg chg="mod">
-          <ac:chgData name="A57566093@fgv.edu.br" userId="1bb9ad80-ff55-479f-acd6-204a7fcb2663" providerId="ADAL" clId="{6EAA8C06-7F8D-43F2-902E-F978E52A88FA}" dt="2020-05-30T17:56:42.628" v="1996" actId="1035"/>
-          <ac:grpSpMkLst>
-            <pc:docMk/>
-            <pc:sldMk cId="1275928961" sldId="372"/>
-            <ac:grpSpMk id="90" creationId="{0A78FD27-1770-48EC-8934-CB96880C0622}"/>
-          </ac:grpSpMkLst>
-        </pc:grpChg>
-        <pc:grpChg chg="mod">
-          <ac:chgData name="A57566093@fgv.edu.br" userId="1bb9ad80-ff55-479f-acd6-204a7fcb2663" providerId="ADAL" clId="{6EAA8C06-7F8D-43F2-902E-F978E52A88FA}" dt="2020-05-30T17:56:42.628" v="1996" actId="1035"/>
-          <ac:grpSpMkLst>
-            <pc:docMk/>
-            <pc:sldMk cId="1275928961" sldId="372"/>
-            <ac:grpSpMk id="93" creationId="{009339D9-89B9-47EC-9739-387D913BEC3B}"/>
-          </ac:grpSpMkLst>
-        </pc:grpChg>
-        <pc:grpChg chg="del mod ord">
-          <ac:chgData name="A57566093@fgv.edu.br" userId="1bb9ad80-ff55-479f-acd6-204a7fcb2663" providerId="ADAL" clId="{6EAA8C06-7F8D-43F2-902E-F978E52A88FA}" dt="2020-05-30T17:06:36.688" v="969" actId="165"/>
-          <ac:grpSpMkLst>
-            <pc:docMk/>
-            <pc:sldMk cId="1275928961" sldId="372"/>
-            <ac:grpSpMk id="96" creationId="{AE3EBA0A-6AE8-4C22-8B5E-4545342A3379}"/>
-          </ac:grpSpMkLst>
-        </pc:grpChg>
-        <pc:grpChg chg="del mod">
-          <ac:chgData name="A57566093@fgv.edu.br" userId="1bb9ad80-ff55-479f-acd6-204a7fcb2663" providerId="ADAL" clId="{6EAA8C06-7F8D-43F2-902E-F978E52A88FA}" dt="2020-05-30T17:23:02.811" v="1293" actId="165"/>
-          <ac:grpSpMkLst>
-            <pc:docMk/>
-            <pc:sldMk cId="1275928961" sldId="372"/>
-            <ac:grpSpMk id="99" creationId="{A5601210-0137-4FFA-A0A4-5E09B487C474}"/>
-          </ac:grpSpMkLst>
-        </pc:grpChg>
-        <pc:grpChg chg="del mod">
-          <ac:chgData name="A57566093@fgv.edu.br" userId="1bb9ad80-ff55-479f-acd6-204a7fcb2663" providerId="ADAL" clId="{6EAA8C06-7F8D-43F2-902E-F978E52A88FA}" dt="2020-05-30T17:24:19.693" v="1310" actId="165"/>
-          <ac:grpSpMkLst>
-            <pc:docMk/>
-            <pc:sldMk cId="1275928961" sldId="372"/>
-            <ac:grpSpMk id="102" creationId="{455C307F-CAB5-4509-B739-A94675E2E65A}"/>
-          </ac:grpSpMkLst>
-        </pc:grpChg>
-        <pc:grpChg chg="del mod">
-          <ac:chgData name="A57566093@fgv.edu.br" userId="1bb9ad80-ff55-479f-acd6-204a7fcb2663" providerId="ADAL" clId="{6EAA8C06-7F8D-43F2-902E-F978E52A88FA}" dt="2020-05-30T17:36:36.548" v="1563" actId="165"/>
-          <ac:grpSpMkLst>
-            <pc:docMk/>
-            <pc:sldMk cId="1275928961" sldId="372"/>
-            <ac:grpSpMk id="105" creationId="{3E056A8A-BB57-4F1D-BC98-12E5C6BC16EF}"/>
-          </ac:grpSpMkLst>
-        </pc:grpChg>
-        <pc:grpChg chg="mod">
-          <ac:chgData name="A57566093@fgv.edu.br" userId="1bb9ad80-ff55-479f-acd6-204a7fcb2663" providerId="ADAL" clId="{6EAA8C06-7F8D-43F2-902E-F978E52A88FA}" dt="2020-05-30T17:56:42.628" v="1996" actId="1035"/>
-          <ac:grpSpMkLst>
-            <pc:docMk/>
-            <pc:sldMk cId="1275928961" sldId="372"/>
-            <ac:grpSpMk id="108" creationId="{0E86805B-6CCF-47D5-BC48-4CEDDE54DFDA}"/>
-          </ac:grpSpMkLst>
-        </pc:grpChg>
-        <pc:grpChg chg="del mod">
-          <ac:chgData name="A57566093@fgv.edu.br" userId="1bb9ad80-ff55-479f-acd6-204a7fcb2663" providerId="ADAL" clId="{6EAA8C06-7F8D-43F2-902E-F978E52A88FA}" dt="2020-05-30T15:53:48.311" v="363" actId="165"/>
-          <ac:grpSpMkLst>
-            <pc:docMk/>
-            <pc:sldMk cId="1275928961" sldId="372"/>
-            <ac:grpSpMk id="111" creationId="{A650A8F1-3421-4ABB-88A5-7ED88D5D874C}"/>
-          </ac:grpSpMkLst>
-        </pc:grpChg>
-        <pc:grpChg chg="del mod">
-          <ac:chgData name="A57566093@fgv.edu.br" userId="1bb9ad80-ff55-479f-acd6-204a7fcb2663" providerId="ADAL" clId="{6EAA8C06-7F8D-43F2-902E-F978E52A88FA}" dt="2020-05-30T17:03:52.472" v="792" actId="165"/>
-          <ac:grpSpMkLst>
-            <pc:docMk/>
-            <pc:sldMk cId="1275928961" sldId="372"/>
-            <ac:grpSpMk id="114" creationId="{7450F4FC-D01B-4AD7-B487-0ACA7397AC4E}"/>
-          </ac:grpSpMkLst>
-        </pc:grpChg>
-        <pc:grpChg chg="del mod ord">
-          <ac:chgData name="A57566093@fgv.edu.br" userId="1bb9ad80-ff55-479f-acd6-204a7fcb2663" providerId="ADAL" clId="{6EAA8C06-7F8D-43F2-902E-F978E52A88FA}" dt="2020-05-30T17:31:01.073" v="1390" actId="165"/>
-          <ac:grpSpMkLst>
-            <pc:docMk/>
-            <pc:sldMk cId="1275928961" sldId="372"/>
-            <ac:grpSpMk id="117" creationId="{3B7BF9C9-D32C-4853-B4E0-66B308C1F1F9}"/>
-          </ac:grpSpMkLst>
-        </pc:grpChg>
-        <pc:grpChg chg="add del mod">
-          <ac:chgData name="A57566093@fgv.edu.br" userId="1bb9ad80-ff55-479f-acd6-204a7fcb2663" providerId="ADAL" clId="{6EAA8C06-7F8D-43F2-902E-F978E52A88FA}" dt="2020-05-30T17:32:39.229" v="1412" actId="165"/>
-          <ac:grpSpMkLst>
-            <pc:docMk/>
-            <pc:sldMk cId="1275928961" sldId="372"/>
-            <ac:grpSpMk id="120" creationId="{150A68D1-1CC1-4879-A373-E2A78A041BA0}"/>
-          </ac:grpSpMkLst>
-        </pc:grpChg>
-        <pc:cxnChg chg="mod">
-          <ac:chgData name="A57566093@fgv.edu.br" userId="1bb9ad80-ff55-479f-acd6-204a7fcb2663" providerId="ADAL" clId="{6EAA8C06-7F8D-43F2-902E-F978E52A88FA}" dt="2020-05-30T18:09:42.664" v="2152" actId="1035"/>
-          <ac:cxnSpMkLst>
-            <pc:docMk/>
-            <pc:sldMk cId="1275928961" sldId="372"/>
-            <ac:cxnSpMk id="13" creationId="{48D98D49-C026-4684-B519-FFB569F22EC7}"/>
-          </ac:cxnSpMkLst>
-        </pc:cxnChg>
-        <pc:cxnChg chg="add mod">
-          <ac:chgData name="A57566093@fgv.edu.br" userId="1bb9ad80-ff55-479f-acd6-204a7fcb2663" providerId="ADAL" clId="{6EAA8C06-7F8D-43F2-902E-F978E52A88FA}" dt="2020-05-30T17:56:42.628" v="1996" actId="1035"/>
-          <ac:cxnSpMkLst>
-            <pc:docMk/>
-            <pc:sldMk cId="1275928961" sldId="372"/>
-            <ac:cxnSpMk id="46" creationId="{E61903AA-0568-4B18-96E4-544B532DC342}"/>
-          </ac:cxnSpMkLst>
-        </pc:cxnChg>
-        <pc:cxnChg chg="mod">
-          <ac:chgData name="A57566093@fgv.edu.br" userId="1bb9ad80-ff55-479f-acd6-204a7fcb2663" providerId="ADAL" clId="{6EAA8C06-7F8D-43F2-902E-F978E52A88FA}" dt="2020-05-30T17:56:42.628" v="1996" actId="1035"/>
-          <ac:cxnSpMkLst>
-            <pc:docMk/>
-            <pc:sldMk cId="1275928961" sldId="372"/>
-            <ac:cxnSpMk id="83" creationId="{D2BB6D3C-AC2E-447F-96E3-7559E90478C4}"/>
-          </ac:cxnSpMkLst>
-        </pc:cxnChg>
-        <pc:cxnChg chg="mod topLvl">
-          <ac:chgData name="A57566093@fgv.edu.br" userId="1bb9ad80-ff55-479f-acd6-204a7fcb2663" providerId="ADAL" clId="{6EAA8C06-7F8D-43F2-902E-F978E52A88FA}" dt="2020-05-30T18:08:53.704" v="2140" actId="1038"/>
-          <ac:cxnSpMkLst>
-            <pc:docMk/>
-            <pc:sldMk cId="1275928961" sldId="372"/>
-            <ac:cxnSpMk id="85" creationId="{BA61902F-AEBD-4512-BCA0-F505437641C0}"/>
-          </ac:cxnSpMkLst>
-        </pc:cxnChg>
-        <pc:cxnChg chg="mod topLvl">
-          <ac:chgData name="A57566093@fgv.edu.br" userId="1bb9ad80-ff55-479f-acd6-204a7fcb2663" providerId="ADAL" clId="{6EAA8C06-7F8D-43F2-902E-F978E52A88FA}" dt="2020-05-30T17:56:42.628" v="1996" actId="1035"/>
-          <ac:cxnSpMkLst>
-            <pc:docMk/>
-            <pc:sldMk cId="1275928961" sldId="372"/>
-            <ac:cxnSpMk id="97" creationId="{0BEC07D7-3227-445D-B866-AAE84F38C61D}"/>
-          </ac:cxnSpMkLst>
-        </pc:cxnChg>
-        <pc:cxnChg chg="mod topLvl">
-          <ac:chgData name="A57566093@fgv.edu.br" userId="1bb9ad80-ff55-479f-acd6-204a7fcb2663" providerId="ADAL" clId="{6EAA8C06-7F8D-43F2-902E-F978E52A88FA}" dt="2020-05-30T17:56:42.628" v="1996" actId="1035"/>
-          <ac:cxnSpMkLst>
-            <pc:docMk/>
-            <pc:sldMk cId="1275928961" sldId="372"/>
-            <ac:cxnSpMk id="100" creationId="{FFB82AA6-02AA-40DA-B606-4A7EB51450C4}"/>
-          </ac:cxnSpMkLst>
-        </pc:cxnChg>
-        <pc:cxnChg chg="mod topLvl">
-          <ac:chgData name="A57566093@fgv.edu.br" userId="1bb9ad80-ff55-479f-acd6-204a7fcb2663" providerId="ADAL" clId="{6EAA8C06-7F8D-43F2-902E-F978E52A88FA}" dt="2020-05-30T17:56:42.628" v="1996" actId="1035"/>
-          <ac:cxnSpMkLst>
-            <pc:docMk/>
-            <pc:sldMk cId="1275928961" sldId="372"/>
-            <ac:cxnSpMk id="103" creationId="{5685F5D6-F17F-4053-BF7E-6612AEE91A09}"/>
-          </ac:cxnSpMkLst>
-        </pc:cxnChg>
-        <pc:cxnChg chg="mod topLvl">
-          <ac:chgData name="A57566093@fgv.edu.br" userId="1bb9ad80-ff55-479f-acd6-204a7fcb2663" providerId="ADAL" clId="{6EAA8C06-7F8D-43F2-902E-F978E52A88FA}" dt="2020-05-30T17:56:42.628" v="1996" actId="1035"/>
-          <ac:cxnSpMkLst>
-            <pc:docMk/>
-            <pc:sldMk cId="1275928961" sldId="372"/>
-            <ac:cxnSpMk id="106" creationId="{46A52265-7ED0-4ABA-9A15-12DC6DAF3090}"/>
-          </ac:cxnSpMkLst>
-        </pc:cxnChg>
-        <pc:cxnChg chg="mod ord topLvl">
-          <ac:chgData name="A57566093@fgv.edu.br" userId="1bb9ad80-ff55-479f-acd6-204a7fcb2663" providerId="ADAL" clId="{6EAA8C06-7F8D-43F2-902E-F978E52A88FA}" dt="2020-05-30T17:56:42.628" v="1996" actId="1035"/>
-          <ac:cxnSpMkLst>
-            <pc:docMk/>
-            <pc:sldMk cId="1275928961" sldId="372"/>
-            <ac:cxnSpMk id="111" creationId="{7DD6BB29-D712-4301-B328-B1ECA188EDCB}"/>
-          </ac:cxnSpMkLst>
-        </pc:cxnChg>
-        <pc:cxnChg chg="mod topLvl">
-          <ac:chgData name="A57566093@fgv.edu.br" userId="1bb9ad80-ff55-479f-acd6-204a7fcb2663" providerId="ADAL" clId="{6EAA8C06-7F8D-43F2-902E-F978E52A88FA}" dt="2020-05-30T17:56:42.628" v="1996" actId="1035"/>
-          <ac:cxnSpMkLst>
-            <pc:docMk/>
-            <pc:sldMk cId="1275928961" sldId="372"/>
-            <ac:cxnSpMk id="112" creationId="{BBADFCC0-EB87-4B33-B1E3-127EC200FAE2}"/>
-          </ac:cxnSpMkLst>
-        </pc:cxnChg>
-        <pc:cxnChg chg="mod topLvl">
-          <ac:chgData name="A57566093@fgv.edu.br" userId="1bb9ad80-ff55-479f-acd6-204a7fcb2663" providerId="ADAL" clId="{6EAA8C06-7F8D-43F2-902E-F978E52A88FA}" dt="2020-05-30T17:56:42.628" v="1996" actId="1035"/>
-          <ac:cxnSpMkLst>
-            <pc:docMk/>
-            <pc:sldMk cId="1275928961" sldId="372"/>
-            <ac:cxnSpMk id="115" creationId="{9A78E0C1-2E98-49EF-B7DB-418A32E77800}"/>
-          </ac:cxnSpMkLst>
-        </pc:cxnChg>
-        <pc:cxnChg chg="mod topLvl">
-          <ac:chgData name="A57566093@fgv.edu.br" userId="1bb9ad80-ff55-479f-acd6-204a7fcb2663" providerId="ADAL" clId="{6EAA8C06-7F8D-43F2-902E-F978E52A88FA}" dt="2020-05-30T17:56:42.628" v="1996" actId="1035"/>
-          <ac:cxnSpMkLst>
-            <pc:docMk/>
-            <pc:sldMk cId="1275928961" sldId="372"/>
-            <ac:cxnSpMk id="118" creationId="{CE2797D0-1D32-4DAA-9B9E-317E500836D9}"/>
-          </ac:cxnSpMkLst>
-        </pc:cxnChg>
-        <pc:cxnChg chg="mod topLvl">
-          <ac:chgData name="A57566093@fgv.edu.br" userId="1bb9ad80-ff55-479f-acd6-204a7fcb2663" providerId="ADAL" clId="{6EAA8C06-7F8D-43F2-902E-F978E52A88FA}" dt="2020-05-30T17:56:42.628" v="1996" actId="1035"/>
-          <ac:cxnSpMkLst>
-            <pc:docMk/>
-            <pc:sldMk cId="1275928961" sldId="372"/>
-            <ac:cxnSpMk id="121" creationId="{534EAC04-A78D-47F4-947F-CCA4C7224BE2}"/>
-          </ac:cxnSpMkLst>
-        </pc:cxnChg>
-        <pc:cxnChg chg="add mod ord">
-          <ac:chgData name="A57566093@fgv.edu.br" userId="1bb9ad80-ff55-479f-acd6-204a7fcb2663" providerId="ADAL" clId="{6EAA8C06-7F8D-43F2-902E-F978E52A88FA}" dt="2020-05-30T17:56:42.628" v="1996" actId="1035"/>
-          <ac:cxnSpMkLst>
-            <pc:docMk/>
-            <pc:sldMk cId="1275928961" sldId="372"/>
-            <ac:cxnSpMk id="137" creationId="{9583CB98-414A-4973-A053-0DA9A7EBF6E5}"/>
-          </ac:cxnSpMkLst>
-        </pc:cxnChg>
-        <pc:cxnChg chg="add del mod">
-          <ac:chgData name="A57566093@fgv.edu.br" userId="1bb9ad80-ff55-479f-acd6-204a7fcb2663" providerId="ADAL" clId="{6EAA8C06-7F8D-43F2-902E-F978E52A88FA}" dt="2020-05-30T17:22:57.451" v="1292" actId="478"/>
-          <ac:cxnSpMkLst>
-            <pc:docMk/>
-            <pc:sldMk cId="1275928961" sldId="372"/>
-            <ac:cxnSpMk id="146" creationId="{C5871181-465C-4DE9-A9AB-DFD35381EAEB}"/>
-          </ac:cxnSpMkLst>
-        </pc:cxnChg>
-        <pc:cxnChg chg="add mod">
-          <ac:chgData name="A57566093@fgv.edu.br" userId="1bb9ad80-ff55-479f-acd6-204a7fcb2663" providerId="ADAL" clId="{6EAA8C06-7F8D-43F2-902E-F978E52A88FA}" dt="2020-05-30T17:56:42.628" v="1996" actId="1035"/>
-          <ac:cxnSpMkLst>
-            <pc:docMk/>
-            <pc:sldMk cId="1275928961" sldId="372"/>
-            <ac:cxnSpMk id="151" creationId="{A102E9E0-C39A-4B76-AC25-248C244CD0CC}"/>
-          </ac:cxnSpMkLst>
-        </pc:cxnChg>
-      </pc:sldChg>
-    </pc:docChg>
-  </pc:docChgLst>
-  <pc:docChgLst>
-    <pc:chgData name="Leandro de Oliveira Daniel" userId="S::a57622988@fgv.edu.br::ff7f7cd4-1074-435c-a956-4a1fef029c30" providerId="AD" clId="Web-{576D1934-300F-FC23-9CD7-6CCE5F40640F}"/>
-    <pc:docChg chg="modSld">
-      <pc:chgData name="Leandro de Oliveira Daniel" userId="S::a57622988@fgv.edu.br::ff7f7cd4-1074-435c-a956-4a1fef029c30" providerId="AD" clId="Web-{576D1934-300F-FC23-9CD7-6CCE5F40640F}" dt="2020-05-30T21:49:02.200" v="210" actId="20577"/>
-      <pc:docMkLst>
-        <pc:docMk/>
-      </pc:docMkLst>
-      <pc:sldChg chg="modSp">
-        <pc:chgData name="Leandro de Oliveira Daniel" userId="S::a57622988@fgv.edu.br::ff7f7cd4-1074-435c-a956-4a1fef029c30" providerId="AD" clId="Web-{576D1934-300F-FC23-9CD7-6CCE5F40640F}" dt="2020-05-30T21:37:14.052" v="8" actId="20577"/>
-        <pc:sldMkLst>
-          <pc:docMk/>
-          <pc:sldMk cId="1275928961" sldId="372"/>
-        </pc:sldMkLst>
-        <pc:spChg chg="mod">
-          <ac:chgData name="Leandro de Oliveira Daniel" userId="S::a57622988@fgv.edu.br::ff7f7cd4-1074-435c-a956-4a1fef029c30" providerId="AD" clId="Web-{576D1934-300F-FC23-9CD7-6CCE5F40640F}" dt="2020-05-30T21:36:58.052" v="4" actId="20577"/>
-          <ac:spMkLst>
-            <pc:docMk/>
-            <pc:sldMk cId="1275928961" sldId="372"/>
-            <ac:spMk id="52" creationId="{0475A7DF-361A-4873-B74C-76D203352350}"/>
-          </ac:spMkLst>
-        </pc:spChg>
-        <pc:spChg chg="mod">
-          <ac:chgData name="Leandro de Oliveira Daniel" userId="S::a57622988@fgv.edu.br::ff7f7cd4-1074-435c-a956-4a1fef029c30" providerId="AD" clId="Web-{576D1934-300F-FC23-9CD7-6CCE5F40640F}" dt="2020-05-30T21:37:05.942" v="6" actId="20577"/>
-          <ac:spMkLst>
-            <pc:docMk/>
-            <pc:sldMk cId="1275928961" sldId="372"/>
-            <ac:spMk id="141" creationId="{66785AF6-978F-4F12-BD3B-A23E9D9412F1}"/>
-          </ac:spMkLst>
-        </pc:spChg>
-        <pc:spChg chg="mod">
-          <ac:chgData name="Leandro de Oliveira Daniel" userId="S::a57622988@fgv.edu.br::ff7f7cd4-1074-435c-a956-4a1fef029c30" providerId="AD" clId="Web-{576D1934-300F-FC23-9CD7-6CCE5F40640F}" dt="2020-05-30T21:37:08.833" v="7" actId="20577"/>
-          <ac:spMkLst>
-            <pc:docMk/>
-            <pc:sldMk cId="1275928961" sldId="372"/>
-            <ac:spMk id="145" creationId="{8A0DEF7D-8FCD-4543-AB0B-C6450C02E31F}"/>
-          </ac:spMkLst>
-        </pc:spChg>
-        <pc:spChg chg="mod">
-          <ac:chgData name="Leandro de Oliveira Daniel" userId="S::a57622988@fgv.edu.br::ff7f7cd4-1074-435c-a956-4a1fef029c30" providerId="AD" clId="Web-{576D1934-300F-FC23-9CD7-6CCE5F40640F}" dt="2020-05-30T21:37:03.349" v="5" actId="20577"/>
-          <ac:spMkLst>
-            <pc:docMk/>
-            <pc:sldMk cId="1275928961" sldId="372"/>
-            <ac:spMk id="148" creationId="{B0B65378-071C-4A53-AD0B-EC390F3C2EA0}"/>
-          </ac:spMkLst>
-        </pc:spChg>
-        <pc:spChg chg="mod">
-          <ac:chgData name="Leandro de Oliveira Daniel" userId="S::a57622988@fgv.edu.br::ff7f7cd4-1074-435c-a956-4a1fef029c30" providerId="AD" clId="Web-{576D1934-300F-FC23-9CD7-6CCE5F40640F}" dt="2020-05-30T21:36:41.068" v="0" actId="20577"/>
-          <ac:spMkLst>
-            <pc:docMk/>
-            <pc:sldMk cId="1275928961" sldId="372"/>
-            <ac:spMk id="166" creationId="{7F54744D-34EB-4337-91F4-EFBBC8079451}"/>
-          </ac:spMkLst>
-        </pc:spChg>
-        <pc:spChg chg="mod">
-          <ac:chgData name="Leandro de Oliveira Daniel" userId="S::a57622988@fgv.edu.br::ff7f7cd4-1074-435c-a956-4a1fef029c30" providerId="AD" clId="Web-{576D1934-300F-FC23-9CD7-6CCE5F40640F}" dt="2020-05-30T21:36:49.896" v="3" actId="20577"/>
-          <ac:spMkLst>
-            <pc:docMk/>
-            <pc:sldMk cId="1275928961" sldId="372"/>
-            <ac:spMk id="167" creationId="{DE1013B5-4DDB-41CE-B97E-1E9C6372D398}"/>
-          </ac:spMkLst>
-        </pc:spChg>
-        <pc:spChg chg="mod">
-          <ac:chgData name="Leandro de Oliveira Daniel" userId="S::a57622988@fgv.edu.br::ff7f7cd4-1074-435c-a956-4a1fef029c30" providerId="AD" clId="Web-{576D1934-300F-FC23-9CD7-6CCE5F40640F}" dt="2020-05-30T21:37:14.052" v="8" actId="20577"/>
-          <ac:spMkLst>
-            <pc:docMk/>
-            <pc:sldMk cId="1275928961" sldId="372"/>
-            <ac:spMk id="168" creationId="{5FB18791-F3A5-460E-A6AF-F86AFE353D57}"/>
-          </ac:spMkLst>
-        </pc:spChg>
-        <pc:spChg chg="mod">
-          <ac:chgData name="Leandro de Oliveira Daniel" userId="S::a57622988@fgv.edu.br::ff7f7cd4-1074-435c-a956-4a1fef029c30" providerId="AD" clId="Web-{576D1934-300F-FC23-9CD7-6CCE5F40640F}" dt="2020-05-30T21:36:46.521" v="2" actId="20577"/>
-          <ac:spMkLst>
-            <pc:docMk/>
-            <pc:sldMk cId="1275928961" sldId="372"/>
-            <ac:spMk id="170" creationId="{CD412FEA-4730-486F-879F-6D614467BF94}"/>
-          </ac:spMkLst>
-        </pc:spChg>
-        <pc:spChg chg="mod">
-          <ac:chgData name="Leandro de Oliveira Daniel" userId="S::a57622988@fgv.edu.br::ff7f7cd4-1074-435c-a956-4a1fef029c30" providerId="AD" clId="Web-{576D1934-300F-FC23-9CD7-6CCE5F40640F}" dt="2020-05-30T21:36:43.755" v="1" actId="20577"/>
-          <ac:spMkLst>
-            <pc:docMk/>
-            <pc:sldMk cId="1275928961" sldId="372"/>
-            <ac:spMk id="172" creationId="{552D19B7-2205-4393-8BC3-D10B6D0AF5B0}"/>
-          </ac:spMkLst>
-        </pc:spChg>
-      </pc:sldChg>
-      <pc:sldChg chg="modSp">
-        <pc:chgData name="Leandro de Oliveira Daniel" userId="S::a57622988@fgv.edu.br::ff7f7cd4-1074-435c-a956-4a1fef029c30" providerId="AD" clId="Web-{576D1934-300F-FC23-9CD7-6CCE5F40640F}" dt="2020-05-30T21:48:58.840" v="208" actId="20577"/>
-        <pc:sldMkLst>
-          <pc:docMk/>
-          <pc:sldMk cId="2356196915" sldId="377"/>
-        </pc:sldMkLst>
-        <pc:spChg chg="mod">
-          <ac:chgData name="Leandro de Oliveira Daniel" userId="S::a57622988@fgv.edu.br::ff7f7cd4-1074-435c-a956-4a1fef029c30" providerId="AD" clId="Web-{576D1934-300F-FC23-9CD7-6CCE5F40640F}" dt="2020-05-30T21:48:58.840" v="208" actId="20577"/>
-          <ac:spMkLst>
-            <pc:docMk/>
-            <pc:sldMk cId="2356196915" sldId="377"/>
-            <ac:spMk id="7" creationId="{CE3762FA-4222-4801-A067-946EE71C9A52}"/>
-          </ac:spMkLst>
-        </pc:spChg>
-      </pc:sldChg>
-    </pc:docChg>
-  </pc:docChgLst>
-  <pc:docChgLst>
-    <pc:chgData name="Leandro de Oliveira Daniel" userId="S::a57622988@fgv.edu.br::ff7f7cd4-1074-435c-a956-4a1fef029c30" providerId="AD" clId="Web-{1E36F6F0-6EE1-4B32-A79A-91B9EDD8AA61}"/>
-    <pc:docChg chg="modSld">
-      <pc:chgData name="Leandro de Oliveira Daniel" userId="S::a57622988@fgv.edu.br::ff7f7cd4-1074-435c-a956-4a1fef029c30" providerId="AD" clId="Web-{1E36F6F0-6EE1-4B32-A79A-91B9EDD8AA61}" dt="2020-05-25T21:43:26.234" v="5" actId="20577"/>
-      <pc:docMkLst>
-        <pc:docMk/>
-      </pc:docMkLst>
-      <pc:sldChg chg="modSp">
-        <pc:chgData name="Leandro de Oliveira Daniel" userId="S::a57622988@fgv.edu.br::ff7f7cd4-1074-435c-a956-4a1fef029c30" providerId="AD" clId="Web-{1E36F6F0-6EE1-4B32-A79A-91B9EDD8AA61}" dt="2020-05-25T21:43:26.234" v="4" actId="20577"/>
-        <pc:sldMkLst>
-          <pc:docMk/>
-          <pc:sldMk cId="3953857876" sldId="361"/>
-        </pc:sldMkLst>
-        <pc:spChg chg="mod">
-          <ac:chgData name="Leandro de Oliveira Daniel" userId="S::a57622988@fgv.edu.br::ff7f7cd4-1074-435c-a956-4a1fef029c30" providerId="AD" clId="Web-{1E36F6F0-6EE1-4B32-A79A-91B9EDD8AA61}" dt="2020-05-25T21:43:26.234" v="4" actId="20577"/>
-          <ac:spMkLst>
-            <pc:docMk/>
-            <pc:sldMk cId="3953857876" sldId="361"/>
-            <ac:spMk id="4" creationId="{84CA2768-938F-4EEA-B0DD-BAF05149B6F5}"/>
-          </ac:spMkLst>
-        </pc:spChg>
-      </pc:sldChg>
-    </pc:docChg>
-  </pc:docChgLst>
-  <pc:docChgLst>
-    <pc:chgData name="Leandro Daniel" userId="682bb4abc622d264" providerId="LiveId" clId="{0C927506-5143-4A7D-B285-178AAC9CF657}"/>
-    <pc:docChg chg="undo custSel addSld modSld">
-      <pc:chgData name="Leandro Daniel" userId="682bb4abc622d264" providerId="LiveId" clId="{0C927506-5143-4A7D-B285-178AAC9CF657}" dt="2020-05-24T21:23:35.887" v="2500" actId="478"/>
-      <pc:docMkLst>
-        <pc:docMk/>
-      </pc:docMkLst>
-      <pc:sldChg chg="addSp modSp mod">
-        <pc:chgData name="Leandro Daniel" userId="682bb4abc622d264" providerId="LiveId" clId="{0C927506-5143-4A7D-B285-178AAC9CF657}" dt="2020-05-24T20:06:37.345" v="1071" actId="20577"/>
-        <pc:sldMkLst>
-          <pc:docMk/>
-          <pc:sldMk cId="351260889" sldId="346"/>
-        </pc:sldMkLst>
-        <pc:spChg chg="mod">
-          <ac:chgData name="Leandro Daniel" userId="682bb4abc622d264" providerId="LiveId" clId="{0C927506-5143-4A7D-B285-178AAC9CF657}" dt="2020-05-24T20:06:37.345" v="1071" actId="20577"/>
-          <ac:spMkLst>
-            <pc:docMk/>
-            <pc:sldMk cId="351260889" sldId="346"/>
-            <ac:spMk id="6" creationId="{D5F67441-A755-4247-851C-41974715F282}"/>
-          </ac:spMkLst>
-        </pc:spChg>
-        <pc:spChg chg="add mod">
-          <ac:chgData name="Leandro Daniel" userId="682bb4abc622d264" providerId="LiveId" clId="{0C927506-5143-4A7D-B285-178AAC9CF657}" dt="2020-05-24T19:13:55.199" v="610" actId="20577"/>
-          <ac:spMkLst>
-            <pc:docMk/>
-            <pc:sldMk cId="351260889" sldId="346"/>
-            <ac:spMk id="7" creationId="{F98E677B-3EA7-49FD-AAB2-91F960419DAB}"/>
-          </ac:spMkLst>
-        </pc:spChg>
-      </pc:sldChg>
-      <pc:sldChg chg="modSp mod">
-        <pc:chgData name="Leandro Daniel" userId="682bb4abc622d264" providerId="LiveId" clId="{0C927506-5143-4A7D-B285-178AAC9CF657}" dt="2020-05-24T21:22:37.469" v="2498" actId="122"/>
-        <pc:sldMkLst>
-          <pc:docMk/>
-          <pc:sldMk cId="679871842" sldId="351"/>
-        </pc:sldMkLst>
-        <pc:spChg chg="mod">
-          <ac:chgData name="Leandro Daniel" userId="682bb4abc622d264" providerId="LiveId" clId="{0C927506-5143-4A7D-B285-178AAC9CF657}" dt="2020-05-24T21:22:37.469" v="2498" actId="122"/>
-          <ac:spMkLst>
-            <pc:docMk/>
-            <pc:sldMk cId="679871842" sldId="351"/>
-            <ac:spMk id="2" creationId="{70F687BA-32A2-41BC-B72A-F28209A7F473}"/>
-          </ac:spMkLst>
-        </pc:spChg>
-        <pc:spChg chg="mod">
-          <ac:chgData name="Leandro Daniel" userId="682bb4abc622d264" providerId="LiveId" clId="{0C927506-5143-4A7D-B285-178AAC9CF657}" dt="2020-05-24T20:52:34.557" v="2351" actId="207"/>
-          <ac:spMkLst>
-            <pc:docMk/>
-            <pc:sldMk cId="679871842" sldId="351"/>
-            <ac:spMk id="3" creationId="{94B768D7-96B0-41DF-9630-0D308384D261}"/>
-          </ac:spMkLst>
-        </pc:spChg>
-      </pc:sldChg>
-      <pc:sldChg chg="addSp delSp modSp add mod">
-        <pc:chgData name="Leandro Daniel" userId="682bb4abc622d264" providerId="LiveId" clId="{0C927506-5143-4A7D-B285-178AAC9CF657}" dt="2020-05-24T20:59:51.439" v="2353" actId="1076"/>
-        <pc:sldMkLst>
-          <pc:docMk/>
-          <pc:sldMk cId="3921174963" sldId="371"/>
-        </pc:sldMkLst>
-        <pc:spChg chg="del mod">
-          <ac:chgData name="Leandro Daniel" userId="682bb4abc622d264" providerId="LiveId" clId="{0C927506-5143-4A7D-B285-178AAC9CF657}" dt="2020-05-24T19:20:16.220" v="922" actId="21"/>
-          <ac:spMkLst>
-            <pc:docMk/>
-            <pc:sldMk cId="3921174963" sldId="371"/>
-            <ac:spMk id="6" creationId="{D5F67441-A755-4247-851C-41974715F282}"/>
-          </ac:spMkLst>
-        </pc:spChg>
-        <pc:spChg chg="add mod">
-          <ac:chgData name="Leandro Daniel" userId="682bb4abc622d264" providerId="LiveId" clId="{0C927506-5143-4A7D-B285-178AAC9CF657}" dt="2020-05-24T19:13:50.901" v="609" actId="20577"/>
-          <ac:spMkLst>
-            <pc:docMk/>
-            <pc:sldMk cId="3921174963" sldId="371"/>
-            <ac:spMk id="7" creationId="{6F061871-FDA0-491B-B84B-B5AB0970885B}"/>
-          </ac:spMkLst>
-        </pc:spChg>
-        <pc:spChg chg="add del mod">
-          <ac:chgData name="Leandro Daniel" userId="682bb4abc622d264" providerId="LiveId" clId="{0C927506-5143-4A7D-B285-178AAC9CF657}" dt="2020-05-24T19:20:16.220" v="922" actId="21"/>
-          <ac:spMkLst>
-            <pc:docMk/>
-            <pc:sldMk cId="3921174963" sldId="371"/>
-            <ac:spMk id="11" creationId="{1A672CB9-5A04-4176-9D9E-55D7A9EF3CE4}"/>
-          </ac:spMkLst>
-        </pc:spChg>
-        <pc:spChg chg="add mod">
-          <ac:chgData name="Leandro Daniel" userId="682bb4abc622d264" providerId="LiveId" clId="{0C927506-5143-4A7D-B285-178AAC9CF657}" dt="2020-05-24T20:13:46.032" v="1207" actId="20577"/>
-          <ac:spMkLst>
-            <pc:docMk/>
-            <pc:sldMk cId="3921174963" sldId="371"/>
-            <ac:spMk id="14" creationId="{07CA8BF6-9A49-441F-836D-9072850A59D4}"/>
-          </ac:spMkLst>
-        </pc:spChg>
-        <pc:spChg chg="add mod">
-          <ac:chgData name="Leandro Daniel" userId="682bb4abc622d264" providerId="LiveId" clId="{0C927506-5143-4A7D-B285-178AAC9CF657}" dt="2020-05-24T20:11:30.806" v="1073" actId="20577"/>
-          <ac:spMkLst>
-            <pc:docMk/>
-            <pc:sldMk cId="3921174963" sldId="371"/>
-            <ac:spMk id="18" creationId="{E05EE9CB-CEAD-49FB-B917-F3911C866716}"/>
-          </ac:spMkLst>
-        </pc:spChg>
-        <pc:graphicFrameChg chg="add del mod">
-          <ac:chgData name="Leandro Daniel" userId="682bb4abc622d264" providerId="LiveId" clId="{0C927506-5143-4A7D-B285-178AAC9CF657}" dt="2020-05-24T19:08:11.585" v="588" actId="478"/>
-          <ac:graphicFrameMkLst>
-            <pc:docMk/>
-            <pc:sldMk cId="3921174963" sldId="371"/>
-            <ac:graphicFrameMk id="3" creationId="{439B052B-7ADE-4F71-97D8-530EF1CF479F}"/>
-          </ac:graphicFrameMkLst>
-        </pc:graphicFrameChg>
-        <pc:picChg chg="add mod">
-          <ac:chgData name="Leandro Daniel" userId="682bb4abc622d264" providerId="LiveId" clId="{0C927506-5143-4A7D-B285-178AAC9CF657}" dt="2020-05-24T20:59:51.439" v="2353" actId="1076"/>
-          <ac:picMkLst>
-            <pc:docMk/>
-            <pc:sldMk cId="3921174963" sldId="371"/>
-            <ac:picMk id="3" creationId="{36078AE8-5334-447D-AD43-BB3AF83E359B}"/>
-          </ac:picMkLst>
-        </pc:picChg>
-        <pc:picChg chg="add del mod">
-          <ac:chgData name="Leandro Daniel" userId="682bb4abc622d264" providerId="LiveId" clId="{0C927506-5143-4A7D-B285-178AAC9CF657}" dt="2020-05-24T19:20:16.220" v="922" actId="21"/>
-          <ac:picMkLst>
-            <pc:docMk/>
-            <pc:sldMk cId="3921174963" sldId="371"/>
-            <ac:picMk id="8" creationId="{AC909D0D-3174-4A96-ACF9-9162A8A5ACEC}"/>
-          </ac:picMkLst>
-        </pc:picChg>
-        <pc:picChg chg="add del mod">
-          <ac:chgData name="Leandro Daniel" userId="682bb4abc622d264" providerId="LiveId" clId="{0C927506-5143-4A7D-B285-178AAC9CF657}" dt="2020-05-24T19:20:16.220" v="922" actId="21"/>
-          <ac:picMkLst>
-            <pc:docMk/>
-            <pc:sldMk cId="3921174963" sldId="371"/>
-            <ac:picMk id="9" creationId="{4E6ABAF2-18C9-4203-BEA1-09AE83E51337}"/>
-          </ac:picMkLst>
-        </pc:picChg>
-        <pc:picChg chg="add del mod">
-          <ac:chgData name="Leandro Daniel" userId="682bb4abc622d264" providerId="LiveId" clId="{0C927506-5143-4A7D-B285-178AAC9CF657}" dt="2020-05-24T19:20:16.220" v="922" actId="21"/>
-          <ac:picMkLst>
-            <pc:docMk/>
-            <pc:sldMk cId="3921174963" sldId="371"/>
-            <ac:picMk id="10" creationId="{98AB35B6-C01B-4BC7-9234-A61B0A25D67B}"/>
-          </ac:picMkLst>
-        </pc:picChg>
-        <pc:picChg chg="add mod">
-          <ac:chgData name="Leandro Daniel" userId="682bb4abc622d264" providerId="LiveId" clId="{0C927506-5143-4A7D-B285-178AAC9CF657}" dt="2020-05-24T19:20:21.954" v="924"/>
-          <ac:picMkLst>
-            <pc:docMk/>
-            <pc:sldMk cId="3921174963" sldId="371"/>
-            <ac:picMk id="15" creationId="{2F22A74C-3364-4DD1-BBA7-38E977DAC637}"/>
-          </ac:picMkLst>
-        </pc:picChg>
-        <pc:picChg chg="add mod">
-          <ac:chgData name="Leandro Daniel" userId="682bb4abc622d264" providerId="LiveId" clId="{0C927506-5143-4A7D-B285-178AAC9CF657}" dt="2020-05-24T20:05:01.027" v="943" actId="408"/>
-          <ac:picMkLst>
-            <pc:docMk/>
-            <pc:sldMk cId="3921174963" sldId="371"/>
-            <ac:picMk id="16" creationId="{B1A27C00-ABA4-4EE5-95D2-97D339292616}"/>
-          </ac:picMkLst>
-        </pc:picChg>
-        <pc:picChg chg="add mod">
-          <ac:chgData name="Leandro Daniel" userId="682bb4abc622d264" providerId="LiveId" clId="{0C927506-5143-4A7D-B285-178AAC9CF657}" dt="2020-05-24T20:04:51.283" v="941" actId="1076"/>
-          <ac:picMkLst>
-            <pc:docMk/>
-            <pc:sldMk cId="3921174963" sldId="371"/>
-            <ac:picMk id="17" creationId="{D6CEEE49-8720-460A-9FA7-E01A051D6D3D}"/>
-          </ac:picMkLst>
-        </pc:picChg>
-        <pc:cxnChg chg="add del mod">
-          <ac:chgData name="Leandro Daniel" userId="682bb4abc622d264" providerId="LiveId" clId="{0C927506-5143-4A7D-B285-178AAC9CF657}" dt="2020-05-24T19:20:16.220" v="922" actId="21"/>
-          <ac:cxnSpMkLst>
-            <pc:docMk/>
-            <pc:sldMk cId="3921174963" sldId="371"/>
-            <ac:cxnSpMk id="13" creationId="{461DF850-D789-480D-A92B-6F9C8AB2ED91}"/>
-          </ac:cxnSpMkLst>
-        </pc:cxnChg>
-        <pc:cxnChg chg="add mod">
-          <ac:chgData name="Leandro Daniel" userId="682bb4abc622d264" providerId="LiveId" clId="{0C927506-5143-4A7D-B285-178AAC9CF657}" dt="2020-05-24T19:20:21.954" v="924"/>
-          <ac:cxnSpMkLst>
-            <pc:docMk/>
-            <pc:sldMk cId="3921174963" sldId="371"/>
-            <ac:cxnSpMk id="19" creationId="{5E198959-BDE7-4419-BDC5-99C20E0B5EC8}"/>
-          </ac:cxnSpMkLst>
-        </pc:cxnChg>
-      </pc:sldChg>
-      <pc:sldChg chg="addSp delSp modSp add mod">
-        <pc:chgData name="Leandro Daniel" userId="682bb4abc622d264" providerId="LiveId" clId="{0C927506-5143-4A7D-B285-178AAC9CF657}" dt="2020-05-24T21:23:35.887" v="2500" actId="478"/>
-        <pc:sldMkLst>
-          <pc:docMk/>
-          <pc:sldMk cId="1275928961" sldId="372"/>
-        </pc:sldMkLst>
-        <pc:spChg chg="add mod">
-          <ac:chgData name="Leandro Daniel" userId="682bb4abc622d264" providerId="LiveId" clId="{0C927506-5143-4A7D-B285-178AAC9CF657}" dt="2020-05-24T21:08:40.557" v="2372" actId="114"/>
-          <ac:spMkLst>
-            <pc:docMk/>
-            <pc:sldMk cId="1275928961" sldId="372"/>
-            <ac:spMk id="6" creationId="{AD1205DC-63D6-44A4-B20E-BC9057891E98}"/>
-          </ac:spMkLst>
-        </pc:spChg>
-        <pc:spChg chg="del">
-          <ac:chgData name="Leandro Daniel" userId="682bb4abc622d264" providerId="LiveId" clId="{0C927506-5143-4A7D-B285-178AAC9CF657}" dt="2020-05-24T19:20:11.151" v="921" actId="478"/>
-          <ac:spMkLst>
-            <pc:docMk/>
-            <pc:sldMk cId="1275928961" sldId="372"/>
-            <ac:spMk id="6" creationId="{D5F67441-A755-4247-851C-41974715F282}"/>
-          </ac:spMkLst>
-        </pc:spChg>
-        <pc:spChg chg="mod">
-          <ac:chgData name="Leandro Daniel" userId="682bb4abc622d264" providerId="LiveId" clId="{0C927506-5143-4A7D-B285-178AAC9CF657}" dt="2020-05-24T19:13:45.033" v="608" actId="20577"/>
-          <ac:spMkLst>
-            <pc:docMk/>
-            <pc:sldMk cId="1275928961" sldId="372"/>
-            <ac:spMk id="7" creationId="{6F061871-FDA0-491B-B84B-B5AB0970885B}"/>
-          </ac:spMkLst>
-        </pc:spChg>
-        <pc:spChg chg="add del mod">
-          <ac:chgData name="Leandro Daniel" userId="682bb4abc622d264" providerId="LiveId" clId="{0C927506-5143-4A7D-B285-178AAC9CF657}" dt="2020-05-24T19:20:30.316" v="925" actId="478"/>
-          <ac:spMkLst>
-            <pc:docMk/>
-            <pc:sldMk cId="1275928961" sldId="372"/>
-            <ac:spMk id="11" creationId="{96D2EE0A-E21F-4805-9CCD-AE4D58E613E5}"/>
-          </ac:spMkLst>
-        </pc:spChg>
-        <pc:spChg chg="add del mod">
-          <ac:chgData name="Leandro Daniel" userId="682bb4abc622d264" providerId="LiveId" clId="{0C927506-5143-4A7D-B285-178AAC9CF657}" dt="2020-05-24T19:20:30.316" v="925" actId="478"/>
-          <ac:spMkLst>
-            <pc:docMk/>
-            <pc:sldMk cId="1275928961" sldId="372"/>
-            <ac:spMk id="15" creationId="{101961AE-8D08-4106-ACBA-2F8DAAC4EC0F}"/>
-          </ac:spMkLst>
-        </pc:spChg>
-        <pc:spChg chg="add mod">
-          <ac:chgData name="Leandro Daniel" userId="682bb4abc622d264" providerId="LiveId" clId="{0C927506-5143-4A7D-B285-178AAC9CF657}" dt="2020-05-24T21:10:27.850" v="2392" actId="20577"/>
-          <ac:spMkLst>
-            <pc:docMk/>
-            <pc:sldMk cId="1275928961" sldId="372"/>
-            <ac:spMk id="17" creationId="{0EACA767-5D74-4C51-98B7-763F041F495E}"/>
-          </ac:spMkLst>
-        </pc:spChg>
-        <pc:grpChg chg="add mod">
-          <ac:chgData name="Leandro Daniel" userId="682bb4abc622d264" providerId="LiveId" clId="{0C927506-5143-4A7D-B285-178AAC9CF657}" dt="2020-05-24T21:08:29.985" v="2371" actId="164"/>
-          <ac:grpSpMkLst>
-            <pc:docMk/>
-            <pc:sldMk cId="1275928961" sldId="372"/>
-            <ac:grpSpMk id="8" creationId="{1E163097-A71F-4360-857F-CDF7256C8A07}"/>
-          </ac:grpSpMkLst>
-        </pc:grpChg>
-        <pc:picChg chg="add mod">
-          <ac:chgData name="Leandro Daniel" userId="682bb4abc622d264" providerId="LiveId" clId="{0C927506-5143-4A7D-B285-178AAC9CF657}" dt="2020-05-24T21:08:29.985" v="2371" actId="164"/>
-          <ac:picMkLst>
-            <pc:docMk/>
-            <pc:sldMk cId="1275928961" sldId="372"/>
-            <ac:picMk id="4" creationId="{2AFB5B40-0E71-438C-A693-F6960B64154E}"/>
-          </ac:picMkLst>
-        </pc:picChg>
-        <pc:picChg chg="del">
-          <ac:chgData name="Leandro Daniel" userId="682bb4abc622d264" providerId="LiveId" clId="{0C927506-5143-4A7D-B285-178AAC9CF657}" dt="2020-05-24T19:20:11.151" v="921" actId="478"/>
-          <ac:picMkLst>
-            <pc:docMk/>
-            <pc:sldMk cId="1275928961" sldId="372"/>
-            <ac:picMk id="8" creationId="{AC909D0D-3174-4A96-ACF9-9162A8A5ACEC}"/>
-          </ac:picMkLst>
-        </pc:picChg>
-        <pc:picChg chg="del">
-          <ac:chgData name="Leandro Daniel" userId="682bb4abc622d264" providerId="LiveId" clId="{0C927506-5143-4A7D-B285-178AAC9CF657}" dt="2020-05-24T19:20:11.151" v="921" actId="478"/>
-          <ac:picMkLst>
-            <pc:docMk/>
-            <pc:sldMk cId="1275928961" sldId="372"/>
-            <ac:picMk id="9" creationId="{4E6ABAF2-18C9-4203-BEA1-09AE83E51337}"/>
-          </ac:picMkLst>
-        </pc:picChg>
-        <pc:picChg chg="add del mod">
-          <ac:chgData name="Leandro Daniel" userId="682bb4abc622d264" providerId="LiveId" clId="{0C927506-5143-4A7D-B285-178AAC9CF657}" dt="2020-05-24T21:23:35.887" v="2500" actId="478"/>
-          <ac:picMkLst>
-            <pc:docMk/>
-            <pc:sldMk cId="1275928961" sldId="372"/>
-            <ac:picMk id="9" creationId="{AB2D39B2-8115-48EF-8277-7854546058D4}"/>
-          </ac:picMkLst>
-        </pc:picChg>
-        <pc:picChg chg="del">
-          <ac:chgData name="Leandro Daniel" userId="682bb4abc622d264" providerId="LiveId" clId="{0C927506-5143-4A7D-B285-178AAC9CF657}" dt="2020-05-24T19:20:11.151" v="921" actId="478"/>
-          <ac:picMkLst>
-            <pc:docMk/>
-            <pc:sldMk cId="1275928961" sldId="372"/>
-            <ac:picMk id="10" creationId="{98AB35B6-C01B-4BC7-9234-A61B0A25D67B}"/>
-          </ac:picMkLst>
-        </pc:picChg>
-        <pc:picChg chg="add del mod">
-          <ac:chgData name="Leandro Daniel" userId="682bb4abc622d264" providerId="LiveId" clId="{0C927506-5143-4A7D-B285-178AAC9CF657}" dt="2020-05-24T19:20:30.316" v="925" actId="478"/>
-          <ac:picMkLst>
-            <pc:docMk/>
-            <pc:sldMk cId="1275928961" sldId="372"/>
-            <ac:picMk id="12" creationId="{6FBC6350-2952-468E-A4A5-5EAFFA9C1274}"/>
-          </ac:picMkLst>
-        </pc:picChg>
-        <pc:picChg chg="add del mod">
-          <ac:chgData name="Leandro Daniel" userId="682bb4abc622d264" providerId="LiveId" clId="{0C927506-5143-4A7D-B285-178AAC9CF657}" dt="2020-05-24T19:20:30.316" v="925" actId="478"/>
-          <ac:picMkLst>
-            <pc:docMk/>
-            <pc:sldMk cId="1275928961" sldId="372"/>
-            <ac:picMk id="13" creationId="{BAB79A15-E753-407A-B7F2-23D620DE7067}"/>
-          </ac:picMkLst>
-        </pc:picChg>
-        <pc:picChg chg="add del mod">
-          <ac:chgData name="Leandro Daniel" userId="682bb4abc622d264" providerId="LiveId" clId="{0C927506-5143-4A7D-B285-178AAC9CF657}" dt="2020-05-24T19:20:30.316" v="925" actId="478"/>
-          <ac:picMkLst>
-            <pc:docMk/>
-            <pc:sldMk cId="1275928961" sldId="372"/>
-            <ac:picMk id="14" creationId="{A4711A5A-BE4E-4692-9C78-47ACAF315FE3}"/>
-          </ac:picMkLst>
-        </pc:picChg>
-        <pc:cxnChg chg="add del mod">
-          <ac:chgData name="Leandro Daniel" userId="682bb4abc622d264" providerId="LiveId" clId="{0C927506-5143-4A7D-B285-178AAC9CF657}" dt="2020-05-24T19:20:30.316" v="925" actId="478"/>
-          <ac:cxnSpMkLst>
-            <pc:docMk/>
-            <pc:sldMk cId="1275928961" sldId="372"/>
-            <ac:cxnSpMk id="16" creationId="{EA648973-512C-4670-9344-A687D2E41ED4}"/>
-          </ac:cxnSpMkLst>
-        </pc:cxnChg>
-      </pc:sldChg>
-    </pc:docChg>
-  </pc:docChgLst>
-  <pc:docChgLst>
-    <pc:chgData name="Leandro Daniel" userId="682bb4abc622d264" providerId="LiveId" clId="{95C6711F-C4DC-4686-A46D-0F032EFB60A9}"/>
-    <pc:docChg chg="modSld">
-      <pc:chgData name="Leandro Daniel" userId="682bb4abc622d264" providerId="LiveId" clId="{95C6711F-C4DC-4686-A46D-0F032EFB60A9}" dt="2020-06-01T22:00:24.671" v="0" actId="20577"/>
-      <pc:docMkLst>
-        <pc:docMk/>
-      </pc:docMkLst>
-      <pc:sldChg chg="modSp mod">
-        <pc:chgData name="Leandro Daniel" userId="682bb4abc622d264" providerId="LiveId" clId="{95C6711F-C4DC-4686-A46D-0F032EFB60A9}" dt="2020-06-01T22:00:24.671" v="0" actId="20577"/>
-        <pc:sldMkLst>
-          <pc:docMk/>
-          <pc:sldMk cId="679871842" sldId="351"/>
-        </pc:sldMkLst>
-        <pc:spChg chg="mod">
-          <ac:chgData name="Leandro Daniel" userId="682bb4abc622d264" providerId="LiveId" clId="{95C6711F-C4DC-4686-A46D-0F032EFB60A9}" dt="2020-06-01T22:00:24.671" v="0" actId="20577"/>
-          <ac:spMkLst>
-            <pc:docMk/>
-            <pc:sldMk cId="679871842" sldId="351"/>
-            <ac:spMk id="2" creationId="{70F687BA-32A2-41BC-B72A-F28209A7F473}"/>
-          </ac:spMkLst>
-        </pc:spChg>
-      </pc:sldChg>
-    </pc:docChg>
-  </pc:docChgLst>
-  <pc:docChgLst>
-    <pc:chgData name="Ricardo Lucio Braga Reis" userId="S::a57590919@fgv.edu.br::789c906b-d924-4b68-a4ad-fed37e68814f" providerId="AD" clId="Web-{8FF9442C-03F1-4696-95FD-F425B156F4E3}"/>
-    <pc:docChg chg="addSld modSld modSection">
-      <pc:chgData name="Ricardo Lucio Braga Reis" userId="S::a57590919@fgv.edu.br::789c906b-d924-4b68-a4ad-fed37e68814f" providerId="AD" clId="Web-{8FF9442C-03F1-4696-95FD-F425B156F4E3}" dt="2020-05-28T20:04:57.372" v="906" actId="20577"/>
-      <pc:docMkLst>
-        <pc:docMk/>
-      </pc:docMkLst>
-      <pc:sldChg chg="modSp">
-        <pc:chgData name="Ricardo Lucio Braga Reis" userId="S::a57590919@fgv.edu.br::789c906b-d924-4b68-a4ad-fed37e68814f" providerId="AD" clId="Web-{8FF9442C-03F1-4696-95FD-F425B156F4E3}" dt="2020-05-28T19:31:11.314" v="528" actId="20577"/>
-        <pc:sldMkLst>
-          <pc:docMk/>
-          <pc:sldMk cId="1752641579" sldId="363"/>
-        </pc:sldMkLst>
-        <pc:spChg chg="mod">
-          <ac:chgData name="Ricardo Lucio Braga Reis" userId="S::a57590919@fgv.edu.br::789c906b-d924-4b68-a4ad-fed37e68814f" providerId="AD" clId="Web-{8FF9442C-03F1-4696-95FD-F425B156F4E3}" dt="2020-05-28T19:31:11.314" v="528" actId="20577"/>
-          <ac:spMkLst>
-            <pc:docMk/>
-            <pc:sldMk cId="1752641579" sldId="363"/>
-            <ac:spMk id="4" creationId="{E4CC8CAB-3F4C-409C-8745-BB5BD7AF0FCB}"/>
-          </ac:spMkLst>
-        </pc:spChg>
-      </pc:sldChg>
-      <pc:sldChg chg="modSp add replId">
-        <pc:chgData name="Ricardo Lucio Braga Reis" userId="S::a57590919@fgv.edu.br::789c906b-d924-4b68-a4ad-fed37e68814f" providerId="AD" clId="Web-{8FF9442C-03F1-4696-95FD-F425B156F4E3}" dt="2020-05-28T20:04:57.372" v="905" actId="20577"/>
-        <pc:sldMkLst>
-          <pc:docMk/>
-          <pc:sldMk cId="1219197679" sldId="374"/>
-        </pc:sldMkLst>
-        <pc:spChg chg="mod">
-          <ac:chgData name="Ricardo Lucio Braga Reis" userId="S::a57590919@fgv.edu.br::789c906b-d924-4b68-a4ad-fed37e68814f" providerId="AD" clId="Web-{8FF9442C-03F1-4696-95FD-F425B156F4E3}" dt="2020-05-28T20:04:57.372" v="905" actId="20577"/>
-          <ac:spMkLst>
-            <pc:docMk/>
-            <pc:sldMk cId="1219197679" sldId="374"/>
-            <ac:spMk id="4" creationId="{E4CC8CAB-3F4C-409C-8745-BB5BD7AF0FCB}"/>
-          </ac:spMkLst>
-        </pc:spChg>
-      </pc:sldChg>
-    </pc:docChg>
-  </pc:docChgLst>
   <pc:docChgLst>
     <pc:chgData name=" " userId="ff7f7cd4-1074-435c-a956-4a1fef029c30" providerId="ADAL" clId="{A05B594F-FEC1-4006-B716-BDAA0DDC61B5}"/>
     <pc:docChg chg="undo custSel addSld delSld modSld sldOrd modSection">
@@ -3799,6 +2572,877 @@
     </pc:docChg>
   </pc:docChgLst>
   <pc:docChgLst>
+    <pc:chgData name=" " userId="ff7f7cd4-1074-435c-a956-4a1fef029c30" providerId="ADAL" clId="{3E875E03-6E5A-4A77-9477-B0E529ECB8C3}"/>
+    <pc:docChg chg="undo custSel modSld">
+      <pc:chgData name=" " userId="ff7f7cd4-1074-435c-a956-4a1fef029c30" providerId="ADAL" clId="{3E875E03-6E5A-4A77-9477-B0E529ECB8C3}" dt="2020-06-05T01:05:32.864" v="430" actId="20577"/>
+      <pc:docMkLst>
+        <pc:docMk/>
+      </pc:docMkLst>
+      <pc:sldChg chg="modSp mod">
+        <pc:chgData name=" " userId="ff7f7cd4-1074-435c-a956-4a1fef029c30" providerId="ADAL" clId="{3E875E03-6E5A-4A77-9477-B0E529ECB8C3}" dt="2020-06-05T00:59:57.545" v="341" actId="6549"/>
+        <pc:sldMkLst>
+          <pc:docMk/>
+          <pc:sldMk cId="3817115773" sldId="360"/>
+        </pc:sldMkLst>
+        <pc:spChg chg="mod">
+          <ac:chgData name=" " userId="ff7f7cd4-1074-435c-a956-4a1fef029c30" providerId="ADAL" clId="{3E875E03-6E5A-4A77-9477-B0E529ECB8C3}" dt="2020-06-05T00:59:57.545" v="341" actId="6549"/>
+          <ac:spMkLst>
+            <pc:docMk/>
+            <pc:sldMk cId="3817115773" sldId="360"/>
+            <ac:spMk id="4" creationId="{6C14915E-E529-4FEB-989B-94707A646704}"/>
+          </ac:spMkLst>
+        </pc:spChg>
+      </pc:sldChg>
+      <pc:sldChg chg="modSp mod">
+        <pc:chgData name=" " userId="ff7f7cd4-1074-435c-a956-4a1fef029c30" providerId="ADAL" clId="{3E875E03-6E5A-4A77-9477-B0E529ECB8C3}" dt="2020-06-05T01:05:32.864" v="430" actId="20577"/>
+        <pc:sldMkLst>
+          <pc:docMk/>
+          <pc:sldMk cId="3953857876" sldId="361"/>
+        </pc:sldMkLst>
+        <pc:spChg chg="mod">
+          <ac:chgData name=" " userId="ff7f7cd4-1074-435c-a956-4a1fef029c30" providerId="ADAL" clId="{3E875E03-6E5A-4A77-9477-B0E529ECB8C3}" dt="2020-06-05T01:05:32.864" v="430" actId="20577"/>
+          <ac:spMkLst>
+            <pc:docMk/>
+            <pc:sldMk cId="3953857876" sldId="361"/>
+            <ac:spMk id="4" creationId="{84CA2768-938F-4EEA-B0DD-BAF05149B6F5}"/>
+          </ac:spMkLst>
+        </pc:spChg>
+      </pc:sldChg>
+    </pc:docChg>
+  </pc:docChgLst>
+  <pc:docChgLst>
+    <pc:chgData name="Leandro de Oliveira Daniel" userId="S::a57622988@fgv.edu.br::ff7f7cd4-1074-435c-a956-4a1fef029c30" providerId="AD" clId="Web-{A7DB5486-65F8-7DE9-8AB2-592C9CB23A38}"/>
+    <pc:docChg chg="modSld">
+      <pc:chgData name="Leandro de Oliveira Daniel" userId="S::a57622988@fgv.edu.br::ff7f7cd4-1074-435c-a956-4a1fef029c30" providerId="AD" clId="Web-{A7DB5486-65F8-7DE9-8AB2-592C9CB23A38}" dt="2020-06-02T00:57:21.688" v="13" actId="1076"/>
+      <pc:docMkLst>
+        <pc:docMk/>
+      </pc:docMkLst>
+      <pc:sldChg chg="addSp delSp modSp">
+        <pc:chgData name="Leandro de Oliveira Daniel" userId="S::a57622988@fgv.edu.br::ff7f7cd4-1074-435c-a956-4a1fef029c30" providerId="AD" clId="Web-{A7DB5486-65F8-7DE9-8AB2-592C9CB23A38}" dt="2020-06-02T00:57:21.688" v="13" actId="1076"/>
+        <pc:sldMkLst>
+          <pc:docMk/>
+          <pc:sldMk cId="1588210080" sldId="364"/>
+        </pc:sldMkLst>
+        <pc:picChg chg="add del mod">
+          <ac:chgData name="Leandro de Oliveira Daniel" userId="S::a57622988@fgv.edu.br::ff7f7cd4-1074-435c-a956-4a1fef029c30" providerId="AD" clId="Web-{A7DB5486-65F8-7DE9-8AB2-592C9CB23A38}" dt="2020-06-02T00:53:36.499" v="3"/>
+          <ac:picMkLst>
+            <pc:docMk/>
+            <pc:sldMk cId="1588210080" sldId="364"/>
+            <ac:picMk id="5" creationId="{9108F49C-7D44-4A38-8023-68979528786B}"/>
+          </ac:picMkLst>
+        </pc:picChg>
+        <pc:picChg chg="add mod">
+          <ac:chgData name="Leandro de Oliveira Daniel" userId="S::a57622988@fgv.edu.br::ff7f7cd4-1074-435c-a956-4a1fef029c30" providerId="AD" clId="Web-{A7DB5486-65F8-7DE9-8AB2-592C9CB23A38}" dt="2020-06-02T00:53:39.764" v="4" actId="1076"/>
+          <ac:picMkLst>
+            <pc:docMk/>
+            <pc:sldMk cId="1588210080" sldId="364"/>
+            <ac:picMk id="6" creationId="{43992712-EC58-4717-8264-B6AB98C39012}"/>
+          </ac:picMkLst>
+        </pc:picChg>
+        <pc:picChg chg="add mod">
+          <ac:chgData name="Leandro de Oliveira Daniel" userId="S::a57622988@fgv.edu.br::ff7f7cd4-1074-435c-a956-4a1fef029c30" providerId="AD" clId="Web-{A7DB5486-65F8-7DE9-8AB2-592C9CB23A38}" dt="2020-06-02T00:55:02.515" v="8" actId="1076"/>
+          <ac:picMkLst>
+            <pc:docMk/>
+            <pc:sldMk cId="1588210080" sldId="364"/>
+            <ac:picMk id="7" creationId="{10C52E8A-D922-4818-B589-5CF53B6868E6}"/>
+          </ac:picMkLst>
+        </pc:picChg>
+        <pc:picChg chg="add mod">
+          <ac:chgData name="Leandro de Oliveira Daniel" userId="S::a57622988@fgv.edu.br::ff7f7cd4-1074-435c-a956-4a1fef029c30" providerId="AD" clId="Web-{A7DB5486-65F8-7DE9-8AB2-592C9CB23A38}" dt="2020-06-02T00:56:31.703" v="11" actId="14100"/>
+          <ac:picMkLst>
+            <pc:docMk/>
+            <pc:sldMk cId="1588210080" sldId="364"/>
+            <ac:picMk id="8" creationId="{F9F735A1-B8DC-4D5F-8D81-4349A3660B63}"/>
+          </ac:picMkLst>
+        </pc:picChg>
+        <pc:picChg chg="add mod">
+          <ac:chgData name="Leandro de Oliveira Daniel" userId="S::a57622988@fgv.edu.br::ff7f7cd4-1074-435c-a956-4a1fef029c30" providerId="AD" clId="Web-{A7DB5486-65F8-7DE9-8AB2-592C9CB23A38}" dt="2020-06-02T00:57:21.688" v="13" actId="1076"/>
+          <ac:picMkLst>
+            <pc:docMk/>
+            <pc:sldMk cId="1588210080" sldId="364"/>
+            <ac:picMk id="9" creationId="{3D5CD6BA-59A7-43F6-8D85-5DA3BE027C3F}"/>
+          </ac:picMkLst>
+        </pc:picChg>
+      </pc:sldChg>
+    </pc:docChg>
+  </pc:docChgLst>
+  <pc:docChgLst>
+    <pc:chgData name="Leandro de Oliveira Daniel" userId="S::a57622988@fgv.edu.br::ff7f7cd4-1074-435c-a956-4a1fef029c30" providerId="AD" clId="Web-{1E36F6F0-6EE1-4B32-A79A-91B9EDD8AA61}"/>
+    <pc:docChg chg="modSld">
+      <pc:chgData name="Leandro de Oliveira Daniel" userId="S::a57622988@fgv.edu.br::ff7f7cd4-1074-435c-a956-4a1fef029c30" providerId="AD" clId="Web-{1E36F6F0-6EE1-4B32-A79A-91B9EDD8AA61}" dt="2020-05-25T21:43:26.234" v="5" actId="20577"/>
+      <pc:docMkLst>
+        <pc:docMk/>
+      </pc:docMkLst>
+      <pc:sldChg chg="modSp">
+        <pc:chgData name="Leandro de Oliveira Daniel" userId="S::a57622988@fgv.edu.br::ff7f7cd4-1074-435c-a956-4a1fef029c30" providerId="AD" clId="Web-{1E36F6F0-6EE1-4B32-A79A-91B9EDD8AA61}" dt="2020-05-25T21:43:26.234" v="4" actId="20577"/>
+        <pc:sldMkLst>
+          <pc:docMk/>
+          <pc:sldMk cId="3953857876" sldId="361"/>
+        </pc:sldMkLst>
+        <pc:spChg chg="mod">
+          <ac:chgData name="Leandro de Oliveira Daniel" userId="S::a57622988@fgv.edu.br::ff7f7cd4-1074-435c-a956-4a1fef029c30" providerId="AD" clId="Web-{1E36F6F0-6EE1-4B32-A79A-91B9EDD8AA61}" dt="2020-05-25T21:43:26.234" v="4" actId="20577"/>
+          <ac:spMkLst>
+            <pc:docMk/>
+            <pc:sldMk cId="3953857876" sldId="361"/>
+            <ac:spMk id="4" creationId="{84CA2768-938F-4EEA-B0DD-BAF05149B6F5}"/>
+          </ac:spMkLst>
+        </pc:spChg>
+      </pc:sldChg>
+    </pc:docChg>
+  </pc:docChgLst>
+  <pc:docChgLst>
+    <pc:chgData name="Leandro de Oliveira Daniel" userId="S::a57622988@fgv.edu.br::ff7f7cd4-1074-435c-a956-4a1fef029c30" providerId="AD" clId="Web-{CA9A52C9-A691-320B-7A71-601485A0B8E3}"/>
+    <pc:docChg chg="modSld">
+      <pc:chgData name="Leandro de Oliveira Daniel" userId="S::a57622988@fgv.edu.br::ff7f7cd4-1074-435c-a956-4a1fef029c30" providerId="AD" clId="Web-{CA9A52C9-A691-320B-7A71-601485A0B8E3}" dt="2020-06-01T23:44:27.064" v="226" actId="20577"/>
+      <pc:docMkLst>
+        <pc:docMk/>
+      </pc:docMkLst>
+      <pc:sldChg chg="modSp">
+        <pc:chgData name="Leandro de Oliveira Daniel" userId="S::a57622988@fgv.edu.br::ff7f7cd4-1074-435c-a956-4a1fef029c30" providerId="AD" clId="Web-{CA9A52C9-A691-320B-7A71-601485A0B8E3}" dt="2020-06-01T23:44:27.064" v="225" actId="20577"/>
+        <pc:sldMkLst>
+          <pc:docMk/>
+          <pc:sldMk cId="599003997" sldId="357"/>
+        </pc:sldMkLst>
+        <pc:spChg chg="mod">
+          <ac:chgData name="Leandro de Oliveira Daniel" userId="S::a57622988@fgv.edu.br::ff7f7cd4-1074-435c-a956-4a1fef029c30" providerId="AD" clId="Web-{CA9A52C9-A691-320B-7A71-601485A0B8E3}" dt="2020-06-01T23:44:27.064" v="225" actId="20577"/>
+          <ac:spMkLst>
+            <pc:docMk/>
+            <pc:sldMk cId="599003997" sldId="357"/>
+            <ac:spMk id="4" creationId="{F523F8A5-43AB-4AB2-BB4F-7F4A30E4A077}"/>
+          </ac:spMkLst>
+        </pc:spChg>
+      </pc:sldChg>
+    </pc:docChg>
+  </pc:docChgLst>
+  <pc:docChgLst>
+    <pc:chgData name="A57566093@fgv.edu.br" userId="1bb9ad80-ff55-479f-acd6-204a7fcb2663" providerId="ADAL" clId="{6EAA8C06-7F8D-43F2-902E-F978E52A88FA}"/>
+    <pc:docChg chg="undo custSel modSld addSection modSection">
+      <pc:chgData name="A57566093@fgv.edu.br" userId="1bb9ad80-ff55-479f-acd6-204a7fcb2663" providerId="ADAL" clId="{6EAA8C06-7F8D-43F2-902E-F978E52A88FA}" dt="2020-05-30T18:09:42.664" v="2152" actId="1035"/>
+      <pc:docMkLst>
+        <pc:docMk/>
+      </pc:docMkLst>
+      <pc:sldChg chg="addSp delSp modSp mod">
+        <pc:chgData name="A57566093@fgv.edu.br" userId="1bb9ad80-ff55-479f-acd6-204a7fcb2663" providerId="ADAL" clId="{6EAA8C06-7F8D-43F2-902E-F978E52A88FA}" dt="2020-05-30T18:09:42.664" v="2152" actId="1035"/>
+        <pc:sldMkLst>
+          <pc:docMk/>
+          <pc:sldMk cId="1275928961" sldId="372"/>
+        </pc:sldMkLst>
+        <pc:spChg chg="mod">
+          <ac:chgData name="A57566093@fgv.edu.br" userId="1bb9ad80-ff55-479f-acd6-204a7fcb2663" providerId="ADAL" clId="{6EAA8C06-7F8D-43F2-902E-F978E52A88FA}" dt="2020-05-30T18:09:42.664" v="2152" actId="1035"/>
+          <ac:spMkLst>
+            <pc:docMk/>
+            <pc:sldMk cId="1275928961" sldId="372"/>
+            <ac:spMk id="15" creationId="{EE9AE69C-DA3A-4B1F-A561-C474F96FA82E}"/>
+          </ac:spMkLst>
+        </pc:spChg>
+        <pc:spChg chg="mod">
+          <ac:chgData name="A57566093@fgv.edu.br" userId="1bb9ad80-ff55-479f-acd6-204a7fcb2663" providerId="ADAL" clId="{6EAA8C06-7F8D-43F2-902E-F978E52A88FA}" dt="2020-05-30T18:08:53.704" v="2140" actId="1038"/>
+          <ac:spMkLst>
+            <pc:docMk/>
+            <pc:sldMk cId="1275928961" sldId="372"/>
+            <ac:spMk id="47" creationId="{2188BDEC-AE57-40A1-AC7E-154444DB58F0}"/>
+          </ac:spMkLst>
+        </pc:spChg>
+        <pc:spChg chg="mod">
+          <ac:chgData name="A57566093@fgv.edu.br" userId="1bb9ad80-ff55-479f-acd6-204a7fcb2663" providerId="ADAL" clId="{6EAA8C06-7F8D-43F2-902E-F978E52A88FA}" dt="2020-05-30T18:05:01.159" v="2092" actId="20577"/>
+          <ac:spMkLst>
+            <pc:docMk/>
+            <pc:sldMk cId="1275928961" sldId="372"/>
+            <ac:spMk id="52" creationId="{0475A7DF-361A-4873-B74C-76D203352350}"/>
+          </ac:spMkLst>
+        </pc:spChg>
+        <pc:spChg chg="del mod">
+          <ac:chgData name="A57566093@fgv.edu.br" userId="1bb9ad80-ff55-479f-acd6-204a7fcb2663" providerId="ADAL" clId="{6EAA8C06-7F8D-43F2-902E-F978E52A88FA}" dt="2020-05-30T16:06:13.539" v="768" actId="478"/>
+          <ac:spMkLst>
+            <pc:docMk/>
+            <pc:sldMk cId="1275928961" sldId="372"/>
+            <ac:spMk id="56" creationId="{01C930DE-9C06-4A8C-BD93-B5D51CC5261A}"/>
+          </ac:spMkLst>
+        </pc:spChg>
+        <pc:spChg chg="del mod">
+          <ac:chgData name="A57566093@fgv.edu.br" userId="1bb9ad80-ff55-479f-acd6-204a7fcb2663" providerId="ADAL" clId="{6EAA8C06-7F8D-43F2-902E-F978E52A88FA}" dt="2020-05-30T17:10:18.334" v="1086" actId="478"/>
+          <ac:spMkLst>
+            <pc:docMk/>
+            <pc:sldMk cId="1275928961" sldId="372"/>
+            <ac:spMk id="60" creationId="{FD3C8DAB-117F-4C2A-8FC2-D09FD1E0AFCD}"/>
+          </ac:spMkLst>
+        </pc:spChg>
+        <pc:spChg chg="del mod">
+          <ac:chgData name="A57566093@fgv.edu.br" userId="1bb9ad80-ff55-479f-acd6-204a7fcb2663" providerId="ADAL" clId="{6EAA8C06-7F8D-43F2-902E-F978E52A88FA}" dt="2020-05-30T17:12:30.238" v="1091" actId="478"/>
+          <ac:spMkLst>
+            <pc:docMk/>
+            <pc:sldMk cId="1275928961" sldId="372"/>
+            <ac:spMk id="64" creationId="{AB05B829-23D6-4862-9111-F2448FEC0E6F}"/>
+          </ac:spMkLst>
+        </pc:spChg>
+        <pc:spChg chg="mod">
+          <ac:chgData name="A57566093@fgv.edu.br" userId="1bb9ad80-ff55-479f-acd6-204a7fcb2663" providerId="ADAL" clId="{6EAA8C06-7F8D-43F2-902E-F978E52A88FA}" dt="2020-05-30T17:56:42.628" v="1996" actId="1035"/>
+          <ac:spMkLst>
+            <pc:docMk/>
+            <pc:sldMk cId="1275928961" sldId="372"/>
+            <ac:spMk id="65" creationId="{6117BEC9-29C4-4049-B244-911DB9C24AC0}"/>
+          </ac:spMkLst>
+        </pc:spChg>
+        <pc:spChg chg="mod">
+          <ac:chgData name="A57566093@fgv.edu.br" userId="1bb9ad80-ff55-479f-acd6-204a7fcb2663" providerId="ADAL" clId="{6EAA8C06-7F8D-43F2-902E-F978E52A88FA}" dt="2020-05-30T17:56:42.628" v="1996" actId="1035"/>
+          <ac:spMkLst>
+            <pc:docMk/>
+            <pc:sldMk cId="1275928961" sldId="372"/>
+            <ac:spMk id="66" creationId="{8F316673-FBED-43E5-8AEF-DD23341CC9C0}"/>
+          </ac:spMkLst>
+        </pc:spChg>
+        <pc:spChg chg="mod">
+          <ac:chgData name="A57566093@fgv.edu.br" userId="1bb9ad80-ff55-479f-acd6-204a7fcb2663" providerId="ADAL" clId="{6EAA8C06-7F8D-43F2-902E-F978E52A88FA}" dt="2020-05-30T17:56:42.628" v="1996" actId="1035"/>
+          <ac:spMkLst>
+            <pc:docMk/>
+            <pc:sldMk cId="1275928961" sldId="372"/>
+            <ac:spMk id="67" creationId="{D6EB025E-AC31-4A25-B8D1-3A3C813EF7B2}"/>
+          </ac:spMkLst>
+        </pc:spChg>
+        <pc:spChg chg="mod">
+          <ac:chgData name="A57566093@fgv.edu.br" userId="1bb9ad80-ff55-479f-acd6-204a7fcb2663" providerId="ADAL" clId="{6EAA8C06-7F8D-43F2-902E-F978E52A88FA}" dt="2020-05-30T17:56:42.628" v="1996" actId="1035"/>
+          <ac:spMkLst>
+            <pc:docMk/>
+            <pc:sldMk cId="1275928961" sldId="372"/>
+            <ac:spMk id="68" creationId="{735EC6FA-99C0-4A93-AE17-F8DFC76F6DFE}"/>
+          </ac:spMkLst>
+        </pc:spChg>
+        <pc:spChg chg="del mod">
+          <ac:chgData name="A57566093@fgv.edu.br" userId="1bb9ad80-ff55-479f-acd6-204a7fcb2663" providerId="ADAL" clId="{6EAA8C06-7F8D-43F2-902E-F978E52A88FA}" dt="2020-05-30T17:15:46.044" v="1129" actId="478"/>
+          <ac:spMkLst>
+            <pc:docMk/>
+            <pc:sldMk cId="1275928961" sldId="372"/>
+            <ac:spMk id="69" creationId="{8A939DE8-6B04-446F-982B-0EDCD866CE79}"/>
+          </ac:spMkLst>
+        </pc:spChg>
+        <pc:spChg chg="mod">
+          <ac:chgData name="A57566093@fgv.edu.br" userId="1bb9ad80-ff55-479f-acd6-204a7fcb2663" providerId="ADAL" clId="{6EAA8C06-7F8D-43F2-902E-F978E52A88FA}" dt="2020-05-30T17:56:42.628" v="1996" actId="1035"/>
+          <ac:spMkLst>
+            <pc:docMk/>
+            <pc:sldMk cId="1275928961" sldId="372"/>
+            <ac:spMk id="70" creationId="{6B320405-02EC-4767-8ED6-4A2AE162A3FB}"/>
+          </ac:spMkLst>
+        </pc:spChg>
+        <pc:spChg chg="mod">
+          <ac:chgData name="A57566093@fgv.edu.br" userId="1bb9ad80-ff55-479f-acd6-204a7fcb2663" providerId="ADAL" clId="{6EAA8C06-7F8D-43F2-902E-F978E52A88FA}" dt="2020-05-30T17:56:42.628" v="1996" actId="1035"/>
+          <ac:spMkLst>
+            <pc:docMk/>
+            <pc:sldMk cId="1275928961" sldId="372"/>
+            <ac:spMk id="71" creationId="{0E33FDFF-2867-4A95-8839-5EF2FA67F378}"/>
+          </ac:spMkLst>
+        </pc:spChg>
+        <pc:spChg chg="mod">
+          <ac:chgData name="A57566093@fgv.edu.br" userId="1bb9ad80-ff55-479f-acd6-204a7fcb2663" providerId="ADAL" clId="{6EAA8C06-7F8D-43F2-902E-F978E52A88FA}" dt="2020-05-30T17:56:42.628" v="1996" actId="1035"/>
+          <ac:spMkLst>
+            <pc:docMk/>
+            <pc:sldMk cId="1275928961" sldId="372"/>
+            <ac:spMk id="72" creationId="{152F9426-A438-445A-BF25-38AC382E4962}"/>
+          </ac:spMkLst>
+        </pc:spChg>
+        <pc:spChg chg="del mod">
+          <ac:chgData name="A57566093@fgv.edu.br" userId="1bb9ad80-ff55-479f-acd6-204a7fcb2663" providerId="ADAL" clId="{6EAA8C06-7F8D-43F2-902E-F978E52A88FA}" dt="2020-05-30T17:15:46.884" v="1130" actId="478"/>
+          <ac:spMkLst>
+            <pc:docMk/>
+            <pc:sldMk cId="1275928961" sldId="372"/>
+            <ac:spMk id="73" creationId="{E577E1D4-D9C2-4277-950B-35D18058F087}"/>
+          </ac:spMkLst>
+        </pc:spChg>
+        <pc:spChg chg="mod">
+          <ac:chgData name="A57566093@fgv.edu.br" userId="1bb9ad80-ff55-479f-acd6-204a7fcb2663" providerId="ADAL" clId="{6EAA8C06-7F8D-43F2-902E-F978E52A88FA}" dt="2020-05-30T17:56:42.628" v="1996" actId="1035"/>
+          <ac:spMkLst>
+            <pc:docMk/>
+            <pc:sldMk cId="1275928961" sldId="372"/>
+            <ac:spMk id="74" creationId="{9FC2E4E1-9B95-4A3A-BF09-6C20E6E44089}"/>
+          </ac:spMkLst>
+        </pc:spChg>
+        <pc:spChg chg="mod">
+          <ac:chgData name="A57566093@fgv.edu.br" userId="1bb9ad80-ff55-479f-acd6-204a7fcb2663" providerId="ADAL" clId="{6EAA8C06-7F8D-43F2-902E-F978E52A88FA}" dt="2020-05-30T17:56:42.628" v="1996" actId="1035"/>
+          <ac:spMkLst>
+            <pc:docMk/>
+            <pc:sldMk cId="1275928961" sldId="372"/>
+            <ac:spMk id="75" creationId="{66C61559-E7F2-4E0E-83CC-EB1BEB8FAA7D}"/>
+          </ac:spMkLst>
+        </pc:spChg>
+        <pc:spChg chg="mod">
+          <ac:chgData name="A57566093@fgv.edu.br" userId="1bb9ad80-ff55-479f-acd6-204a7fcb2663" providerId="ADAL" clId="{6EAA8C06-7F8D-43F2-902E-F978E52A88FA}" dt="2020-05-30T17:56:42.628" v="1996" actId="1035"/>
+          <ac:spMkLst>
+            <pc:docMk/>
+            <pc:sldMk cId="1275928961" sldId="372"/>
+            <ac:spMk id="76" creationId="{17962853-B4C8-4B89-95F1-7BF905A4DD5A}"/>
+          </ac:spMkLst>
+        </pc:spChg>
+        <pc:spChg chg="del mod">
+          <ac:chgData name="A57566093@fgv.edu.br" userId="1bb9ad80-ff55-479f-acd6-204a7fcb2663" providerId="ADAL" clId="{6EAA8C06-7F8D-43F2-902E-F978E52A88FA}" dt="2020-05-30T17:15:48.048" v="1131" actId="478"/>
+          <ac:spMkLst>
+            <pc:docMk/>
+            <pc:sldMk cId="1275928961" sldId="372"/>
+            <ac:spMk id="77" creationId="{9E5C8CFE-1FB4-48D5-A910-F31A4C0B4882}"/>
+          </ac:spMkLst>
+        </pc:spChg>
+        <pc:spChg chg="mod">
+          <ac:chgData name="A57566093@fgv.edu.br" userId="1bb9ad80-ff55-479f-acd6-204a7fcb2663" providerId="ADAL" clId="{6EAA8C06-7F8D-43F2-902E-F978E52A88FA}" dt="2020-05-30T17:56:42.628" v="1996" actId="1035"/>
+          <ac:spMkLst>
+            <pc:docMk/>
+            <pc:sldMk cId="1275928961" sldId="372"/>
+            <ac:spMk id="78" creationId="{516E0C74-4ABC-487B-A9A6-84B8BD2CFE45}"/>
+          </ac:spMkLst>
+        </pc:spChg>
+        <pc:spChg chg="mod">
+          <ac:chgData name="A57566093@fgv.edu.br" userId="1bb9ad80-ff55-479f-acd6-204a7fcb2663" providerId="ADAL" clId="{6EAA8C06-7F8D-43F2-902E-F978E52A88FA}" dt="2020-05-30T17:56:42.628" v="1996" actId="1035"/>
+          <ac:spMkLst>
+            <pc:docMk/>
+            <pc:sldMk cId="1275928961" sldId="372"/>
+            <ac:spMk id="79" creationId="{AF4C6CDE-FC41-4C7D-9A34-6ACB60C05083}"/>
+          </ac:spMkLst>
+        </pc:spChg>
+        <pc:spChg chg="mod">
+          <ac:chgData name="A57566093@fgv.edu.br" userId="1bb9ad80-ff55-479f-acd6-204a7fcb2663" providerId="ADAL" clId="{6EAA8C06-7F8D-43F2-902E-F978E52A88FA}" dt="2020-05-30T17:56:42.628" v="1996" actId="1035"/>
+          <ac:spMkLst>
+            <pc:docMk/>
+            <pc:sldMk cId="1275928961" sldId="372"/>
+            <ac:spMk id="80" creationId="{3ABF7C65-9D4E-430D-B632-6034C3D040A5}"/>
+          </ac:spMkLst>
+        </pc:spChg>
+        <pc:spChg chg="del mod">
+          <ac:chgData name="A57566093@fgv.edu.br" userId="1bb9ad80-ff55-479f-acd6-204a7fcb2663" providerId="ADAL" clId="{6EAA8C06-7F8D-43F2-902E-F978E52A88FA}" dt="2020-05-30T17:15:48.997" v="1132" actId="478"/>
+          <ac:spMkLst>
+            <pc:docMk/>
+            <pc:sldMk cId="1275928961" sldId="372"/>
+            <ac:spMk id="81" creationId="{646DA2B6-B23A-4B4A-B2D5-BF5B630F4AA1}"/>
+          </ac:spMkLst>
+        </pc:spChg>
+        <pc:spChg chg="mod">
+          <ac:chgData name="A57566093@fgv.edu.br" userId="1bb9ad80-ff55-479f-acd6-204a7fcb2663" providerId="ADAL" clId="{6EAA8C06-7F8D-43F2-902E-F978E52A88FA}" dt="2020-05-30T17:56:42.628" v="1996" actId="1035"/>
+          <ac:spMkLst>
+            <pc:docMk/>
+            <pc:sldMk cId="1275928961" sldId="372"/>
+            <ac:spMk id="82" creationId="{812F77D9-757B-41CC-A681-C64ED82BD50D}"/>
+          </ac:spMkLst>
+        </pc:spChg>
+        <pc:spChg chg="mod topLvl">
+          <ac:chgData name="A57566093@fgv.edu.br" userId="1bb9ad80-ff55-479f-acd6-204a7fcb2663" providerId="ADAL" clId="{6EAA8C06-7F8D-43F2-902E-F978E52A88FA}" dt="2020-05-30T17:56:42.628" v="1996" actId="1035"/>
+          <ac:spMkLst>
+            <pc:docMk/>
+            <pc:sldMk cId="1275928961" sldId="372"/>
+            <ac:spMk id="86" creationId="{1AEC6ECF-0C27-451B-AC63-12BACD6273BD}"/>
+          </ac:spMkLst>
+        </pc:spChg>
+        <pc:spChg chg="mod ord topLvl">
+          <ac:chgData name="A57566093@fgv.edu.br" userId="1bb9ad80-ff55-479f-acd6-204a7fcb2663" providerId="ADAL" clId="{6EAA8C06-7F8D-43F2-902E-F978E52A88FA}" dt="2020-05-30T17:56:42.628" v="1996" actId="1035"/>
+          <ac:spMkLst>
+            <pc:docMk/>
+            <pc:sldMk cId="1275928961" sldId="372"/>
+            <ac:spMk id="98" creationId="{0AB91B6E-EBE3-4DA5-8761-287504DDCA75}"/>
+          </ac:spMkLst>
+        </pc:spChg>
+        <pc:spChg chg="mod topLvl">
+          <ac:chgData name="A57566093@fgv.edu.br" userId="1bb9ad80-ff55-479f-acd6-204a7fcb2663" providerId="ADAL" clId="{6EAA8C06-7F8D-43F2-902E-F978E52A88FA}" dt="2020-05-30T17:56:42.628" v="1996" actId="1035"/>
+          <ac:spMkLst>
+            <pc:docMk/>
+            <pc:sldMk cId="1275928961" sldId="372"/>
+            <ac:spMk id="101" creationId="{058871C4-6BF6-4AA4-A64E-B588205948A7}"/>
+          </ac:spMkLst>
+        </pc:spChg>
+        <pc:spChg chg="mod topLvl">
+          <ac:chgData name="A57566093@fgv.edu.br" userId="1bb9ad80-ff55-479f-acd6-204a7fcb2663" providerId="ADAL" clId="{6EAA8C06-7F8D-43F2-902E-F978E52A88FA}" dt="2020-05-30T17:56:42.628" v="1996" actId="1035"/>
+          <ac:spMkLst>
+            <pc:docMk/>
+            <pc:sldMk cId="1275928961" sldId="372"/>
+            <ac:spMk id="104" creationId="{EBEB97F3-6B7B-4B88-A096-DAE1916BDAAC}"/>
+          </ac:spMkLst>
+        </pc:spChg>
+        <pc:spChg chg="mod topLvl">
+          <ac:chgData name="A57566093@fgv.edu.br" userId="1bb9ad80-ff55-479f-acd6-204a7fcb2663" providerId="ADAL" clId="{6EAA8C06-7F8D-43F2-902E-F978E52A88FA}" dt="2020-05-30T17:56:42.628" v="1996" actId="1035"/>
+          <ac:spMkLst>
+            <pc:docMk/>
+            <pc:sldMk cId="1275928961" sldId="372"/>
+            <ac:spMk id="107" creationId="{7E6F721C-66BD-4EBD-80CA-98AA8720ECB2}"/>
+          </ac:spMkLst>
+        </pc:spChg>
+        <pc:spChg chg="mod topLvl">
+          <ac:chgData name="A57566093@fgv.edu.br" userId="1bb9ad80-ff55-479f-acd6-204a7fcb2663" providerId="ADAL" clId="{6EAA8C06-7F8D-43F2-902E-F978E52A88FA}" dt="2020-05-30T17:56:42.628" v="1996" actId="1035"/>
+          <ac:spMkLst>
+            <pc:docMk/>
+            <pc:sldMk cId="1275928961" sldId="372"/>
+            <ac:spMk id="113" creationId="{D3580611-CEF8-4754-BF62-848293D3247D}"/>
+          </ac:spMkLst>
+        </pc:spChg>
+        <pc:spChg chg="mod topLvl">
+          <ac:chgData name="A57566093@fgv.edu.br" userId="1bb9ad80-ff55-479f-acd6-204a7fcb2663" providerId="ADAL" clId="{6EAA8C06-7F8D-43F2-902E-F978E52A88FA}" dt="2020-05-30T17:56:42.628" v="1996" actId="1035"/>
+          <ac:spMkLst>
+            <pc:docMk/>
+            <pc:sldMk cId="1275928961" sldId="372"/>
+            <ac:spMk id="116" creationId="{9DDEC0B5-D125-464A-9615-269DDD5588FC}"/>
+          </ac:spMkLst>
+        </pc:spChg>
+        <pc:spChg chg="mod ord topLvl">
+          <ac:chgData name="A57566093@fgv.edu.br" userId="1bb9ad80-ff55-479f-acd6-204a7fcb2663" providerId="ADAL" clId="{6EAA8C06-7F8D-43F2-902E-F978E52A88FA}" dt="2020-05-30T17:56:42.628" v="1996" actId="1035"/>
+          <ac:spMkLst>
+            <pc:docMk/>
+            <pc:sldMk cId="1275928961" sldId="372"/>
+            <ac:spMk id="119" creationId="{A97CD634-7EF8-44B7-A700-2AA0B596D495}"/>
+          </ac:spMkLst>
+        </pc:spChg>
+        <pc:spChg chg="mod topLvl">
+          <ac:chgData name="A57566093@fgv.edu.br" userId="1bb9ad80-ff55-479f-acd6-204a7fcb2663" providerId="ADAL" clId="{6EAA8C06-7F8D-43F2-902E-F978E52A88FA}" dt="2020-05-30T17:56:42.628" v="1996" actId="1035"/>
+          <ac:spMkLst>
+            <pc:docMk/>
+            <pc:sldMk cId="1275928961" sldId="372"/>
+            <ac:spMk id="122" creationId="{8A3D1205-79D5-4CFC-B6AC-4415A304CFFD}"/>
+          </ac:spMkLst>
+        </pc:spChg>
+        <pc:spChg chg="mod">
+          <ac:chgData name="A57566093@fgv.edu.br" userId="1bb9ad80-ff55-479f-acd6-204a7fcb2663" providerId="ADAL" clId="{6EAA8C06-7F8D-43F2-902E-F978E52A88FA}" dt="2020-05-30T17:56:42.628" v="1996" actId="1035"/>
+          <ac:spMkLst>
+            <pc:docMk/>
+            <pc:sldMk cId="1275928961" sldId="372"/>
+            <ac:spMk id="123" creationId="{7D9BCB58-5C55-4D8D-93C5-F0FBADBEC4D2}"/>
+          </ac:spMkLst>
+        </pc:spChg>
+        <pc:spChg chg="mod">
+          <ac:chgData name="A57566093@fgv.edu.br" userId="1bb9ad80-ff55-479f-acd6-204a7fcb2663" providerId="ADAL" clId="{6EAA8C06-7F8D-43F2-902E-F978E52A88FA}" dt="2020-05-30T17:56:42.628" v="1996" actId="1035"/>
+          <ac:spMkLst>
+            <pc:docMk/>
+            <pc:sldMk cId="1275928961" sldId="372"/>
+            <ac:spMk id="124" creationId="{CE42AB43-6BF3-41F5-9C4E-D0A9AF81D796}"/>
+          </ac:spMkLst>
+        </pc:spChg>
+        <pc:spChg chg="mod">
+          <ac:chgData name="A57566093@fgv.edu.br" userId="1bb9ad80-ff55-479f-acd6-204a7fcb2663" providerId="ADAL" clId="{6EAA8C06-7F8D-43F2-902E-F978E52A88FA}" dt="2020-05-30T17:56:42.628" v="1996" actId="1035"/>
+          <ac:spMkLst>
+            <pc:docMk/>
+            <pc:sldMk cId="1275928961" sldId="372"/>
+            <ac:spMk id="125" creationId="{F97F9173-C9ED-416F-8569-2E32A0AE76FC}"/>
+          </ac:spMkLst>
+        </pc:spChg>
+        <pc:spChg chg="mod">
+          <ac:chgData name="A57566093@fgv.edu.br" userId="1bb9ad80-ff55-479f-acd6-204a7fcb2663" providerId="ADAL" clId="{6EAA8C06-7F8D-43F2-902E-F978E52A88FA}" dt="2020-05-30T17:56:42.628" v="1996" actId="1035"/>
+          <ac:spMkLst>
+            <pc:docMk/>
+            <pc:sldMk cId="1275928961" sldId="372"/>
+            <ac:spMk id="126" creationId="{6C30A25B-8A3C-4C3E-B7A9-CF223180C05A}"/>
+          </ac:spMkLst>
+        </pc:spChg>
+        <pc:spChg chg="mod">
+          <ac:chgData name="A57566093@fgv.edu.br" userId="1bb9ad80-ff55-479f-acd6-204a7fcb2663" providerId="ADAL" clId="{6EAA8C06-7F8D-43F2-902E-F978E52A88FA}" dt="2020-05-30T17:56:42.628" v="1996" actId="1035"/>
+          <ac:spMkLst>
+            <pc:docMk/>
+            <pc:sldMk cId="1275928961" sldId="372"/>
+            <ac:spMk id="127" creationId="{FABB6E0A-CCC2-4AD7-A0AF-7CD3984124A1}"/>
+          </ac:spMkLst>
+        </pc:spChg>
+        <pc:spChg chg="mod">
+          <ac:chgData name="A57566093@fgv.edu.br" userId="1bb9ad80-ff55-479f-acd6-204a7fcb2663" providerId="ADAL" clId="{6EAA8C06-7F8D-43F2-902E-F978E52A88FA}" dt="2020-05-30T17:59:37.734" v="2018" actId="20577"/>
+          <ac:spMkLst>
+            <pc:docMk/>
+            <pc:sldMk cId="1275928961" sldId="372"/>
+            <ac:spMk id="128" creationId="{92688E06-F987-40CF-8540-4268639286BA}"/>
+          </ac:spMkLst>
+        </pc:spChg>
+        <pc:spChg chg="mod">
+          <ac:chgData name="A57566093@fgv.edu.br" userId="1bb9ad80-ff55-479f-acd6-204a7fcb2663" providerId="ADAL" clId="{6EAA8C06-7F8D-43F2-902E-F978E52A88FA}" dt="2020-05-30T17:56:42.628" v="1996" actId="1035"/>
+          <ac:spMkLst>
+            <pc:docMk/>
+            <pc:sldMk cId="1275928961" sldId="372"/>
+            <ac:spMk id="129" creationId="{1A0E9EB0-A93E-4A0F-9159-A3178E3C8952}"/>
+          </ac:spMkLst>
+        </pc:spChg>
+        <pc:spChg chg="mod">
+          <ac:chgData name="A57566093@fgv.edu.br" userId="1bb9ad80-ff55-479f-acd6-204a7fcb2663" providerId="ADAL" clId="{6EAA8C06-7F8D-43F2-902E-F978E52A88FA}" dt="2020-05-30T17:56:42.628" v="1996" actId="1035"/>
+          <ac:spMkLst>
+            <pc:docMk/>
+            <pc:sldMk cId="1275928961" sldId="372"/>
+            <ac:spMk id="130" creationId="{969455D6-4BF0-4A0F-B7D6-23541D50CFF1}"/>
+          </ac:spMkLst>
+        </pc:spChg>
+        <pc:spChg chg="mod">
+          <ac:chgData name="A57566093@fgv.edu.br" userId="1bb9ad80-ff55-479f-acd6-204a7fcb2663" providerId="ADAL" clId="{6EAA8C06-7F8D-43F2-902E-F978E52A88FA}" dt="2020-05-30T17:56:42.628" v="1996" actId="1035"/>
+          <ac:spMkLst>
+            <pc:docMk/>
+            <pc:sldMk cId="1275928961" sldId="372"/>
+            <ac:spMk id="131" creationId="{7CB07761-F4B3-4D53-AEC9-B31C26E03C9E}"/>
+          </ac:spMkLst>
+        </pc:spChg>
+        <pc:spChg chg="mod">
+          <ac:chgData name="A57566093@fgv.edu.br" userId="1bb9ad80-ff55-479f-acd6-204a7fcb2663" providerId="ADAL" clId="{6EAA8C06-7F8D-43F2-902E-F978E52A88FA}" dt="2020-05-30T17:56:42.628" v="1996" actId="1035"/>
+          <ac:spMkLst>
+            <pc:docMk/>
+            <pc:sldMk cId="1275928961" sldId="372"/>
+            <ac:spMk id="132" creationId="{EEAC9399-E202-4C04-99D3-A6B56D3DE0C5}"/>
+          </ac:spMkLst>
+        </pc:spChg>
+        <pc:spChg chg="mod">
+          <ac:chgData name="A57566093@fgv.edu.br" userId="1bb9ad80-ff55-479f-acd6-204a7fcb2663" providerId="ADAL" clId="{6EAA8C06-7F8D-43F2-902E-F978E52A88FA}" dt="2020-05-30T17:56:42.628" v="1996" actId="1035"/>
+          <ac:spMkLst>
+            <pc:docMk/>
+            <pc:sldMk cId="1275928961" sldId="372"/>
+            <ac:spMk id="133" creationId="{3A33CC4D-D74B-4740-A182-2BF2D1190599}"/>
+          </ac:spMkLst>
+        </pc:spChg>
+        <pc:spChg chg="mod">
+          <ac:chgData name="A57566093@fgv.edu.br" userId="1bb9ad80-ff55-479f-acd6-204a7fcb2663" providerId="ADAL" clId="{6EAA8C06-7F8D-43F2-902E-F978E52A88FA}" dt="2020-05-30T17:56:42.628" v="1996" actId="1035"/>
+          <ac:spMkLst>
+            <pc:docMk/>
+            <pc:sldMk cId="1275928961" sldId="372"/>
+            <ac:spMk id="134" creationId="{15F0DA74-3C64-4143-BD54-DF90199C1D2E}"/>
+          </ac:spMkLst>
+        </pc:spChg>
+        <pc:spChg chg="mod">
+          <ac:chgData name="A57566093@fgv.edu.br" userId="1bb9ad80-ff55-479f-acd6-204a7fcb2663" providerId="ADAL" clId="{6EAA8C06-7F8D-43F2-902E-F978E52A88FA}" dt="2020-05-30T17:59:15.093" v="2011" actId="20577"/>
+          <ac:spMkLst>
+            <pc:docMk/>
+            <pc:sldMk cId="1275928961" sldId="372"/>
+            <ac:spMk id="135" creationId="{19F6B6C0-A6F1-4495-B8E2-7CA957C41286}"/>
+          </ac:spMkLst>
+        </pc:spChg>
+        <pc:spChg chg="add del mod">
+          <ac:chgData name="A57566093@fgv.edu.br" userId="1bb9ad80-ff55-479f-acd6-204a7fcb2663" providerId="ADAL" clId="{6EAA8C06-7F8D-43F2-902E-F978E52A88FA}" dt="2020-05-30T17:15:27.794" v="1112" actId="478"/>
+          <ac:spMkLst>
+            <pc:docMk/>
+            <pc:sldMk cId="1275928961" sldId="372"/>
+            <ac:spMk id="136" creationId="{B4178B04-BDF7-401F-AB34-1862A572C7C8}"/>
+          </ac:spMkLst>
+        </pc:spChg>
+        <pc:spChg chg="add mod">
+          <ac:chgData name="A57566093@fgv.edu.br" userId="1bb9ad80-ff55-479f-acd6-204a7fcb2663" providerId="ADAL" clId="{6EAA8C06-7F8D-43F2-902E-F978E52A88FA}" dt="2020-05-30T17:56:42.628" v="1996" actId="1035"/>
+          <ac:spMkLst>
+            <pc:docMk/>
+            <pc:sldMk cId="1275928961" sldId="372"/>
+            <ac:spMk id="138" creationId="{883BA034-3CFF-4548-9ABB-E1C0C74E7C93}"/>
+          </ac:spMkLst>
+        </pc:spChg>
+        <pc:spChg chg="add mod">
+          <ac:chgData name="A57566093@fgv.edu.br" userId="1bb9ad80-ff55-479f-acd6-204a7fcb2663" providerId="ADAL" clId="{6EAA8C06-7F8D-43F2-902E-F978E52A88FA}" dt="2020-05-30T18:05:21.598" v="2099"/>
+          <ac:spMkLst>
+            <pc:docMk/>
+            <pc:sldMk cId="1275928961" sldId="372"/>
+            <ac:spMk id="139" creationId="{11CA5B1E-2A64-4CC1-8D14-56CF4B944878}"/>
+          </ac:spMkLst>
+        </pc:spChg>
+        <pc:spChg chg="mod topLvl">
+          <ac:chgData name="A57566093@fgv.edu.br" userId="1bb9ad80-ff55-479f-acd6-204a7fcb2663" providerId="ADAL" clId="{6EAA8C06-7F8D-43F2-902E-F978E52A88FA}" dt="2020-05-30T17:56:42.628" v="1996" actId="1035"/>
+          <ac:spMkLst>
+            <pc:docMk/>
+            <pc:sldMk cId="1275928961" sldId="372"/>
+            <ac:spMk id="140" creationId="{607C9564-A9A0-4C19-8EAC-999D0EFFD7C9}"/>
+          </ac:spMkLst>
+        </pc:spChg>
+        <pc:spChg chg="add mod">
+          <ac:chgData name="A57566093@fgv.edu.br" userId="1bb9ad80-ff55-479f-acd6-204a7fcb2663" providerId="ADAL" clId="{6EAA8C06-7F8D-43F2-902E-F978E52A88FA}" dt="2020-05-30T18:05:31.403" v="2102" actId="20577"/>
+          <ac:spMkLst>
+            <pc:docMk/>
+            <pc:sldMk cId="1275928961" sldId="372"/>
+            <ac:spMk id="141" creationId="{66785AF6-978F-4F12-BD3B-A23E9D9412F1}"/>
+          </ac:spMkLst>
+        </pc:spChg>
+        <pc:spChg chg="add mod">
+          <ac:chgData name="A57566093@fgv.edu.br" userId="1bb9ad80-ff55-479f-acd6-204a7fcb2663" providerId="ADAL" clId="{6EAA8C06-7F8D-43F2-902E-F978E52A88FA}" dt="2020-05-30T18:05:12.034" v="2095"/>
+          <ac:spMkLst>
+            <pc:docMk/>
+            <pc:sldMk cId="1275928961" sldId="372"/>
+            <ac:spMk id="142" creationId="{1C7B873A-BDF7-49C0-B480-E2B18EEC0B7F}"/>
+          </ac:spMkLst>
+        </pc:spChg>
+        <pc:spChg chg="add mod">
+          <ac:chgData name="A57566093@fgv.edu.br" userId="1bb9ad80-ff55-479f-acd6-204a7fcb2663" providerId="ADAL" clId="{6EAA8C06-7F8D-43F2-902E-F978E52A88FA}" dt="2020-05-30T18:04:58.369" v="2091" actId="20577"/>
+          <ac:spMkLst>
+            <pc:docMk/>
+            <pc:sldMk cId="1275928961" sldId="372"/>
+            <ac:spMk id="143" creationId="{33666E9B-EB64-4015-980E-A41A7F25DE24}"/>
+          </ac:spMkLst>
+        </pc:spChg>
+        <pc:spChg chg="add mod">
+          <ac:chgData name="A57566093@fgv.edu.br" userId="1bb9ad80-ff55-479f-acd6-204a7fcb2663" providerId="ADAL" clId="{6EAA8C06-7F8D-43F2-902E-F978E52A88FA}" dt="2020-05-30T18:05:07.409" v="2094" actId="20577"/>
+          <ac:spMkLst>
+            <pc:docMk/>
+            <pc:sldMk cId="1275928961" sldId="372"/>
+            <ac:spMk id="144" creationId="{8CB7FC1A-8E60-4EED-8B1D-9A05E9117621}"/>
+          </ac:spMkLst>
+        </pc:spChg>
+        <pc:spChg chg="add mod">
+          <ac:chgData name="A57566093@fgv.edu.br" userId="1bb9ad80-ff55-479f-acd6-204a7fcb2663" providerId="ADAL" clId="{6EAA8C06-7F8D-43F2-902E-F978E52A88FA}" dt="2020-05-30T18:05:18.559" v="2098" actId="20577"/>
+          <ac:spMkLst>
+            <pc:docMk/>
+            <pc:sldMk cId="1275928961" sldId="372"/>
+            <ac:spMk id="145" creationId="{8A0DEF7D-8FCD-4543-AB0B-C6450C02E31F}"/>
+          </ac:spMkLst>
+        </pc:spChg>
+        <pc:spChg chg="add mod">
+          <ac:chgData name="A57566093@fgv.edu.br" userId="1bb9ad80-ff55-479f-acd6-204a7fcb2663" providerId="ADAL" clId="{6EAA8C06-7F8D-43F2-902E-F978E52A88FA}" dt="2020-05-30T18:05:38.272" v="2105" actId="20577"/>
+          <ac:spMkLst>
+            <pc:docMk/>
+            <pc:sldMk cId="1275928961" sldId="372"/>
+            <ac:spMk id="147" creationId="{AD667E69-0B55-42F4-9903-69330D706F80}"/>
+          </ac:spMkLst>
+        </pc:spChg>
+        <pc:spChg chg="add mod">
+          <ac:chgData name="A57566093@fgv.edu.br" userId="1bb9ad80-ff55-479f-acd6-204a7fcb2663" providerId="ADAL" clId="{6EAA8C06-7F8D-43F2-902E-F978E52A88FA}" dt="2020-05-30T18:05:42.829" v="2108" actId="20577"/>
+          <ac:spMkLst>
+            <pc:docMk/>
+            <pc:sldMk cId="1275928961" sldId="372"/>
+            <ac:spMk id="148" creationId="{B0B65378-071C-4A53-AD0B-EC390F3C2EA0}"/>
+          </ac:spMkLst>
+        </pc:spChg>
+        <pc:spChg chg="add mod">
+          <ac:chgData name="A57566093@fgv.edu.br" userId="1bb9ad80-ff55-479f-acd6-204a7fcb2663" providerId="ADAL" clId="{6EAA8C06-7F8D-43F2-902E-F978E52A88FA}" dt="2020-05-30T17:56:42.628" v="1996" actId="1035"/>
+          <ac:spMkLst>
+            <pc:docMk/>
+            <pc:sldMk cId="1275928961" sldId="372"/>
+            <ac:spMk id="149" creationId="{2855B1C8-F95F-4581-A7A9-2C83A127B926}"/>
+          </ac:spMkLst>
+        </pc:spChg>
+        <pc:spChg chg="add mod">
+          <ac:chgData name="A57566093@fgv.edu.br" userId="1bb9ad80-ff55-479f-acd6-204a7fcb2663" providerId="ADAL" clId="{6EAA8C06-7F8D-43F2-902E-F978E52A88FA}" dt="2020-05-30T18:05:49.074" v="2111" actId="20577"/>
+          <ac:spMkLst>
+            <pc:docMk/>
+            <pc:sldMk cId="1275928961" sldId="372"/>
+            <ac:spMk id="150" creationId="{5F5D66D8-AF9A-4908-8C30-FCBF866C9619}"/>
+          </ac:spMkLst>
+        </pc:spChg>
+        <pc:grpChg chg="add del mod">
+          <ac:chgData name="A57566093@fgv.edu.br" userId="1bb9ad80-ff55-479f-acd6-204a7fcb2663" providerId="ADAL" clId="{6EAA8C06-7F8D-43F2-902E-F978E52A88FA}" dt="2020-05-30T17:03:24.274" v="784" actId="165"/>
+          <ac:grpSpMkLst>
+            <pc:docMk/>
+            <pc:sldMk cId="1275928961" sldId="372"/>
+            <ac:grpSpMk id="84" creationId="{CE86F772-74FF-4732-91AB-F7660CAA0080}"/>
+          </ac:grpSpMkLst>
+        </pc:grpChg>
+        <pc:grpChg chg="del mod">
+          <ac:chgData name="A57566093@fgv.edu.br" userId="1bb9ad80-ff55-479f-acd6-204a7fcb2663" providerId="ADAL" clId="{6EAA8C06-7F8D-43F2-902E-F978E52A88FA}" dt="2020-05-30T15:52:41.374" v="337" actId="165"/>
+          <ac:grpSpMkLst>
+            <pc:docMk/>
+            <pc:sldMk cId="1275928961" sldId="372"/>
+            <ac:grpSpMk id="84" creationId="{D91536B1-6F35-4360-A678-306591A6CE20}"/>
+          </ac:grpSpMkLst>
+        </pc:grpChg>
+        <pc:grpChg chg="mod">
+          <ac:chgData name="A57566093@fgv.edu.br" userId="1bb9ad80-ff55-479f-acd6-204a7fcb2663" providerId="ADAL" clId="{6EAA8C06-7F8D-43F2-902E-F978E52A88FA}" dt="2020-05-30T17:56:42.628" v="1996" actId="1035"/>
+          <ac:grpSpMkLst>
+            <pc:docMk/>
+            <pc:sldMk cId="1275928961" sldId="372"/>
+            <ac:grpSpMk id="87" creationId="{A449242F-42DA-49A5-9682-FBDECB48F21C}"/>
+          </ac:grpSpMkLst>
+        </pc:grpChg>
+        <pc:grpChg chg="mod">
+          <ac:chgData name="A57566093@fgv.edu.br" userId="1bb9ad80-ff55-479f-acd6-204a7fcb2663" providerId="ADAL" clId="{6EAA8C06-7F8D-43F2-902E-F978E52A88FA}" dt="2020-05-30T17:56:42.628" v="1996" actId="1035"/>
+          <ac:grpSpMkLst>
+            <pc:docMk/>
+            <pc:sldMk cId="1275928961" sldId="372"/>
+            <ac:grpSpMk id="90" creationId="{0A78FD27-1770-48EC-8934-CB96880C0622}"/>
+          </ac:grpSpMkLst>
+        </pc:grpChg>
+        <pc:grpChg chg="mod">
+          <ac:chgData name="A57566093@fgv.edu.br" userId="1bb9ad80-ff55-479f-acd6-204a7fcb2663" providerId="ADAL" clId="{6EAA8C06-7F8D-43F2-902E-F978E52A88FA}" dt="2020-05-30T17:56:42.628" v="1996" actId="1035"/>
+          <ac:grpSpMkLst>
+            <pc:docMk/>
+            <pc:sldMk cId="1275928961" sldId="372"/>
+            <ac:grpSpMk id="93" creationId="{009339D9-89B9-47EC-9739-387D913BEC3B}"/>
+          </ac:grpSpMkLst>
+        </pc:grpChg>
+        <pc:grpChg chg="del mod ord">
+          <ac:chgData name="A57566093@fgv.edu.br" userId="1bb9ad80-ff55-479f-acd6-204a7fcb2663" providerId="ADAL" clId="{6EAA8C06-7F8D-43F2-902E-F978E52A88FA}" dt="2020-05-30T17:06:36.688" v="969" actId="165"/>
+          <ac:grpSpMkLst>
+            <pc:docMk/>
+            <pc:sldMk cId="1275928961" sldId="372"/>
+            <ac:grpSpMk id="96" creationId="{AE3EBA0A-6AE8-4C22-8B5E-4545342A3379}"/>
+          </ac:grpSpMkLst>
+        </pc:grpChg>
+        <pc:grpChg chg="del mod">
+          <ac:chgData name="A57566093@fgv.edu.br" userId="1bb9ad80-ff55-479f-acd6-204a7fcb2663" providerId="ADAL" clId="{6EAA8C06-7F8D-43F2-902E-F978E52A88FA}" dt="2020-05-30T17:23:02.811" v="1293" actId="165"/>
+          <ac:grpSpMkLst>
+            <pc:docMk/>
+            <pc:sldMk cId="1275928961" sldId="372"/>
+            <ac:grpSpMk id="99" creationId="{A5601210-0137-4FFA-A0A4-5E09B487C474}"/>
+          </ac:grpSpMkLst>
+        </pc:grpChg>
+        <pc:grpChg chg="del mod">
+          <ac:chgData name="A57566093@fgv.edu.br" userId="1bb9ad80-ff55-479f-acd6-204a7fcb2663" providerId="ADAL" clId="{6EAA8C06-7F8D-43F2-902E-F978E52A88FA}" dt="2020-05-30T17:24:19.693" v="1310" actId="165"/>
+          <ac:grpSpMkLst>
+            <pc:docMk/>
+            <pc:sldMk cId="1275928961" sldId="372"/>
+            <ac:grpSpMk id="102" creationId="{455C307F-CAB5-4509-B739-A94675E2E65A}"/>
+          </ac:grpSpMkLst>
+        </pc:grpChg>
+        <pc:grpChg chg="del mod">
+          <ac:chgData name="A57566093@fgv.edu.br" userId="1bb9ad80-ff55-479f-acd6-204a7fcb2663" providerId="ADAL" clId="{6EAA8C06-7F8D-43F2-902E-F978E52A88FA}" dt="2020-05-30T17:36:36.548" v="1563" actId="165"/>
+          <ac:grpSpMkLst>
+            <pc:docMk/>
+            <pc:sldMk cId="1275928961" sldId="372"/>
+            <ac:grpSpMk id="105" creationId="{3E056A8A-BB57-4F1D-BC98-12E5C6BC16EF}"/>
+          </ac:grpSpMkLst>
+        </pc:grpChg>
+        <pc:grpChg chg="mod">
+          <ac:chgData name="A57566093@fgv.edu.br" userId="1bb9ad80-ff55-479f-acd6-204a7fcb2663" providerId="ADAL" clId="{6EAA8C06-7F8D-43F2-902E-F978E52A88FA}" dt="2020-05-30T17:56:42.628" v="1996" actId="1035"/>
+          <ac:grpSpMkLst>
+            <pc:docMk/>
+            <pc:sldMk cId="1275928961" sldId="372"/>
+            <ac:grpSpMk id="108" creationId="{0E86805B-6CCF-47D5-BC48-4CEDDE54DFDA}"/>
+          </ac:grpSpMkLst>
+        </pc:grpChg>
+        <pc:grpChg chg="del mod">
+          <ac:chgData name="A57566093@fgv.edu.br" userId="1bb9ad80-ff55-479f-acd6-204a7fcb2663" providerId="ADAL" clId="{6EAA8C06-7F8D-43F2-902E-F978E52A88FA}" dt="2020-05-30T15:53:48.311" v="363" actId="165"/>
+          <ac:grpSpMkLst>
+            <pc:docMk/>
+            <pc:sldMk cId="1275928961" sldId="372"/>
+            <ac:grpSpMk id="111" creationId="{A650A8F1-3421-4ABB-88A5-7ED88D5D874C}"/>
+          </ac:grpSpMkLst>
+        </pc:grpChg>
+        <pc:grpChg chg="del mod">
+          <ac:chgData name="A57566093@fgv.edu.br" userId="1bb9ad80-ff55-479f-acd6-204a7fcb2663" providerId="ADAL" clId="{6EAA8C06-7F8D-43F2-902E-F978E52A88FA}" dt="2020-05-30T17:03:52.472" v="792" actId="165"/>
+          <ac:grpSpMkLst>
+            <pc:docMk/>
+            <pc:sldMk cId="1275928961" sldId="372"/>
+            <ac:grpSpMk id="114" creationId="{7450F4FC-D01B-4AD7-B487-0ACA7397AC4E}"/>
+          </ac:grpSpMkLst>
+        </pc:grpChg>
+        <pc:grpChg chg="del mod ord">
+          <ac:chgData name="A57566093@fgv.edu.br" userId="1bb9ad80-ff55-479f-acd6-204a7fcb2663" providerId="ADAL" clId="{6EAA8C06-7F8D-43F2-902E-F978E52A88FA}" dt="2020-05-30T17:31:01.073" v="1390" actId="165"/>
+          <ac:grpSpMkLst>
+            <pc:docMk/>
+            <pc:sldMk cId="1275928961" sldId="372"/>
+            <ac:grpSpMk id="117" creationId="{3B7BF9C9-D32C-4853-B4E0-66B308C1F1F9}"/>
+          </ac:grpSpMkLst>
+        </pc:grpChg>
+        <pc:grpChg chg="add del mod">
+          <ac:chgData name="A57566093@fgv.edu.br" userId="1bb9ad80-ff55-479f-acd6-204a7fcb2663" providerId="ADAL" clId="{6EAA8C06-7F8D-43F2-902E-F978E52A88FA}" dt="2020-05-30T17:32:39.229" v="1412" actId="165"/>
+          <ac:grpSpMkLst>
+            <pc:docMk/>
+            <pc:sldMk cId="1275928961" sldId="372"/>
+            <ac:grpSpMk id="120" creationId="{150A68D1-1CC1-4879-A373-E2A78A041BA0}"/>
+          </ac:grpSpMkLst>
+        </pc:grpChg>
+        <pc:cxnChg chg="mod">
+          <ac:chgData name="A57566093@fgv.edu.br" userId="1bb9ad80-ff55-479f-acd6-204a7fcb2663" providerId="ADAL" clId="{6EAA8C06-7F8D-43F2-902E-F978E52A88FA}" dt="2020-05-30T18:09:42.664" v="2152" actId="1035"/>
+          <ac:cxnSpMkLst>
+            <pc:docMk/>
+            <pc:sldMk cId="1275928961" sldId="372"/>
+            <ac:cxnSpMk id="13" creationId="{48D98D49-C026-4684-B519-FFB569F22EC7}"/>
+          </ac:cxnSpMkLst>
+        </pc:cxnChg>
+        <pc:cxnChg chg="add mod">
+          <ac:chgData name="A57566093@fgv.edu.br" userId="1bb9ad80-ff55-479f-acd6-204a7fcb2663" providerId="ADAL" clId="{6EAA8C06-7F8D-43F2-902E-F978E52A88FA}" dt="2020-05-30T17:56:42.628" v="1996" actId="1035"/>
+          <ac:cxnSpMkLst>
+            <pc:docMk/>
+            <pc:sldMk cId="1275928961" sldId="372"/>
+            <ac:cxnSpMk id="46" creationId="{E61903AA-0568-4B18-96E4-544B532DC342}"/>
+          </ac:cxnSpMkLst>
+        </pc:cxnChg>
+        <pc:cxnChg chg="mod">
+          <ac:chgData name="A57566093@fgv.edu.br" userId="1bb9ad80-ff55-479f-acd6-204a7fcb2663" providerId="ADAL" clId="{6EAA8C06-7F8D-43F2-902E-F978E52A88FA}" dt="2020-05-30T17:56:42.628" v="1996" actId="1035"/>
+          <ac:cxnSpMkLst>
+            <pc:docMk/>
+            <pc:sldMk cId="1275928961" sldId="372"/>
+            <ac:cxnSpMk id="83" creationId="{D2BB6D3C-AC2E-447F-96E3-7559E90478C4}"/>
+          </ac:cxnSpMkLst>
+        </pc:cxnChg>
+        <pc:cxnChg chg="mod topLvl">
+          <ac:chgData name="A57566093@fgv.edu.br" userId="1bb9ad80-ff55-479f-acd6-204a7fcb2663" providerId="ADAL" clId="{6EAA8C06-7F8D-43F2-902E-F978E52A88FA}" dt="2020-05-30T18:08:53.704" v="2140" actId="1038"/>
+          <ac:cxnSpMkLst>
+            <pc:docMk/>
+            <pc:sldMk cId="1275928961" sldId="372"/>
+            <ac:cxnSpMk id="85" creationId="{BA61902F-AEBD-4512-BCA0-F505437641C0}"/>
+          </ac:cxnSpMkLst>
+        </pc:cxnChg>
+        <pc:cxnChg chg="mod topLvl">
+          <ac:chgData name="A57566093@fgv.edu.br" userId="1bb9ad80-ff55-479f-acd6-204a7fcb2663" providerId="ADAL" clId="{6EAA8C06-7F8D-43F2-902E-F978E52A88FA}" dt="2020-05-30T17:56:42.628" v="1996" actId="1035"/>
+          <ac:cxnSpMkLst>
+            <pc:docMk/>
+            <pc:sldMk cId="1275928961" sldId="372"/>
+            <ac:cxnSpMk id="97" creationId="{0BEC07D7-3227-445D-B866-AAE84F38C61D}"/>
+          </ac:cxnSpMkLst>
+        </pc:cxnChg>
+        <pc:cxnChg chg="mod topLvl">
+          <ac:chgData name="A57566093@fgv.edu.br" userId="1bb9ad80-ff55-479f-acd6-204a7fcb2663" providerId="ADAL" clId="{6EAA8C06-7F8D-43F2-902E-F978E52A88FA}" dt="2020-05-30T17:56:42.628" v="1996" actId="1035"/>
+          <ac:cxnSpMkLst>
+            <pc:docMk/>
+            <pc:sldMk cId="1275928961" sldId="372"/>
+            <ac:cxnSpMk id="100" creationId="{FFB82AA6-02AA-40DA-B606-4A7EB51450C4}"/>
+          </ac:cxnSpMkLst>
+        </pc:cxnChg>
+        <pc:cxnChg chg="mod topLvl">
+          <ac:chgData name="A57566093@fgv.edu.br" userId="1bb9ad80-ff55-479f-acd6-204a7fcb2663" providerId="ADAL" clId="{6EAA8C06-7F8D-43F2-902E-F978E52A88FA}" dt="2020-05-30T17:56:42.628" v="1996" actId="1035"/>
+          <ac:cxnSpMkLst>
+            <pc:docMk/>
+            <pc:sldMk cId="1275928961" sldId="372"/>
+            <ac:cxnSpMk id="103" creationId="{5685F5D6-F17F-4053-BF7E-6612AEE91A09}"/>
+          </ac:cxnSpMkLst>
+        </pc:cxnChg>
+        <pc:cxnChg chg="mod topLvl">
+          <ac:chgData name="A57566093@fgv.edu.br" userId="1bb9ad80-ff55-479f-acd6-204a7fcb2663" providerId="ADAL" clId="{6EAA8C06-7F8D-43F2-902E-F978E52A88FA}" dt="2020-05-30T17:56:42.628" v="1996" actId="1035"/>
+          <ac:cxnSpMkLst>
+            <pc:docMk/>
+            <pc:sldMk cId="1275928961" sldId="372"/>
+            <ac:cxnSpMk id="106" creationId="{46A52265-7ED0-4ABA-9A15-12DC6DAF3090}"/>
+          </ac:cxnSpMkLst>
+        </pc:cxnChg>
+        <pc:cxnChg chg="mod ord topLvl">
+          <ac:chgData name="A57566093@fgv.edu.br" userId="1bb9ad80-ff55-479f-acd6-204a7fcb2663" providerId="ADAL" clId="{6EAA8C06-7F8D-43F2-902E-F978E52A88FA}" dt="2020-05-30T17:56:42.628" v="1996" actId="1035"/>
+          <ac:cxnSpMkLst>
+            <pc:docMk/>
+            <pc:sldMk cId="1275928961" sldId="372"/>
+            <ac:cxnSpMk id="111" creationId="{7DD6BB29-D712-4301-B328-B1ECA188EDCB}"/>
+          </ac:cxnSpMkLst>
+        </pc:cxnChg>
+        <pc:cxnChg chg="mod topLvl">
+          <ac:chgData name="A57566093@fgv.edu.br" userId="1bb9ad80-ff55-479f-acd6-204a7fcb2663" providerId="ADAL" clId="{6EAA8C06-7F8D-43F2-902E-F978E52A88FA}" dt="2020-05-30T17:56:42.628" v="1996" actId="1035"/>
+          <ac:cxnSpMkLst>
+            <pc:docMk/>
+            <pc:sldMk cId="1275928961" sldId="372"/>
+            <ac:cxnSpMk id="112" creationId="{BBADFCC0-EB87-4B33-B1E3-127EC200FAE2}"/>
+          </ac:cxnSpMkLst>
+        </pc:cxnChg>
+        <pc:cxnChg chg="mod topLvl">
+          <ac:chgData name="A57566093@fgv.edu.br" userId="1bb9ad80-ff55-479f-acd6-204a7fcb2663" providerId="ADAL" clId="{6EAA8C06-7F8D-43F2-902E-F978E52A88FA}" dt="2020-05-30T17:56:42.628" v="1996" actId="1035"/>
+          <ac:cxnSpMkLst>
+            <pc:docMk/>
+            <pc:sldMk cId="1275928961" sldId="372"/>
+            <ac:cxnSpMk id="115" creationId="{9A78E0C1-2E98-49EF-B7DB-418A32E77800}"/>
+          </ac:cxnSpMkLst>
+        </pc:cxnChg>
+        <pc:cxnChg chg="mod topLvl">
+          <ac:chgData name="A57566093@fgv.edu.br" userId="1bb9ad80-ff55-479f-acd6-204a7fcb2663" providerId="ADAL" clId="{6EAA8C06-7F8D-43F2-902E-F978E52A88FA}" dt="2020-05-30T17:56:42.628" v="1996" actId="1035"/>
+          <ac:cxnSpMkLst>
+            <pc:docMk/>
+            <pc:sldMk cId="1275928961" sldId="372"/>
+            <ac:cxnSpMk id="118" creationId="{CE2797D0-1D32-4DAA-9B9E-317E500836D9}"/>
+          </ac:cxnSpMkLst>
+        </pc:cxnChg>
+        <pc:cxnChg chg="mod topLvl">
+          <ac:chgData name="A57566093@fgv.edu.br" userId="1bb9ad80-ff55-479f-acd6-204a7fcb2663" providerId="ADAL" clId="{6EAA8C06-7F8D-43F2-902E-F978E52A88FA}" dt="2020-05-30T17:56:42.628" v="1996" actId="1035"/>
+          <ac:cxnSpMkLst>
+            <pc:docMk/>
+            <pc:sldMk cId="1275928961" sldId="372"/>
+            <ac:cxnSpMk id="121" creationId="{534EAC04-A78D-47F4-947F-CCA4C7224BE2}"/>
+          </ac:cxnSpMkLst>
+        </pc:cxnChg>
+        <pc:cxnChg chg="add mod ord">
+          <ac:chgData name="A57566093@fgv.edu.br" userId="1bb9ad80-ff55-479f-acd6-204a7fcb2663" providerId="ADAL" clId="{6EAA8C06-7F8D-43F2-902E-F978E52A88FA}" dt="2020-05-30T17:56:42.628" v="1996" actId="1035"/>
+          <ac:cxnSpMkLst>
+            <pc:docMk/>
+            <pc:sldMk cId="1275928961" sldId="372"/>
+            <ac:cxnSpMk id="137" creationId="{9583CB98-414A-4973-A053-0DA9A7EBF6E5}"/>
+          </ac:cxnSpMkLst>
+        </pc:cxnChg>
+        <pc:cxnChg chg="add del mod">
+          <ac:chgData name="A57566093@fgv.edu.br" userId="1bb9ad80-ff55-479f-acd6-204a7fcb2663" providerId="ADAL" clId="{6EAA8C06-7F8D-43F2-902E-F978E52A88FA}" dt="2020-05-30T17:22:57.451" v="1292" actId="478"/>
+          <ac:cxnSpMkLst>
+            <pc:docMk/>
+            <pc:sldMk cId="1275928961" sldId="372"/>
+            <ac:cxnSpMk id="146" creationId="{C5871181-465C-4DE9-A9AB-DFD35381EAEB}"/>
+          </ac:cxnSpMkLst>
+        </pc:cxnChg>
+        <pc:cxnChg chg="add mod">
+          <ac:chgData name="A57566093@fgv.edu.br" userId="1bb9ad80-ff55-479f-acd6-204a7fcb2663" providerId="ADAL" clId="{6EAA8C06-7F8D-43F2-902E-F978E52A88FA}" dt="2020-05-30T17:56:42.628" v="1996" actId="1035"/>
+          <ac:cxnSpMkLst>
+            <pc:docMk/>
+            <pc:sldMk cId="1275928961" sldId="372"/>
+            <ac:cxnSpMk id="151" creationId="{A102E9E0-C39A-4B76-AC25-248C244CD0CC}"/>
+          </ac:cxnSpMkLst>
+        </pc:cxnChg>
+      </pc:sldChg>
+    </pc:docChg>
+  </pc:docChgLst>
+  <pc:docChgLst>
     <pc:chgData name="Ricardo Lucio Braga Reis" userId="S::a57590919@fgv.edu.br::789c906b-d924-4b68-a4ad-fed37e68814f" providerId="AD" clId="Web-{16EAE22F-EB20-8B31-C2E7-E2D9869D9D38}"/>
     <pc:docChg chg="addSld modSld modSection">
       <pc:chgData name="Ricardo Lucio Braga Reis" userId="S::a57590919@fgv.edu.br::789c906b-d924-4b68-a4ad-fed37e68814f" providerId="AD" clId="Web-{16EAE22F-EB20-8B31-C2E7-E2D9869D9D38}" dt="2020-05-27T15:37:46.309" v="451" actId="20577"/>
@@ -3926,6 +3570,109 @@
             <pc:docMk/>
             <pc:sldMk cId="2557986528" sldId="373"/>
             <ac:spMk id="7" creationId="{6F061871-FDA0-491B-B84B-B5AB0970885B}"/>
+          </ac:spMkLst>
+        </pc:spChg>
+      </pc:sldChg>
+    </pc:docChg>
+  </pc:docChgLst>
+  <pc:docChgLst>
+    <pc:chgData name="Leandro de Oliveira Daniel" userId="S::a57622988@fgv.edu.br::ff7f7cd4-1074-435c-a956-4a1fef029c30" providerId="AD" clId="Web-{576D1934-300F-FC23-9CD7-6CCE5F40640F}"/>
+    <pc:docChg chg="modSld">
+      <pc:chgData name="Leandro de Oliveira Daniel" userId="S::a57622988@fgv.edu.br::ff7f7cd4-1074-435c-a956-4a1fef029c30" providerId="AD" clId="Web-{576D1934-300F-FC23-9CD7-6CCE5F40640F}" dt="2020-05-30T21:49:02.200" v="210" actId="20577"/>
+      <pc:docMkLst>
+        <pc:docMk/>
+      </pc:docMkLst>
+      <pc:sldChg chg="modSp">
+        <pc:chgData name="Leandro de Oliveira Daniel" userId="S::a57622988@fgv.edu.br::ff7f7cd4-1074-435c-a956-4a1fef029c30" providerId="AD" clId="Web-{576D1934-300F-FC23-9CD7-6CCE5F40640F}" dt="2020-05-30T21:37:14.052" v="8" actId="20577"/>
+        <pc:sldMkLst>
+          <pc:docMk/>
+          <pc:sldMk cId="1275928961" sldId="372"/>
+        </pc:sldMkLst>
+        <pc:spChg chg="mod">
+          <ac:chgData name="Leandro de Oliveira Daniel" userId="S::a57622988@fgv.edu.br::ff7f7cd4-1074-435c-a956-4a1fef029c30" providerId="AD" clId="Web-{576D1934-300F-FC23-9CD7-6CCE5F40640F}" dt="2020-05-30T21:36:58.052" v="4" actId="20577"/>
+          <ac:spMkLst>
+            <pc:docMk/>
+            <pc:sldMk cId="1275928961" sldId="372"/>
+            <ac:spMk id="52" creationId="{0475A7DF-361A-4873-B74C-76D203352350}"/>
+          </ac:spMkLst>
+        </pc:spChg>
+        <pc:spChg chg="mod">
+          <ac:chgData name="Leandro de Oliveira Daniel" userId="S::a57622988@fgv.edu.br::ff7f7cd4-1074-435c-a956-4a1fef029c30" providerId="AD" clId="Web-{576D1934-300F-FC23-9CD7-6CCE5F40640F}" dt="2020-05-30T21:37:05.942" v="6" actId="20577"/>
+          <ac:spMkLst>
+            <pc:docMk/>
+            <pc:sldMk cId="1275928961" sldId="372"/>
+            <ac:spMk id="141" creationId="{66785AF6-978F-4F12-BD3B-A23E9D9412F1}"/>
+          </ac:spMkLst>
+        </pc:spChg>
+        <pc:spChg chg="mod">
+          <ac:chgData name="Leandro de Oliveira Daniel" userId="S::a57622988@fgv.edu.br::ff7f7cd4-1074-435c-a956-4a1fef029c30" providerId="AD" clId="Web-{576D1934-300F-FC23-9CD7-6CCE5F40640F}" dt="2020-05-30T21:37:08.833" v="7" actId="20577"/>
+          <ac:spMkLst>
+            <pc:docMk/>
+            <pc:sldMk cId="1275928961" sldId="372"/>
+            <ac:spMk id="145" creationId="{8A0DEF7D-8FCD-4543-AB0B-C6450C02E31F}"/>
+          </ac:spMkLst>
+        </pc:spChg>
+        <pc:spChg chg="mod">
+          <ac:chgData name="Leandro de Oliveira Daniel" userId="S::a57622988@fgv.edu.br::ff7f7cd4-1074-435c-a956-4a1fef029c30" providerId="AD" clId="Web-{576D1934-300F-FC23-9CD7-6CCE5F40640F}" dt="2020-05-30T21:37:03.349" v="5" actId="20577"/>
+          <ac:spMkLst>
+            <pc:docMk/>
+            <pc:sldMk cId="1275928961" sldId="372"/>
+            <ac:spMk id="148" creationId="{B0B65378-071C-4A53-AD0B-EC390F3C2EA0}"/>
+          </ac:spMkLst>
+        </pc:spChg>
+        <pc:spChg chg="mod">
+          <ac:chgData name="Leandro de Oliveira Daniel" userId="S::a57622988@fgv.edu.br::ff7f7cd4-1074-435c-a956-4a1fef029c30" providerId="AD" clId="Web-{576D1934-300F-FC23-9CD7-6CCE5F40640F}" dt="2020-05-30T21:36:41.068" v="0" actId="20577"/>
+          <ac:spMkLst>
+            <pc:docMk/>
+            <pc:sldMk cId="1275928961" sldId="372"/>
+            <ac:spMk id="166" creationId="{7F54744D-34EB-4337-91F4-EFBBC8079451}"/>
+          </ac:spMkLst>
+        </pc:spChg>
+        <pc:spChg chg="mod">
+          <ac:chgData name="Leandro de Oliveira Daniel" userId="S::a57622988@fgv.edu.br::ff7f7cd4-1074-435c-a956-4a1fef029c30" providerId="AD" clId="Web-{576D1934-300F-FC23-9CD7-6CCE5F40640F}" dt="2020-05-30T21:36:49.896" v="3" actId="20577"/>
+          <ac:spMkLst>
+            <pc:docMk/>
+            <pc:sldMk cId="1275928961" sldId="372"/>
+            <ac:spMk id="167" creationId="{DE1013B5-4DDB-41CE-B97E-1E9C6372D398}"/>
+          </ac:spMkLst>
+        </pc:spChg>
+        <pc:spChg chg="mod">
+          <ac:chgData name="Leandro de Oliveira Daniel" userId="S::a57622988@fgv.edu.br::ff7f7cd4-1074-435c-a956-4a1fef029c30" providerId="AD" clId="Web-{576D1934-300F-FC23-9CD7-6CCE5F40640F}" dt="2020-05-30T21:37:14.052" v="8" actId="20577"/>
+          <ac:spMkLst>
+            <pc:docMk/>
+            <pc:sldMk cId="1275928961" sldId="372"/>
+            <ac:spMk id="168" creationId="{5FB18791-F3A5-460E-A6AF-F86AFE353D57}"/>
+          </ac:spMkLst>
+        </pc:spChg>
+        <pc:spChg chg="mod">
+          <ac:chgData name="Leandro de Oliveira Daniel" userId="S::a57622988@fgv.edu.br::ff7f7cd4-1074-435c-a956-4a1fef029c30" providerId="AD" clId="Web-{576D1934-300F-FC23-9CD7-6CCE5F40640F}" dt="2020-05-30T21:36:46.521" v="2" actId="20577"/>
+          <ac:spMkLst>
+            <pc:docMk/>
+            <pc:sldMk cId="1275928961" sldId="372"/>
+            <ac:spMk id="170" creationId="{CD412FEA-4730-486F-879F-6D614467BF94}"/>
+          </ac:spMkLst>
+        </pc:spChg>
+        <pc:spChg chg="mod">
+          <ac:chgData name="Leandro de Oliveira Daniel" userId="S::a57622988@fgv.edu.br::ff7f7cd4-1074-435c-a956-4a1fef029c30" providerId="AD" clId="Web-{576D1934-300F-FC23-9CD7-6CCE5F40640F}" dt="2020-05-30T21:36:43.755" v="1" actId="20577"/>
+          <ac:spMkLst>
+            <pc:docMk/>
+            <pc:sldMk cId="1275928961" sldId="372"/>
+            <ac:spMk id="172" creationId="{552D19B7-2205-4393-8BC3-D10B6D0AF5B0}"/>
+          </ac:spMkLst>
+        </pc:spChg>
+      </pc:sldChg>
+      <pc:sldChg chg="modSp">
+        <pc:chgData name="Leandro de Oliveira Daniel" userId="S::a57622988@fgv.edu.br::ff7f7cd4-1074-435c-a956-4a1fef029c30" providerId="AD" clId="Web-{576D1934-300F-FC23-9CD7-6CCE5F40640F}" dt="2020-05-30T21:48:58.840" v="208" actId="20577"/>
+        <pc:sldMkLst>
+          <pc:docMk/>
+          <pc:sldMk cId="2356196915" sldId="377"/>
+        </pc:sldMkLst>
+        <pc:spChg chg="mod">
+          <ac:chgData name="Leandro de Oliveira Daniel" userId="S::a57622988@fgv.edu.br::ff7f7cd4-1074-435c-a956-4a1fef029c30" providerId="AD" clId="Web-{576D1934-300F-FC23-9CD7-6CCE5F40640F}" dt="2020-05-30T21:48:58.840" v="208" actId="20577"/>
+          <ac:spMkLst>
+            <pc:docMk/>
+            <pc:sldMk cId="2356196915" sldId="377"/>
+            <ac:spMk id="7" creationId="{CE3762FA-4222-4801-A067-946EE71C9A52}"/>
           </ac:spMkLst>
         </pc:spChg>
       </pc:sldChg>
@@ -4089,20 +3836,35 @@
     </pc:docChg>
   </pc:docChgLst>
   <pc:docChgLst>
-    <pc:chgData name="Ricardo Lucio Braga Reis" userId="S::a57590919@fgv.edu.br::789c906b-d924-4b68-a4ad-fed37e68814f" providerId="AD" clId="Web-{AA03B29D-5316-9A96-B91F-F6CBA42BD17D}"/>
-    <pc:docChg chg="modSld">
-      <pc:chgData name="Ricardo Lucio Braga Reis" userId="S::a57590919@fgv.edu.br::789c906b-d924-4b68-a4ad-fed37e68814f" providerId="AD" clId="Web-{AA03B29D-5316-9A96-B91F-F6CBA42BD17D}" dt="2020-05-30T22:08:55.251" v="204" actId="20577"/>
+    <pc:chgData name="Leandro Daniel" userId="682bb4abc622d264" providerId="LiveId" clId="{7AC88094-A1D5-4FA0-8F56-B6E6CBB30C7C}"/>
+    <pc:docChg chg="undo custSel modSld">
+      <pc:chgData name="Leandro Daniel" userId="682bb4abc622d264" providerId="LiveId" clId="{7AC88094-A1D5-4FA0-8F56-B6E6CBB30C7C}" dt="2020-05-30T22:15:00.993" v="15" actId="20577"/>
       <pc:docMkLst>
         <pc:docMk/>
       </pc:docMkLst>
-      <pc:sldChg chg="modSp">
-        <pc:chgData name="Ricardo Lucio Braga Reis" userId="S::a57590919@fgv.edu.br::789c906b-d924-4b68-a4ad-fed37e68814f" providerId="AD" clId="Web-{AA03B29D-5316-9A96-B91F-F6CBA42BD17D}" dt="2020-05-30T22:08:12.515" v="202" actId="20577"/>
+      <pc:sldChg chg="modSp mod">
+        <pc:chgData name="Leandro Daniel" userId="682bb4abc622d264" providerId="LiveId" clId="{7AC88094-A1D5-4FA0-8F56-B6E6CBB30C7C}" dt="2020-05-30T22:13:40.576" v="0" actId="20577"/>
+        <pc:sldMkLst>
+          <pc:docMk/>
+          <pc:sldMk cId="679871842" sldId="351"/>
+        </pc:sldMkLst>
+        <pc:spChg chg="mod">
+          <ac:chgData name="Leandro Daniel" userId="682bb4abc622d264" providerId="LiveId" clId="{7AC88094-A1D5-4FA0-8F56-B6E6CBB30C7C}" dt="2020-05-30T22:13:40.576" v="0" actId="20577"/>
+          <ac:spMkLst>
+            <pc:docMk/>
+            <pc:sldMk cId="679871842" sldId="351"/>
+            <ac:spMk id="2" creationId="{70F687BA-32A2-41BC-B72A-F28209A7F473}"/>
+          </ac:spMkLst>
+        </pc:spChg>
+      </pc:sldChg>
+      <pc:sldChg chg="modSp mod">
+        <pc:chgData name="Leandro Daniel" userId="682bb4abc622d264" providerId="LiveId" clId="{7AC88094-A1D5-4FA0-8F56-B6E6CBB30C7C}" dt="2020-05-30T22:15:00.993" v="15" actId="20577"/>
         <pc:sldMkLst>
           <pc:docMk/>
           <pc:sldMk cId="2356196915" sldId="377"/>
         </pc:sldMkLst>
         <pc:spChg chg="mod">
-          <ac:chgData name="Ricardo Lucio Braga Reis" userId="S::a57590919@fgv.edu.br::789c906b-d924-4b68-a4ad-fed37e68814f" providerId="AD" clId="Web-{AA03B29D-5316-9A96-B91F-F6CBA42BD17D}" dt="2020-05-30T22:08:12.515" v="202" actId="20577"/>
+          <ac:chgData name="Leandro Daniel" userId="682bb4abc622d264" providerId="LiveId" clId="{7AC88094-A1D5-4FA0-8F56-B6E6CBB30C7C}" dt="2020-05-30T22:15:00.993" v="15" actId="20577"/>
           <ac:spMkLst>
             <pc:docMk/>
             <pc:sldMk cId="2356196915" sldId="377"/>
@@ -4190,39 +3952,404 @@
     </pc:docChg>
   </pc:docChgLst>
   <pc:docChgLst>
-    <pc:chgData name="Leandro Daniel" userId="682bb4abc622d264" providerId="LiveId" clId="{7AC88094-A1D5-4FA0-8F56-B6E6CBB30C7C}"/>
-    <pc:docChg chg="undo custSel modSld">
-      <pc:chgData name="Leandro Daniel" userId="682bb4abc622d264" providerId="LiveId" clId="{7AC88094-A1D5-4FA0-8F56-B6E6CBB30C7C}" dt="2020-05-30T22:15:00.993" v="15" actId="20577"/>
+    <pc:chgData name="Ricardo Lucio Braga Reis" userId="S::a57590919@fgv.edu.br::789c906b-d924-4b68-a4ad-fed37e68814f" providerId="AD" clId="Web-{8FF9442C-03F1-4696-95FD-F425B156F4E3}"/>
+    <pc:docChg chg="addSld modSld modSection">
+      <pc:chgData name="Ricardo Lucio Braga Reis" userId="S::a57590919@fgv.edu.br::789c906b-d924-4b68-a4ad-fed37e68814f" providerId="AD" clId="Web-{8FF9442C-03F1-4696-95FD-F425B156F4E3}" dt="2020-05-28T20:04:57.372" v="906" actId="20577"/>
       <pc:docMkLst>
         <pc:docMk/>
       </pc:docMkLst>
+      <pc:sldChg chg="modSp">
+        <pc:chgData name="Ricardo Lucio Braga Reis" userId="S::a57590919@fgv.edu.br::789c906b-d924-4b68-a4ad-fed37e68814f" providerId="AD" clId="Web-{8FF9442C-03F1-4696-95FD-F425B156F4E3}" dt="2020-05-28T19:31:11.314" v="528" actId="20577"/>
+        <pc:sldMkLst>
+          <pc:docMk/>
+          <pc:sldMk cId="1752641579" sldId="363"/>
+        </pc:sldMkLst>
+        <pc:spChg chg="mod">
+          <ac:chgData name="Ricardo Lucio Braga Reis" userId="S::a57590919@fgv.edu.br::789c906b-d924-4b68-a4ad-fed37e68814f" providerId="AD" clId="Web-{8FF9442C-03F1-4696-95FD-F425B156F4E3}" dt="2020-05-28T19:31:11.314" v="528" actId="20577"/>
+          <ac:spMkLst>
+            <pc:docMk/>
+            <pc:sldMk cId="1752641579" sldId="363"/>
+            <ac:spMk id="4" creationId="{E4CC8CAB-3F4C-409C-8745-BB5BD7AF0FCB}"/>
+          </ac:spMkLst>
+        </pc:spChg>
+      </pc:sldChg>
+      <pc:sldChg chg="modSp add replId">
+        <pc:chgData name="Ricardo Lucio Braga Reis" userId="S::a57590919@fgv.edu.br::789c906b-d924-4b68-a4ad-fed37e68814f" providerId="AD" clId="Web-{8FF9442C-03F1-4696-95FD-F425B156F4E3}" dt="2020-05-28T20:04:57.372" v="905" actId="20577"/>
+        <pc:sldMkLst>
+          <pc:docMk/>
+          <pc:sldMk cId="1219197679" sldId="374"/>
+        </pc:sldMkLst>
+        <pc:spChg chg="mod">
+          <ac:chgData name="Ricardo Lucio Braga Reis" userId="S::a57590919@fgv.edu.br::789c906b-d924-4b68-a4ad-fed37e68814f" providerId="AD" clId="Web-{8FF9442C-03F1-4696-95FD-F425B156F4E3}" dt="2020-05-28T20:04:57.372" v="905" actId="20577"/>
+          <ac:spMkLst>
+            <pc:docMk/>
+            <pc:sldMk cId="1219197679" sldId="374"/>
+            <ac:spMk id="4" creationId="{E4CC8CAB-3F4C-409C-8745-BB5BD7AF0FCB}"/>
+          </ac:spMkLst>
+        </pc:spChg>
+      </pc:sldChg>
+    </pc:docChg>
+  </pc:docChgLst>
+  <pc:docChgLst>
+    <pc:chgData name="Leandro Daniel" userId="682bb4abc622d264" providerId="LiveId" clId="{0C927506-5143-4A7D-B285-178AAC9CF657}"/>
+    <pc:docChg chg="undo custSel addSld modSld">
+      <pc:chgData name="Leandro Daniel" userId="682bb4abc622d264" providerId="LiveId" clId="{0C927506-5143-4A7D-B285-178AAC9CF657}" dt="2020-05-24T21:23:35.887" v="2500" actId="478"/>
+      <pc:docMkLst>
+        <pc:docMk/>
+      </pc:docMkLst>
+      <pc:sldChg chg="addSp modSp mod">
+        <pc:chgData name="Leandro Daniel" userId="682bb4abc622d264" providerId="LiveId" clId="{0C927506-5143-4A7D-B285-178AAC9CF657}" dt="2020-05-24T20:06:37.345" v="1071" actId="20577"/>
+        <pc:sldMkLst>
+          <pc:docMk/>
+          <pc:sldMk cId="351260889" sldId="346"/>
+        </pc:sldMkLst>
+        <pc:spChg chg="mod">
+          <ac:chgData name="Leandro Daniel" userId="682bb4abc622d264" providerId="LiveId" clId="{0C927506-5143-4A7D-B285-178AAC9CF657}" dt="2020-05-24T20:06:37.345" v="1071" actId="20577"/>
+          <ac:spMkLst>
+            <pc:docMk/>
+            <pc:sldMk cId="351260889" sldId="346"/>
+            <ac:spMk id="6" creationId="{D5F67441-A755-4247-851C-41974715F282}"/>
+          </ac:spMkLst>
+        </pc:spChg>
+        <pc:spChg chg="add mod">
+          <ac:chgData name="Leandro Daniel" userId="682bb4abc622d264" providerId="LiveId" clId="{0C927506-5143-4A7D-B285-178AAC9CF657}" dt="2020-05-24T19:13:55.199" v="610" actId="20577"/>
+          <ac:spMkLst>
+            <pc:docMk/>
+            <pc:sldMk cId="351260889" sldId="346"/>
+            <ac:spMk id="7" creationId="{F98E677B-3EA7-49FD-AAB2-91F960419DAB}"/>
+          </ac:spMkLst>
+        </pc:spChg>
+      </pc:sldChg>
       <pc:sldChg chg="modSp mod">
-        <pc:chgData name="Leandro Daniel" userId="682bb4abc622d264" providerId="LiveId" clId="{7AC88094-A1D5-4FA0-8F56-B6E6CBB30C7C}" dt="2020-05-30T22:13:40.576" v="0" actId="20577"/>
+        <pc:chgData name="Leandro Daniel" userId="682bb4abc622d264" providerId="LiveId" clId="{0C927506-5143-4A7D-B285-178AAC9CF657}" dt="2020-05-24T21:22:37.469" v="2498" actId="122"/>
         <pc:sldMkLst>
           <pc:docMk/>
           <pc:sldMk cId="679871842" sldId="351"/>
         </pc:sldMkLst>
         <pc:spChg chg="mod">
-          <ac:chgData name="Leandro Daniel" userId="682bb4abc622d264" providerId="LiveId" clId="{7AC88094-A1D5-4FA0-8F56-B6E6CBB30C7C}" dt="2020-05-30T22:13:40.576" v="0" actId="20577"/>
+          <ac:chgData name="Leandro Daniel" userId="682bb4abc622d264" providerId="LiveId" clId="{0C927506-5143-4A7D-B285-178AAC9CF657}" dt="2020-05-24T21:22:37.469" v="2498" actId="122"/>
           <ac:spMkLst>
             <pc:docMk/>
             <pc:sldMk cId="679871842" sldId="351"/>
             <ac:spMk id="2" creationId="{70F687BA-32A2-41BC-B72A-F28209A7F473}"/>
           </ac:spMkLst>
         </pc:spChg>
+        <pc:spChg chg="mod">
+          <ac:chgData name="Leandro Daniel" userId="682bb4abc622d264" providerId="LiveId" clId="{0C927506-5143-4A7D-B285-178AAC9CF657}" dt="2020-05-24T20:52:34.557" v="2351" actId="207"/>
+          <ac:spMkLst>
+            <pc:docMk/>
+            <pc:sldMk cId="679871842" sldId="351"/>
+            <ac:spMk id="3" creationId="{94B768D7-96B0-41DF-9630-0D308384D261}"/>
+          </ac:spMkLst>
+        </pc:spChg>
       </pc:sldChg>
-      <pc:sldChg chg="modSp mod">
-        <pc:chgData name="Leandro Daniel" userId="682bb4abc622d264" providerId="LiveId" clId="{7AC88094-A1D5-4FA0-8F56-B6E6CBB30C7C}" dt="2020-05-30T22:15:00.993" v="15" actId="20577"/>
+      <pc:sldChg chg="addSp delSp modSp add mod">
+        <pc:chgData name="Leandro Daniel" userId="682bb4abc622d264" providerId="LiveId" clId="{0C927506-5143-4A7D-B285-178AAC9CF657}" dt="2020-05-24T20:59:51.439" v="2353" actId="1076"/>
+        <pc:sldMkLst>
+          <pc:docMk/>
+          <pc:sldMk cId="3921174963" sldId="371"/>
+        </pc:sldMkLst>
+        <pc:spChg chg="del mod">
+          <ac:chgData name="Leandro Daniel" userId="682bb4abc622d264" providerId="LiveId" clId="{0C927506-5143-4A7D-B285-178AAC9CF657}" dt="2020-05-24T19:20:16.220" v="922" actId="21"/>
+          <ac:spMkLst>
+            <pc:docMk/>
+            <pc:sldMk cId="3921174963" sldId="371"/>
+            <ac:spMk id="6" creationId="{D5F67441-A755-4247-851C-41974715F282}"/>
+          </ac:spMkLst>
+        </pc:spChg>
+        <pc:spChg chg="add mod">
+          <ac:chgData name="Leandro Daniel" userId="682bb4abc622d264" providerId="LiveId" clId="{0C927506-5143-4A7D-B285-178AAC9CF657}" dt="2020-05-24T19:13:50.901" v="609" actId="20577"/>
+          <ac:spMkLst>
+            <pc:docMk/>
+            <pc:sldMk cId="3921174963" sldId="371"/>
+            <ac:spMk id="7" creationId="{6F061871-FDA0-491B-B84B-B5AB0970885B}"/>
+          </ac:spMkLst>
+        </pc:spChg>
+        <pc:spChg chg="add del mod">
+          <ac:chgData name="Leandro Daniel" userId="682bb4abc622d264" providerId="LiveId" clId="{0C927506-5143-4A7D-B285-178AAC9CF657}" dt="2020-05-24T19:20:16.220" v="922" actId="21"/>
+          <ac:spMkLst>
+            <pc:docMk/>
+            <pc:sldMk cId="3921174963" sldId="371"/>
+            <ac:spMk id="11" creationId="{1A672CB9-5A04-4176-9D9E-55D7A9EF3CE4}"/>
+          </ac:spMkLst>
+        </pc:spChg>
+        <pc:spChg chg="add mod">
+          <ac:chgData name="Leandro Daniel" userId="682bb4abc622d264" providerId="LiveId" clId="{0C927506-5143-4A7D-B285-178AAC9CF657}" dt="2020-05-24T20:13:46.032" v="1207" actId="20577"/>
+          <ac:spMkLst>
+            <pc:docMk/>
+            <pc:sldMk cId="3921174963" sldId="371"/>
+            <ac:spMk id="14" creationId="{07CA8BF6-9A49-441F-836D-9072850A59D4}"/>
+          </ac:spMkLst>
+        </pc:spChg>
+        <pc:spChg chg="add mod">
+          <ac:chgData name="Leandro Daniel" userId="682bb4abc622d264" providerId="LiveId" clId="{0C927506-5143-4A7D-B285-178AAC9CF657}" dt="2020-05-24T20:11:30.806" v="1073" actId="20577"/>
+          <ac:spMkLst>
+            <pc:docMk/>
+            <pc:sldMk cId="3921174963" sldId="371"/>
+            <ac:spMk id="18" creationId="{E05EE9CB-CEAD-49FB-B917-F3911C866716}"/>
+          </ac:spMkLst>
+        </pc:spChg>
+        <pc:graphicFrameChg chg="add del mod">
+          <ac:chgData name="Leandro Daniel" userId="682bb4abc622d264" providerId="LiveId" clId="{0C927506-5143-4A7D-B285-178AAC9CF657}" dt="2020-05-24T19:08:11.585" v="588" actId="478"/>
+          <ac:graphicFrameMkLst>
+            <pc:docMk/>
+            <pc:sldMk cId="3921174963" sldId="371"/>
+            <ac:graphicFrameMk id="3" creationId="{439B052B-7ADE-4F71-97D8-530EF1CF479F}"/>
+          </ac:graphicFrameMkLst>
+        </pc:graphicFrameChg>
+        <pc:picChg chg="add mod">
+          <ac:chgData name="Leandro Daniel" userId="682bb4abc622d264" providerId="LiveId" clId="{0C927506-5143-4A7D-B285-178AAC9CF657}" dt="2020-05-24T20:59:51.439" v="2353" actId="1076"/>
+          <ac:picMkLst>
+            <pc:docMk/>
+            <pc:sldMk cId="3921174963" sldId="371"/>
+            <ac:picMk id="3" creationId="{36078AE8-5334-447D-AD43-BB3AF83E359B}"/>
+          </ac:picMkLst>
+        </pc:picChg>
+        <pc:picChg chg="add del mod">
+          <ac:chgData name="Leandro Daniel" userId="682bb4abc622d264" providerId="LiveId" clId="{0C927506-5143-4A7D-B285-178AAC9CF657}" dt="2020-05-24T19:20:16.220" v="922" actId="21"/>
+          <ac:picMkLst>
+            <pc:docMk/>
+            <pc:sldMk cId="3921174963" sldId="371"/>
+            <ac:picMk id="8" creationId="{AC909D0D-3174-4A96-ACF9-9162A8A5ACEC}"/>
+          </ac:picMkLst>
+        </pc:picChg>
+        <pc:picChg chg="add del mod">
+          <ac:chgData name="Leandro Daniel" userId="682bb4abc622d264" providerId="LiveId" clId="{0C927506-5143-4A7D-B285-178AAC9CF657}" dt="2020-05-24T19:20:16.220" v="922" actId="21"/>
+          <ac:picMkLst>
+            <pc:docMk/>
+            <pc:sldMk cId="3921174963" sldId="371"/>
+            <ac:picMk id="9" creationId="{4E6ABAF2-18C9-4203-BEA1-09AE83E51337}"/>
+          </ac:picMkLst>
+        </pc:picChg>
+        <pc:picChg chg="add del mod">
+          <ac:chgData name="Leandro Daniel" userId="682bb4abc622d264" providerId="LiveId" clId="{0C927506-5143-4A7D-B285-178AAC9CF657}" dt="2020-05-24T19:20:16.220" v="922" actId="21"/>
+          <ac:picMkLst>
+            <pc:docMk/>
+            <pc:sldMk cId="3921174963" sldId="371"/>
+            <ac:picMk id="10" creationId="{98AB35B6-C01B-4BC7-9234-A61B0A25D67B}"/>
+          </ac:picMkLst>
+        </pc:picChg>
+        <pc:picChg chg="add mod">
+          <ac:chgData name="Leandro Daniel" userId="682bb4abc622d264" providerId="LiveId" clId="{0C927506-5143-4A7D-B285-178AAC9CF657}" dt="2020-05-24T19:20:21.954" v="924"/>
+          <ac:picMkLst>
+            <pc:docMk/>
+            <pc:sldMk cId="3921174963" sldId="371"/>
+            <ac:picMk id="15" creationId="{2F22A74C-3364-4DD1-BBA7-38E977DAC637}"/>
+          </ac:picMkLst>
+        </pc:picChg>
+        <pc:picChg chg="add mod">
+          <ac:chgData name="Leandro Daniel" userId="682bb4abc622d264" providerId="LiveId" clId="{0C927506-5143-4A7D-B285-178AAC9CF657}" dt="2020-05-24T20:05:01.027" v="943" actId="408"/>
+          <ac:picMkLst>
+            <pc:docMk/>
+            <pc:sldMk cId="3921174963" sldId="371"/>
+            <ac:picMk id="16" creationId="{B1A27C00-ABA4-4EE5-95D2-97D339292616}"/>
+          </ac:picMkLst>
+        </pc:picChg>
+        <pc:picChg chg="add mod">
+          <ac:chgData name="Leandro Daniel" userId="682bb4abc622d264" providerId="LiveId" clId="{0C927506-5143-4A7D-B285-178AAC9CF657}" dt="2020-05-24T20:04:51.283" v="941" actId="1076"/>
+          <ac:picMkLst>
+            <pc:docMk/>
+            <pc:sldMk cId="3921174963" sldId="371"/>
+            <ac:picMk id="17" creationId="{D6CEEE49-8720-460A-9FA7-E01A051D6D3D}"/>
+          </ac:picMkLst>
+        </pc:picChg>
+        <pc:cxnChg chg="add del mod">
+          <ac:chgData name="Leandro Daniel" userId="682bb4abc622d264" providerId="LiveId" clId="{0C927506-5143-4A7D-B285-178AAC9CF657}" dt="2020-05-24T19:20:16.220" v="922" actId="21"/>
+          <ac:cxnSpMkLst>
+            <pc:docMk/>
+            <pc:sldMk cId="3921174963" sldId="371"/>
+            <ac:cxnSpMk id="13" creationId="{461DF850-D789-480D-A92B-6F9C8AB2ED91}"/>
+          </ac:cxnSpMkLst>
+        </pc:cxnChg>
+        <pc:cxnChg chg="add mod">
+          <ac:chgData name="Leandro Daniel" userId="682bb4abc622d264" providerId="LiveId" clId="{0C927506-5143-4A7D-B285-178AAC9CF657}" dt="2020-05-24T19:20:21.954" v="924"/>
+          <ac:cxnSpMkLst>
+            <pc:docMk/>
+            <pc:sldMk cId="3921174963" sldId="371"/>
+            <ac:cxnSpMk id="19" creationId="{5E198959-BDE7-4419-BDC5-99C20E0B5EC8}"/>
+          </ac:cxnSpMkLst>
+        </pc:cxnChg>
+      </pc:sldChg>
+      <pc:sldChg chg="addSp delSp modSp add mod">
+        <pc:chgData name="Leandro Daniel" userId="682bb4abc622d264" providerId="LiveId" clId="{0C927506-5143-4A7D-B285-178AAC9CF657}" dt="2020-05-24T21:23:35.887" v="2500" actId="478"/>
+        <pc:sldMkLst>
+          <pc:docMk/>
+          <pc:sldMk cId="1275928961" sldId="372"/>
+        </pc:sldMkLst>
+        <pc:spChg chg="add mod">
+          <ac:chgData name="Leandro Daniel" userId="682bb4abc622d264" providerId="LiveId" clId="{0C927506-5143-4A7D-B285-178AAC9CF657}" dt="2020-05-24T21:08:40.557" v="2372" actId="114"/>
+          <ac:spMkLst>
+            <pc:docMk/>
+            <pc:sldMk cId="1275928961" sldId="372"/>
+            <ac:spMk id="6" creationId="{AD1205DC-63D6-44A4-B20E-BC9057891E98}"/>
+          </ac:spMkLst>
+        </pc:spChg>
+        <pc:spChg chg="del">
+          <ac:chgData name="Leandro Daniel" userId="682bb4abc622d264" providerId="LiveId" clId="{0C927506-5143-4A7D-B285-178AAC9CF657}" dt="2020-05-24T19:20:11.151" v="921" actId="478"/>
+          <ac:spMkLst>
+            <pc:docMk/>
+            <pc:sldMk cId="1275928961" sldId="372"/>
+            <ac:spMk id="6" creationId="{D5F67441-A755-4247-851C-41974715F282}"/>
+          </ac:spMkLst>
+        </pc:spChg>
+        <pc:spChg chg="mod">
+          <ac:chgData name="Leandro Daniel" userId="682bb4abc622d264" providerId="LiveId" clId="{0C927506-5143-4A7D-B285-178AAC9CF657}" dt="2020-05-24T19:13:45.033" v="608" actId="20577"/>
+          <ac:spMkLst>
+            <pc:docMk/>
+            <pc:sldMk cId="1275928961" sldId="372"/>
+            <ac:spMk id="7" creationId="{6F061871-FDA0-491B-B84B-B5AB0970885B}"/>
+          </ac:spMkLst>
+        </pc:spChg>
+        <pc:spChg chg="add del mod">
+          <ac:chgData name="Leandro Daniel" userId="682bb4abc622d264" providerId="LiveId" clId="{0C927506-5143-4A7D-B285-178AAC9CF657}" dt="2020-05-24T19:20:30.316" v="925" actId="478"/>
+          <ac:spMkLst>
+            <pc:docMk/>
+            <pc:sldMk cId="1275928961" sldId="372"/>
+            <ac:spMk id="11" creationId="{96D2EE0A-E21F-4805-9CCD-AE4D58E613E5}"/>
+          </ac:spMkLst>
+        </pc:spChg>
+        <pc:spChg chg="add del mod">
+          <ac:chgData name="Leandro Daniel" userId="682bb4abc622d264" providerId="LiveId" clId="{0C927506-5143-4A7D-B285-178AAC9CF657}" dt="2020-05-24T19:20:30.316" v="925" actId="478"/>
+          <ac:spMkLst>
+            <pc:docMk/>
+            <pc:sldMk cId="1275928961" sldId="372"/>
+            <ac:spMk id="15" creationId="{101961AE-8D08-4106-ACBA-2F8DAAC4EC0F}"/>
+          </ac:spMkLst>
+        </pc:spChg>
+        <pc:spChg chg="add mod">
+          <ac:chgData name="Leandro Daniel" userId="682bb4abc622d264" providerId="LiveId" clId="{0C927506-5143-4A7D-B285-178AAC9CF657}" dt="2020-05-24T21:10:27.850" v="2392" actId="20577"/>
+          <ac:spMkLst>
+            <pc:docMk/>
+            <pc:sldMk cId="1275928961" sldId="372"/>
+            <ac:spMk id="17" creationId="{0EACA767-5D74-4C51-98B7-763F041F495E}"/>
+          </ac:spMkLst>
+        </pc:spChg>
+        <pc:grpChg chg="add mod">
+          <ac:chgData name="Leandro Daniel" userId="682bb4abc622d264" providerId="LiveId" clId="{0C927506-5143-4A7D-B285-178AAC9CF657}" dt="2020-05-24T21:08:29.985" v="2371" actId="164"/>
+          <ac:grpSpMkLst>
+            <pc:docMk/>
+            <pc:sldMk cId="1275928961" sldId="372"/>
+            <ac:grpSpMk id="8" creationId="{1E163097-A71F-4360-857F-CDF7256C8A07}"/>
+          </ac:grpSpMkLst>
+        </pc:grpChg>
+        <pc:picChg chg="add mod">
+          <ac:chgData name="Leandro Daniel" userId="682bb4abc622d264" providerId="LiveId" clId="{0C927506-5143-4A7D-B285-178AAC9CF657}" dt="2020-05-24T21:08:29.985" v="2371" actId="164"/>
+          <ac:picMkLst>
+            <pc:docMk/>
+            <pc:sldMk cId="1275928961" sldId="372"/>
+            <ac:picMk id="4" creationId="{2AFB5B40-0E71-438C-A693-F6960B64154E}"/>
+          </ac:picMkLst>
+        </pc:picChg>
+        <pc:picChg chg="del">
+          <ac:chgData name="Leandro Daniel" userId="682bb4abc622d264" providerId="LiveId" clId="{0C927506-5143-4A7D-B285-178AAC9CF657}" dt="2020-05-24T19:20:11.151" v="921" actId="478"/>
+          <ac:picMkLst>
+            <pc:docMk/>
+            <pc:sldMk cId="1275928961" sldId="372"/>
+            <ac:picMk id="8" creationId="{AC909D0D-3174-4A96-ACF9-9162A8A5ACEC}"/>
+          </ac:picMkLst>
+        </pc:picChg>
+        <pc:picChg chg="del">
+          <ac:chgData name="Leandro Daniel" userId="682bb4abc622d264" providerId="LiveId" clId="{0C927506-5143-4A7D-B285-178AAC9CF657}" dt="2020-05-24T19:20:11.151" v="921" actId="478"/>
+          <ac:picMkLst>
+            <pc:docMk/>
+            <pc:sldMk cId="1275928961" sldId="372"/>
+            <ac:picMk id="9" creationId="{4E6ABAF2-18C9-4203-BEA1-09AE83E51337}"/>
+          </ac:picMkLst>
+        </pc:picChg>
+        <pc:picChg chg="add del mod">
+          <ac:chgData name="Leandro Daniel" userId="682bb4abc622d264" providerId="LiveId" clId="{0C927506-5143-4A7D-B285-178AAC9CF657}" dt="2020-05-24T21:23:35.887" v="2500" actId="478"/>
+          <ac:picMkLst>
+            <pc:docMk/>
+            <pc:sldMk cId="1275928961" sldId="372"/>
+            <ac:picMk id="9" creationId="{AB2D39B2-8115-48EF-8277-7854546058D4}"/>
+          </ac:picMkLst>
+        </pc:picChg>
+        <pc:picChg chg="del">
+          <ac:chgData name="Leandro Daniel" userId="682bb4abc622d264" providerId="LiveId" clId="{0C927506-5143-4A7D-B285-178AAC9CF657}" dt="2020-05-24T19:20:11.151" v="921" actId="478"/>
+          <ac:picMkLst>
+            <pc:docMk/>
+            <pc:sldMk cId="1275928961" sldId="372"/>
+            <ac:picMk id="10" creationId="{98AB35B6-C01B-4BC7-9234-A61B0A25D67B}"/>
+          </ac:picMkLst>
+        </pc:picChg>
+        <pc:picChg chg="add del mod">
+          <ac:chgData name="Leandro Daniel" userId="682bb4abc622d264" providerId="LiveId" clId="{0C927506-5143-4A7D-B285-178AAC9CF657}" dt="2020-05-24T19:20:30.316" v="925" actId="478"/>
+          <ac:picMkLst>
+            <pc:docMk/>
+            <pc:sldMk cId="1275928961" sldId="372"/>
+            <ac:picMk id="12" creationId="{6FBC6350-2952-468E-A4A5-5EAFFA9C1274}"/>
+          </ac:picMkLst>
+        </pc:picChg>
+        <pc:picChg chg="add del mod">
+          <ac:chgData name="Leandro Daniel" userId="682bb4abc622d264" providerId="LiveId" clId="{0C927506-5143-4A7D-B285-178AAC9CF657}" dt="2020-05-24T19:20:30.316" v="925" actId="478"/>
+          <ac:picMkLst>
+            <pc:docMk/>
+            <pc:sldMk cId="1275928961" sldId="372"/>
+            <ac:picMk id="13" creationId="{BAB79A15-E753-407A-B7F2-23D620DE7067}"/>
+          </ac:picMkLst>
+        </pc:picChg>
+        <pc:picChg chg="add del mod">
+          <ac:chgData name="Leandro Daniel" userId="682bb4abc622d264" providerId="LiveId" clId="{0C927506-5143-4A7D-B285-178AAC9CF657}" dt="2020-05-24T19:20:30.316" v="925" actId="478"/>
+          <ac:picMkLst>
+            <pc:docMk/>
+            <pc:sldMk cId="1275928961" sldId="372"/>
+            <ac:picMk id="14" creationId="{A4711A5A-BE4E-4692-9C78-47ACAF315FE3}"/>
+          </ac:picMkLst>
+        </pc:picChg>
+        <pc:cxnChg chg="add del mod">
+          <ac:chgData name="Leandro Daniel" userId="682bb4abc622d264" providerId="LiveId" clId="{0C927506-5143-4A7D-B285-178AAC9CF657}" dt="2020-05-24T19:20:30.316" v="925" actId="478"/>
+          <ac:cxnSpMkLst>
+            <pc:docMk/>
+            <pc:sldMk cId="1275928961" sldId="372"/>
+            <ac:cxnSpMk id="16" creationId="{EA648973-512C-4670-9344-A687D2E41ED4}"/>
+          </ac:cxnSpMkLst>
+        </pc:cxnChg>
+      </pc:sldChg>
+    </pc:docChg>
+  </pc:docChgLst>
+  <pc:docChgLst>
+    <pc:chgData name="Ricardo Lucio Braga Reis" userId="S::a57590919@fgv.edu.br::789c906b-d924-4b68-a4ad-fed37e68814f" providerId="AD" clId="Web-{AA03B29D-5316-9A96-B91F-F6CBA42BD17D}"/>
+    <pc:docChg chg="modSld">
+      <pc:chgData name="Ricardo Lucio Braga Reis" userId="S::a57590919@fgv.edu.br::789c906b-d924-4b68-a4ad-fed37e68814f" providerId="AD" clId="Web-{AA03B29D-5316-9A96-B91F-F6CBA42BD17D}" dt="2020-05-30T22:08:55.251" v="204" actId="20577"/>
+      <pc:docMkLst>
+        <pc:docMk/>
+      </pc:docMkLst>
+      <pc:sldChg chg="modSp">
+        <pc:chgData name="Ricardo Lucio Braga Reis" userId="S::a57590919@fgv.edu.br::789c906b-d924-4b68-a4ad-fed37e68814f" providerId="AD" clId="Web-{AA03B29D-5316-9A96-B91F-F6CBA42BD17D}" dt="2020-05-30T22:08:12.515" v="202" actId="20577"/>
         <pc:sldMkLst>
           <pc:docMk/>
           <pc:sldMk cId="2356196915" sldId="377"/>
         </pc:sldMkLst>
         <pc:spChg chg="mod">
-          <ac:chgData name="Leandro Daniel" userId="682bb4abc622d264" providerId="LiveId" clId="{7AC88094-A1D5-4FA0-8F56-B6E6CBB30C7C}" dt="2020-05-30T22:15:00.993" v="15" actId="20577"/>
+          <ac:chgData name="Ricardo Lucio Braga Reis" userId="S::a57590919@fgv.edu.br::789c906b-d924-4b68-a4ad-fed37e68814f" providerId="AD" clId="Web-{AA03B29D-5316-9A96-B91F-F6CBA42BD17D}" dt="2020-05-30T22:08:12.515" v="202" actId="20577"/>
           <ac:spMkLst>
             <pc:docMk/>
             <pc:sldMk cId="2356196915" sldId="377"/>
             <ac:spMk id="7" creationId="{CE3762FA-4222-4801-A067-946EE71C9A52}"/>
+          </ac:spMkLst>
+        </pc:spChg>
+      </pc:sldChg>
+    </pc:docChg>
+  </pc:docChgLst>
+  <pc:docChgLst>
+    <pc:chgData name="Leandro de Oliveira Daniel" userId="S::a57622988@fgv.edu.br::ff7f7cd4-1074-435c-a956-4a1fef029c30" providerId="AD" clId="Web-{94699624-5147-009A-BA59-58CD6B667BA6}"/>
+    <pc:docChg chg="modSld">
+      <pc:chgData name="Leandro de Oliveira Daniel" userId="S::a57622988@fgv.edu.br::ff7f7cd4-1074-435c-a956-4a1fef029c30" providerId="AD" clId="Web-{94699624-5147-009A-BA59-58CD6B667BA6}" dt="2020-06-01T23:50:02.563" v="13" actId="20577"/>
+      <pc:docMkLst>
+        <pc:docMk/>
+      </pc:docMkLst>
+      <pc:sldChg chg="modSp">
+        <pc:chgData name="Leandro de Oliveira Daniel" userId="S::a57622988@fgv.edu.br::ff7f7cd4-1074-435c-a956-4a1fef029c30" providerId="AD" clId="Web-{94699624-5147-009A-BA59-58CD6B667BA6}" dt="2020-06-01T23:50:02.548" v="12" actId="20577"/>
+        <pc:sldMkLst>
+          <pc:docMk/>
+          <pc:sldMk cId="599003997" sldId="357"/>
+        </pc:sldMkLst>
+        <pc:spChg chg="mod">
+          <ac:chgData name="Leandro de Oliveira Daniel" userId="S::a57622988@fgv.edu.br::ff7f7cd4-1074-435c-a956-4a1fef029c30" providerId="AD" clId="Web-{94699624-5147-009A-BA59-58CD6B667BA6}" dt="2020-06-01T23:50:02.548" v="12" actId="20577"/>
+          <ac:spMkLst>
+            <pc:docMk/>
+            <pc:sldMk cId="599003997" sldId="357"/>
+            <ac:spMk id="4" creationId="{F523F8A5-43AB-4AB2-BB4F-7F4A30E4A077}"/>
           </ac:spMkLst>
         </pc:spChg>
       </pc:sldChg>
@@ -4326,7 +4453,7 @@
             <a:fld id="{B26FF4F9-2FBB-4F7A-9697-05FA74F11F3B}" type="datetimeFigureOut">
               <a:rPr lang="pt-BR" smtClean="0"/>
               <a:pPr/>
-              <a:t>01/06/2020</a:t>
+              <a:t>04/06/2020</a:t>
             </a:fld>
             <a:endParaRPr lang="pt-BR"/>
           </a:p>
@@ -4505,7 +4632,7 @@
             <a:fld id="{1820D135-1270-41BD-8A14-B5B3DA62A4B5}" type="datetimeFigureOut">
               <a:rPr lang="pt-BR" smtClean="0"/>
               <a:pPr/>
-              <a:t>01/06/2020</a:t>
+              <a:t>04/06/2020</a:t>
             </a:fld>
             <a:endParaRPr lang="pt-BR"/>
           </a:p>
@@ -7482,7 +7609,7 @@
                   <a:schemeClr val="bg1"/>
                 </a:solidFill>
               </a:rPr>
-              <a:t>Apresentação Grupo 1</a:t>
+              <a:t>Apresentação Grupo X</a:t>
             </a:r>
           </a:p>
           <a:p>
@@ -10799,7 +10926,7 @@
         <p:spPr>
           <a:xfrm>
             <a:off x="176644" y="2016087"/>
-            <a:ext cx="11919876" cy="430887"/>
+            <a:ext cx="11919876" cy="4247317"/>
           </a:xfrm>
           <a:prstGeom prst="rect">
             <a:avLst/>
@@ -10810,14 +10937,170 @@
           </a:ln>
         </p:spPr>
         <p:txBody>
-          <a:bodyPr wrap="square" rtlCol="0">
+          <a:bodyPr wrap="square" rtlCol="0" anchor="t">
             <a:spAutoFit/>
           </a:bodyPr>
           <a:lstStyle/>
           <a:p>
             <a:r>
-              <a:rPr lang="pt-BR" sz="2200" i="1"/>
+              <a:rPr lang="pt-BR" sz="2200" i="1" dirty="0"/>
               <a:t>Escrever aqui</a:t>
+            </a:r>
+          </a:p>
+          <a:p>
+            <a:endParaRPr lang="pt-BR" sz="2200" i="1" dirty="0">
+              <a:cs typeface="Calibri"/>
+            </a:endParaRPr>
+          </a:p>
+          <a:p>
+            <a:r>
+              <a:rPr lang="pt-BR" sz="2200" i="1" dirty="0">
+                <a:cs typeface="Calibri"/>
+              </a:rPr>
+              <a:t>Notas da primeira apresentação:</a:t>
+            </a:r>
+          </a:p>
+          <a:p>
+            <a:endParaRPr lang="pt-BR" sz="2200" i="1" dirty="0">
+              <a:cs typeface="Calibri"/>
+            </a:endParaRPr>
+          </a:p>
+          <a:p>
+            <a:r>
+              <a:rPr lang="pt-BR" sz="1400" b="1" dirty="0">
+                <a:ea typeface="+mn-lt"/>
+                <a:cs typeface="+mn-lt"/>
+              </a:rPr>
+              <a:t>Daniel:</a:t>
+            </a:r>
+            <a:r>
+              <a:rPr lang="pt-BR" sz="1400" dirty="0">
+                <a:ea typeface="+mn-lt"/>
+                <a:cs typeface="+mn-lt"/>
+              </a:rPr>
+              <a:t> Só pra guardarmos o que falamos, 50-100k só a parte desse nosso modelo (prova de conceito com imagens estáticas) e 1Mi para </a:t>
+            </a:r>
+            <a:r>
+              <a:rPr lang="pt-BR" sz="1400" err="1">
+                <a:ea typeface="+mn-lt"/>
+                <a:cs typeface="+mn-lt"/>
+              </a:rPr>
+              <a:t>deploy</a:t>
+            </a:r>
+            <a:r>
+              <a:rPr lang="pt-BR" sz="1400" dirty="0">
+                <a:ea typeface="+mn-lt"/>
+                <a:cs typeface="+mn-lt"/>
+              </a:rPr>
+              <a:t> disso em câmeras (dava pra ser até mais né, mas foi o valor que veio à minha cabeça)</a:t>
+            </a:r>
+          </a:p>
+          <a:p>
+            <a:endParaRPr lang="pt-BR" sz="1400" dirty="0">
+              <a:ea typeface="+mn-lt"/>
+              <a:cs typeface="+mn-lt"/>
+            </a:endParaRPr>
+          </a:p>
+          <a:p>
+            <a:r>
+              <a:rPr lang="pt-BR" sz="1400" b="1" dirty="0">
+                <a:ea typeface="+mn-lt"/>
+                <a:cs typeface="+mn-lt"/>
+              </a:rPr>
+              <a:t>Leandro:</a:t>
+            </a:r>
+            <a:r>
+              <a:rPr lang="pt-BR" sz="1400" dirty="0">
+                <a:ea typeface="+mn-lt"/>
+                <a:cs typeface="+mn-lt"/>
+              </a:rPr>
+              <a:t> vamos dar uma invertida nesse professor, dizer que vamos entregar só a imagem porque vídeo recebemos proposta de uma empresa privada para fazer</a:t>
+            </a:r>
+          </a:p>
+          <a:p>
+            <a:r>
+              <a:rPr lang="pt-BR" sz="1400" dirty="0">
+                <a:ea typeface="+mn-lt"/>
+                <a:cs typeface="+mn-lt"/>
+              </a:rPr>
+              <a:t>outro </a:t>
+            </a:r>
+            <a:r>
+              <a:rPr lang="pt-BR" sz="1400" err="1">
+                <a:ea typeface="+mn-lt"/>
+                <a:cs typeface="+mn-lt"/>
+              </a:rPr>
+              <a:t>plot</a:t>
+            </a:r>
+            <a:r>
+              <a:rPr lang="pt-BR" sz="1400" dirty="0">
+                <a:ea typeface="+mn-lt"/>
+                <a:cs typeface="+mn-lt"/>
+              </a:rPr>
+              <a:t> twist: "Prefeito Bruno, não achamos correto cobrar por algo que possa ter um impacto social desta magnitude, nosso projeto será open source, e não cobraremos nada além do nosso tempo de estudo científico: R$ 100.000,00 (20 mil por 1 mês de cada pesquisador). entregaremos a base para que o senhor invista em P&amp;D"</a:t>
+            </a:r>
+          </a:p>
+          <a:p>
+            <a:endParaRPr lang="pt-BR" sz="1400" dirty="0">
+              <a:cs typeface="Calibri"/>
+            </a:endParaRPr>
+          </a:p>
+          <a:p>
+            <a:r>
+              <a:rPr lang="pt-BR" sz="1400" b="1" dirty="0">
+                <a:cs typeface="Calibri"/>
+              </a:rPr>
+              <a:t>Daniel: </a:t>
+            </a:r>
+            <a:r>
+              <a:rPr lang="pt-BR" sz="1400" dirty="0">
+                <a:ea typeface="+mn-lt"/>
+                <a:cs typeface="+mn-lt"/>
+              </a:rPr>
+              <a:t>'E se o senhor tiver interesse na implementação com vídeo, nos colocamos a disposição para participarmos da licitação em um projeto FUTURO'</a:t>
+            </a:r>
+          </a:p>
+          <a:p>
+            <a:endParaRPr lang="pt-BR" sz="1400" dirty="0">
+              <a:cs typeface="Calibri"/>
+            </a:endParaRPr>
+          </a:p>
+          <a:p>
+            <a:r>
+              <a:rPr lang="pt-BR" sz="1400" b="1" dirty="0">
+                <a:cs typeface="Calibri"/>
+              </a:rPr>
+              <a:t>Professor Bruno solicitou:</a:t>
+            </a:r>
+            <a:r>
+              <a:rPr lang="pt-BR" sz="1400" dirty="0">
+                <a:cs typeface="Calibri"/>
+              </a:rPr>
+              <a:t> </a:t>
+            </a:r>
+          </a:p>
+          <a:p>
+            <a:pPr marL="285750" indent="-285750">
+              <a:buFont typeface="Arial"/>
+              <a:buChar char="•"/>
+            </a:pPr>
+            <a:r>
+              <a:rPr lang="pt-BR" sz="1400" dirty="0">
+                <a:cs typeface="Calibri"/>
+              </a:rPr>
+              <a:t>Apresentar divisão de atividades pelos membros do grupo. </a:t>
+            </a:r>
+          </a:p>
+          <a:p>
+            <a:pPr marL="285750" indent="-285750">
+              <a:buFont typeface="Arial"/>
+              <a:buChar char="•"/>
+            </a:pPr>
+            <a:r>
+              <a:rPr lang="pt-BR" sz="1400" dirty="0">
+                <a:cs typeface="Calibri"/>
+              </a:rPr>
+              <a:t>Incluir vídeo</a:t>
             </a:r>
           </a:p>
         </p:txBody>
@@ -11011,6 +11294,126 @@
           </a:p>
         </p:txBody>
       </p:sp>
+      <p:pic>
+        <p:nvPicPr>
+          <p:cNvPr id="6" name="Picture 6" descr="A person sitting at a table with a sign&#10;&#10;Description generated with very high confidence">
+            <a:extLst>
+              <a:ext uri="{FF2B5EF4-FFF2-40B4-BE49-F238E27FC236}">
+                <a16:creationId xmlns:a16="http://schemas.microsoft.com/office/drawing/2014/main" id="{43992712-EC58-4717-8264-B6AB98C39012}"/>
+              </a:ext>
+            </a:extLst>
+          </p:cNvPr>
+          <p:cNvPicPr>
+            <a:picLocks noChangeAspect="1"/>
+          </p:cNvPicPr>
+          <p:nvPr/>
+        </p:nvPicPr>
+        <p:blipFill>
+          <a:blip r:embed="rId2"/>
+          <a:stretch>
+            <a:fillRect/>
+          </a:stretch>
+        </p:blipFill>
+        <p:spPr>
+          <a:xfrm>
+            <a:off x="302195" y="2557530"/>
+            <a:ext cx="2743200" cy="2263966"/>
+          </a:xfrm>
+          <a:prstGeom prst="rect">
+            <a:avLst/>
+          </a:prstGeom>
+        </p:spPr>
+      </p:pic>
+      <p:pic>
+        <p:nvPicPr>
+          <p:cNvPr id="7" name="Picture 7" descr="A picture containing newspaper, shirt&#10;&#10;Description generated with very high confidence">
+            <a:extLst>
+              <a:ext uri="{FF2B5EF4-FFF2-40B4-BE49-F238E27FC236}">
+                <a16:creationId xmlns:a16="http://schemas.microsoft.com/office/drawing/2014/main" id="{10C52E8A-D922-4818-B589-5CF53B6868E6}"/>
+              </a:ext>
+            </a:extLst>
+          </p:cNvPr>
+          <p:cNvPicPr>
+            <a:picLocks noChangeAspect="1"/>
+          </p:cNvPicPr>
+          <p:nvPr/>
+        </p:nvPicPr>
+        <p:blipFill>
+          <a:blip r:embed="rId3"/>
+          <a:stretch>
+            <a:fillRect/>
+          </a:stretch>
+        </p:blipFill>
+        <p:spPr>
+          <a:xfrm>
+            <a:off x="3109221" y="2555094"/>
+            <a:ext cx="4182533" cy="2255811"/>
+          </a:xfrm>
+          <a:prstGeom prst="rect">
+            <a:avLst/>
+          </a:prstGeom>
+        </p:spPr>
+      </p:pic>
+      <p:pic>
+        <p:nvPicPr>
+          <p:cNvPr id="8" name="Picture 8" descr="A person wearing a suit and tie&#10;&#10;Description generated with very high confidence">
+            <a:extLst>
+              <a:ext uri="{FF2B5EF4-FFF2-40B4-BE49-F238E27FC236}">
+                <a16:creationId xmlns:a16="http://schemas.microsoft.com/office/drawing/2014/main" id="{F9F735A1-B8DC-4D5F-8D81-4349A3660B63}"/>
+              </a:ext>
+            </a:extLst>
+          </p:cNvPr>
+          <p:cNvPicPr>
+            <a:picLocks noChangeAspect="1"/>
+          </p:cNvPicPr>
+          <p:nvPr/>
+        </p:nvPicPr>
+        <p:blipFill>
+          <a:blip r:embed="rId4"/>
+          <a:stretch>
+            <a:fillRect/>
+          </a:stretch>
+        </p:blipFill>
+        <p:spPr>
+          <a:xfrm>
+            <a:off x="7362092" y="2551871"/>
+            <a:ext cx="3153507" cy="2262256"/>
+          </a:xfrm>
+          <a:prstGeom prst="rect">
+            <a:avLst/>
+          </a:prstGeom>
+        </p:spPr>
+      </p:pic>
+      <p:pic>
+        <p:nvPicPr>
+          <p:cNvPr id="9" name="Picture 9" descr="A person posing for the camera&#10;&#10;Description generated with very high confidence">
+            <a:extLst>
+              <a:ext uri="{FF2B5EF4-FFF2-40B4-BE49-F238E27FC236}">
+                <a16:creationId xmlns:a16="http://schemas.microsoft.com/office/drawing/2014/main" id="{3D5CD6BA-59A7-43F6-8D85-5DA3BE027C3F}"/>
+              </a:ext>
+            </a:extLst>
+          </p:cNvPr>
+          <p:cNvPicPr>
+            <a:picLocks noChangeAspect="1"/>
+          </p:cNvPicPr>
+          <p:nvPr/>
+        </p:nvPicPr>
+        <p:blipFill>
+          <a:blip r:embed="rId5"/>
+          <a:stretch>
+            <a:fillRect/>
+          </a:stretch>
+        </p:blipFill>
+        <p:spPr>
+          <a:xfrm>
+            <a:off x="302195" y="4892989"/>
+            <a:ext cx="2743200" cy="1891508"/>
+          </a:xfrm>
+          <a:prstGeom prst="rect">
+            <a:avLst/>
+          </a:prstGeom>
+        </p:spPr>
+      </p:pic>
     </p:spTree>
     <p:extLst>
       <p:ext uri="{BB962C8B-B14F-4D97-AF65-F5344CB8AC3E}">
@@ -23271,8 +23674,8 @@
         </p:nvSpPr>
         <p:spPr>
           <a:xfrm>
-            <a:off x="176644" y="2016087"/>
-            <a:ext cx="11919876" cy="2123658"/>
+            <a:off x="176643" y="2016087"/>
+            <a:ext cx="11919875" cy="2462213"/>
           </a:xfrm>
           <a:prstGeom prst="rect">
             <a:avLst/>
@@ -23290,20 +23693,16 @@
           <a:p>
             <a:r>
               <a:rPr lang="pt-BR" sz="2200" i="1" dirty="0"/>
-              <a:t>Diante do contexto descrito, apresentam-se os questionamentos à serem abordados nessa pesquisa:</a:t>
+              <a:t>Diante do contexto descrito, apresentam-se o questionamento a ser abordado nessa pesquisa:</a:t>
             </a:r>
           </a:p>
           <a:p>
             <a:endParaRPr lang="pt-BR" sz="2200" i="1" dirty="0"/>
           </a:p>
           <a:p>
-            <a:pPr marL="457200" indent="-457200">
-              <a:buFont typeface="+mj-lt"/>
-              <a:buAutoNum type="arabicPeriod"/>
-            </a:pPr>
             <a:r>
               <a:rPr lang="pt-BR" sz="2200" b="1" i="1" dirty="0"/>
-              <a:t>Como identificar de forma automatizada em espaços públicos, estabelecimentos que executem atividades essenciais, repartições públicas estaduais, transporte por aplicativo se os consumidores,  fornecedores,  clientes, empregados, colaboradores, agentes públicos e  prestadores de serviço estão utilizando máscaras de proteção facial?</a:t>
+              <a:t>É possível desenvolver, com técnicas de deep learning, um modelo de detecção de pessoas utilizando máscaras faciais para posterior implementação em sistemas de controle de entrada em espaços públicos, estabelecimentos que executem atividades essenciais, repartições públicas estaduais, transporte por aplicativo para um público alvo de consumidores,  fornecedores,  clientes, empregados, colaboradores, agentes públicos e  prestadores de serviço?</a:t>
             </a:r>
           </a:p>
         </p:txBody>
@@ -23470,19 +23869,18 @@
               <a:rPr lang="pt-BR" sz="2200" i="1" dirty="0"/>
               <a:t>Objetivo geral: </a:t>
             </a:r>
-            <a:endParaRPr lang="pt-BR" sz="2200" i="1"/>
           </a:p>
           <a:p>
             <a:r>
               <a:rPr lang="pt-BR" sz="2200" b="1" i="1" dirty="0"/>
-              <a:t>Identificar de forma automatizada, se as pessoas estão utilizando máscaras de proteção facial.</a:t>
+              <a:t>Desenvolver um modelo que identifique, se as pessoas estão utilizando máscaras de proteção facial.</a:t>
             </a:r>
             <a:endParaRPr lang="pt-BR" sz="2200" b="1" i="1" dirty="0">
               <a:cs typeface="Calibri"/>
             </a:endParaRPr>
           </a:p>
           <a:p>
-            <a:endParaRPr lang="pt-BR" sz="2200" b="1" i="1"/>
+            <a:endParaRPr lang="pt-BR" sz="2200" b="1" i="1" dirty="0"/>
           </a:p>
           <a:p>
             <a:r>
@@ -23552,7 +23950,7 @@
             </a:pPr>
             <a:r>
               <a:rPr lang="pt-BR" sz="2200" i="1" dirty="0"/>
-              <a:t>Construir os modelos;</a:t>
+              <a:t>Construir os modelos e identificar o com os melhores resultados;</a:t>
             </a:r>
             <a:endParaRPr lang="pt-BR" sz="2200" i="1" dirty="0">
               <a:cs typeface="Calibri"/>

</xml_diff>